<commit_message>
Altered to give input.
</commit_message>
<xml_diff>
--- a/NotifyMe.pptx
+++ b/NotifyMe.pptx
@@ -7,17 +7,18 @@
   <p:sldIdLst>
     <p:sldId id="256" r:id="rId2"/>
     <p:sldId id="257" r:id="rId3"/>
-    <p:sldId id="258" r:id="rId4"/>
-    <p:sldId id="262" r:id="rId5"/>
-    <p:sldId id="268" r:id="rId6"/>
-    <p:sldId id="270" r:id="rId7"/>
-    <p:sldId id="271" r:id="rId8"/>
-    <p:sldId id="272" r:id="rId9"/>
-    <p:sldId id="273" r:id="rId10"/>
-    <p:sldId id="274" r:id="rId11"/>
-    <p:sldId id="259" r:id="rId12"/>
-    <p:sldId id="261" r:id="rId13"/>
-    <p:sldId id="260" r:id="rId14"/>
+    <p:sldId id="262" r:id="rId4"/>
+    <p:sldId id="268" r:id="rId5"/>
+    <p:sldId id="270" r:id="rId6"/>
+    <p:sldId id="271" r:id="rId7"/>
+    <p:sldId id="272" r:id="rId8"/>
+    <p:sldId id="273" r:id="rId9"/>
+    <p:sldId id="274" r:id="rId10"/>
+    <p:sldId id="259" r:id="rId11"/>
+    <p:sldId id="261" r:id="rId12"/>
+    <p:sldId id="260" r:id="rId13"/>
+    <p:sldId id="275" r:id="rId14"/>
+    <p:sldId id="276" r:id="rId15"/>
   </p:sldIdLst>
   <p:sldSz cx="12192000" cy="6858000"/>
   <p:notesSz cx="6858000" cy="9144000"/>
@@ -150,7 +151,7 @@
           <p:cNvPr id="2" name="Title 1">
             <a:extLst>
               <a:ext uri="{FF2B5EF4-FFF2-40B4-BE49-F238E27FC236}">
-                <a16:creationId xmlns:a16="http://schemas.microsoft.com/office/drawing/2014/main" id="{A121670B-39D9-4A13-A117-73C6549A36A7}"/>
+                <a16:creationId xmlns:a16="http://schemas.microsoft.com/office/drawing/2014/main" xmlns="" id="{A121670B-39D9-4A13-A117-73C6549A36A7}"/>
               </a:ext>
             </a:extLst>
           </p:cNvPr>
@@ -176,7 +177,7 @@
           </a:lstStyle>
           <a:p>
             <a:r>
-              <a:rPr lang="en-US"/>
+              <a:rPr lang="en-US" dirty="0"/>
               <a:t>Click to edit Master title style</a:t>
             </a:r>
           </a:p>
@@ -187,7 +188,7 @@
           <p:cNvPr id="3" name="Subtitle 2">
             <a:extLst>
               <a:ext uri="{FF2B5EF4-FFF2-40B4-BE49-F238E27FC236}">
-                <a16:creationId xmlns:a16="http://schemas.microsoft.com/office/drawing/2014/main" id="{4F0A4617-72EC-4342-9E3B-7C6DB7671CE2}"/>
+                <a16:creationId xmlns:a16="http://schemas.microsoft.com/office/drawing/2014/main" xmlns="" id="{4F0A4617-72EC-4342-9E3B-7C6DB7671CE2}"/>
               </a:ext>
             </a:extLst>
           </p:cNvPr>
@@ -257,7 +258,7 @@
           <p:cNvPr id="4" name="Date Placeholder 3">
             <a:extLst>
               <a:ext uri="{FF2B5EF4-FFF2-40B4-BE49-F238E27FC236}">
-                <a16:creationId xmlns:a16="http://schemas.microsoft.com/office/drawing/2014/main" id="{843BC3CE-7F4E-4615-A889-4E624C4E6ED7}"/>
+                <a16:creationId xmlns:a16="http://schemas.microsoft.com/office/drawing/2014/main" xmlns="" id="{843BC3CE-7F4E-4615-A889-4E624C4E6ED7}"/>
               </a:ext>
             </a:extLst>
           </p:cNvPr>
@@ -275,7 +276,7 @@
           <a:p>
             <a:fld id="{8E423C67-9D6A-4F85-BFC6-5090D8CF0AB4}" type="datetimeFigureOut">
               <a:rPr lang="en-US" smtClean="0"/>
-              <a:t>12/6/2017</a:t>
+              <a:t>2017-12-06</a:t>
             </a:fld>
             <a:endParaRPr lang="en-US"/>
           </a:p>
@@ -286,7 +287,7 @@
           <p:cNvPr id="5" name="Footer Placeholder 4">
             <a:extLst>
               <a:ext uri="{FF2B5EF4-FFF2-40B4-BE49-F238E27FC236}">
-                <a16:creationId xmlns:a16="http://schemas.microsoft.com/office/drawing/2014/main" id="{81DFEBD2-190E-452B-9006-EFD22F033623}"/>
+                <a16:creationId xmlns:a16="http://schemas.microsoft.com/office/drawing/2014/main" xmlns="" id="{81DFEBD2-190E-452B-9006-EFD22F033623}"/>
               </a:ext>
             </a:extLst>
           </p:cNvPr>
@@ -311,7 +312,7 @@
           <p:cNvPr id="6" name="Slide Number Placeholder 5">
             <a:extLst>
               <a:ext uri="{FF2B5EF4-FFF2-40B4-BE49-F238E27FC236}">
-                <a16:creationId xmlns:a16="http://schemas.microsoft.com/office/drawing/2014/main" id="{9BF2AEAB-9CD9-4C11-B369-6FF89494160A}"/>
+                <a16:creationId xmlns:a16="http://schemas.microsoft.com/office/drawing/2014/main" xmlns="" id="{9BF2AEAB-9CD9-4C11-B369-6FF89494160A}"/>
               </a:ext>
             </a:extLst>
           </p:cNvPr>
@@ -345,6 +346,13 @@
   <p:clrMapOvr>
     <a:masterClrMapping/>
   </p:clrMapOvr>
+  <p:timing>
+    <p:tnLst>
+      <p:par>
+        <p:cTn id="1" dur="indefinite" restart="never" nodeType="tmRoot"/>
+      </p:par>
+    </p:tnLst>
+  </p:timing>
 </p:sldLayout>
 </file>
 
@@ -370,7 +378,7 @@
           <p:cNvPr id="2" name="Title 1">
             <a:extLst>
               <a:ext uri="{FF2B5EF4-FFF2-40B4-BE49-F238E27FC236}">
-                <a16:creationId xmlns:a16="http://schemas.microsoft.com/office/drawing/2014/main" id="{81A937BE-06FE-4C9F-A708-5D343192BEF3}"/>
+                <a16:creationId xmlns:a16="http://schemas.microsoft.com/office/drawing/2014/main" xmlns="" id="{81A937BE-06FE-4C9F-A708-5D343192BEF3}"/>
               </a:ext>
             </a:extLst>
           </p:cNvPr>
@@ -398,7 +406,7 @@
           <p:cNvPr id="3" name="Vertical Text Placeholder 2">
             <a:extLst>
               <a:ext uri="{FF2B5EF4-FFF2-40B4-BE49-F238E27FC236}">
-                <a16:creationId xmlns:a16="http://schemas.microsoft.com/office/drawing/2014/main" id="{85372E3E-C976-4E70-8D8A-091233C9A49F}"/>
+                <a16:creationId xmlns:a16="http://schemas.microsoft.com/office/drawing/2014/main" xmlns="" id="{85372E3E-C976-4E70-8D8A-091233C9A49F}"/>
               </a:ext>
             </a:extLst>
           </p:cNvPr>
@@ -455,7 +463,7 @@
           <p:cNvPr id="4" name="Date Placeholder 3">
             <a:extLst>
               <a:ext uri="{FF2B5EF4-FFF2-40B4-BE49-F238E27FC236}">
-                <a16:creationId xmlns:a16="http://schemas.microsoft.com/office/drawing/2014/main" id="{3029C7F0-3383-4836-BF51-AF0F1BC78E6B}"/>
+                <a16:creationId xmlns:a16="http://schemas.microsoft.com/office/drawing/2014/main" xmlns="" id="{3029C7F0-3383-4836-BF51-AF0F1BC78E6B}"/>
               </a:ext>
             </a:extLst>
           </p:cNvPr>
@@ -473,7 +481,7 @@
           <a:p>
             <a:fld id="{8E423C67-9D6A-4F85-BFC6-5090D8CF0AB4}" type="datetimeFigureOut">
               <a:rPr lang="en-US" smtClean="0"/>
-              <a:t>12/6/2017</a:t>
+              <a:t>2017-12-06</a:t>
             </a:fld>
             <a:endParaRPr lang="en-US"/>
           </a:p>
@@ -484,7 +492,7 @@
           <p:cNvPr id="5" name="Footer Placeholder 4">
             <a:extLst>
               <a:ext uri="{FF2B5EF4-FFF2-40B4-BE49-F238E27FC236}">
-                <a16:creationId xmlns:a16="http://schemas.microsoft.com/office/drawing/2014/main" id="{34D72F3A-0354-422A-B244-BBA17F440987}"/>
+                <a16:creationId xmlns:a16="http://schemas.microsoft.com/office/drawing/2014/main" xmlns="" id="{34D72F3A-0354-422A-B244-BBA17F440987}"/>
               </a:ext>
             </a:extLst>
           </p:cNvPr>
@@ -509,7 +517,7 @@
           <p:cNvPr id="6" name="Slide Number Placeholder 5">
             <a:extLst>
               <a:ext uri="{FF2B5EF4-FFF2-40B4-BE49-F238E27FC236}">
-                <a16:creationId xmlns:a16="http://schemas.microsoft.com/office/drawing/2014/main" id="{A25F886E-A4A5-40AD-85DF-AFF0A44982E8}"/>
+                <a16:creationId xmlns:a16="http://schemas.microsoft.com/office/drawing/2014/main" xmlns="" id="{A25F886E-A4A5-40AD-85DF-AFF0A44982E8}"/>
               </a:ext>
             </a:extLst>
           </p:cNvPr>
@@ -568,7 +576,7 @@
           <p:cNvPr id="2" name="Vertical Title 1">
             <a:extLst>
               <a:ext uri="{FF2B5EF4-FFF2-40B4-BE49-F238E27FC236}">
-                <a16:creationId xmlns:a16="http://schemas.microsoft.com/office/drawing/2014/main" id="{9448314F-80B0-40C7-81BF-07588212961B}"/>
+                <a16:creationId xmlns:a16="http://schemas.microsoft.com/office/drawing/2014/main" xmlns="" id="{9448314F-80B0-40C7-81BF-07588212961B}"/>
               </a:ext>
             </a:extLst>
           </p:cNvPr>
@@ -601,7 +609,7 @@
           <p:cNvPr id="3" name="Vertical Text Placeholder 2">
             <a:extLst>
               <a:ext uri="{FF2B5EF4-FFF2-40B4-BE49-F238E27FC236}">
-                <a16:creationId xmlns:a16="http://schemas.microsoft.com/office/drawing/2014/main" id="{DD399EFE-F0A1-4F14-96B4-066A494A8C7A}"/>
+                <a16:creationId xmlns:a16="http://schemas.microsoft.com/office/drawing/2014/main" xmlns="" id="{DD399EFE-F0A1-4F14-96B4-066A494A8C7A}"/>
               </a:ext>
             </a:extLst>
           </p:cNvPr>
@@ -663,7 +671,7 @@
           <p:cNvPr id="4" name="Date Placeholder 3">
             <a:extLst>
               <a:ext uri="{FF2B5EF4-FFF2-40B4-BE49-F238E27FC236}">
-                <a16:creationId xmlns:a16="http://schemas.microsoft.com/office/drawing/2014/main" id="{F5220A0C-90E3-4701-9050-8DB71E747DBE}"/>
+                <a16:creationId xmlns:a16="http://schemas.microsoft.com/office/drawing/2014/main" xmlns="" id="{F5220A0C-90E3-4701-9050-8DB71E747DBE}"/>
               </a:ext>
             </a:extLst>
           </p:cNvPr>
@@ -681,7 +689,7 @@
           <a:p>
             <a:fld id="{8E423C67-9D6A-4F85-BFC6-5090D8CF0AB4}" type="datetimeFigureOut">
               <a:rPr lang="en-US" smtClean="0"/>
-              <a:t>12/6/2017</a:t>
+              <a:t>2017-12-06</a:t>
             </a:fld>
             <a:endParaRPr lang="en-US"/>
           </a:p>
@@ -692,7 +700,7 @@
           <p:cNvPr id="5" name="Footer Placeholder 4">
             <a:extLst>
               <a:ext uri="{FF2B5EF4-FFF2-40B4-BE49-F238E27FC236}">
-                <a16:creationId xmlns:a16="http://schemas.microsoft.com/office/drawing/2014/main" id="{EA032DB9-427E-41E0-A3D4-B923EB1C8401}"/>
+                <a16:creationId xmlns:a16="http://schemas.microsoft.com/office/drawing/2014/main" xmlns="" id="{EA032DB9-427E-41E0-A3D4-B923EB1C8401}"/>
               </a:ext>
             </a:extLst>
           </p:cNvPr>
@@ -717,7 +725,7 @@
           <p:cNvPr id="6" name="Slide Number Placeholder 5">
             <a:extLst>
               <a:ext uri="{FF2B5EF4-FFF2-40B4-BE49-F238E27FC236}">
-                <a16:creationId xmlns:a16="http://schemas.microsoft.com/office/drawing/2014/main" id="{1E7E3958-F67B-4081-AD68-3D47AEDBE6BD}"/>
+                <a16:creationId xmlns:a16="http://schemas.microsoft.com/office/drawing/2014/main" xmlns="" id="{1E7E3958-F67B-4081-AD68-3D47AEDBE6BD}"/>
               </a:ext>
             </a:extLst>
           </p:cNvPr>
@@ -776,7 +784,7 @@
           <p:cNvPr id="2" name="Title 1">
             <a:extLst>
               <a:ext uri="{FF2B5EF4-FFF2-40B4-BE49-F238E27FC236}">
-                <a16:creationId xmlns:a16="http://schemas.microsoft.com/office/drawing/2014/main" id="{6A043D6D-738D-466C-9F80-3AB6838094C3}"/>
+                <a16:creationId xmlns:a16="http://schemas.microsoft.com/office/drawing/2014/main" xmlns="" id="{6A043D6D-738D-466C-9F80-3AB6838094C3}"/>
               </a:ext>
             </a:extLst>
           </p:cNvPr>
@@ -804,7 +812,7 @@
           <p:cNvPr id="3" name="Content Placeholder 2">
             <a:extLst>
               <a:ext uri="{FF2B5EF4-FFF2-40B4-BE49-F238E27FC236}">
-                <a16:creationId xmlns:a16="http://schemas.microsoft.com/office/drawing/2014/main" id="{62FB617F-BC4F-4AAB-81E7-FECE5AA04FC3}"/>
+                <a16:creationId xmlns:a16="http://schemas.microsoft.com/office/drawing/2014/main" xmlns="" id="{62FB617F-BC4F-4AAB-81E7-FECE5AA04FC3}"/>
               </a:ext>
             </a:extLst>
           </p:cNvPr>
@@ -861,7 +869,7 @@
           <p:cNvPr id="4" name="Date Placeholder 3">
             <a:extLst>
               <a:ext uri="{FF2B5EF4-FFF2-40B4-BE49-F238E27FC236}">
-                <a16:creationId xmlns:a16="http://schemas.microsoft.com/office/drawing/2014/main" id="{F544F1D4-EEC8-4FD1-85E0-7684576FC0E3}"/>
+                <a16:creationId xmlns:a16="http://schemas.microsoft.com/office/drawing/2014/main" xmlns="" id="{F544F1D4-EEC8-4FD1-85E0-7684576FC0E3}"/>
               </a:ext>
             </a:extLst>
           </p:cNvPr>
@@ -879,7 +887,7 @@
           <a:p>
             <a:fld id="{8E423C67-9D6A-4F85-BFC6-5090D8CF0AB4}" type="datetimeFigureOut">
               <a:rPr lang="en-US" smtClean="0"/>
-              <a:t>12/6/2017</a:t>
+              <a:t>2017-12-06</a:t>
             </a:fld>
             <a:endParaRPr lang="en-US"/>
           </a:p>
@@ -890,7 +898,7 @@
           <p:cNvPr id="5" name="Footer Placeholder 4">
             <a:extLst>
               <a:ext uri="{FF2B5EF4-FFF2-40B4-BE49-F238E27FC236}">
-                <a16:creationId xmlns:a16="http://schemas.microsoft.com/office/drawing/2014/main" id="{B56E2608-E959-48EC-A71C-783218FC97D7}"/>
+                <a16:creationId xmlns:a16="http://schemas.microsoft.com/office/drawing/2014/main" xmlns="" id="{B56E2608-E959-48EC-A71C-783218FC97D7}"/>
               </a:ext>
             </a:extLst>
           </p:cNvPr>
@@ -915,7 +923,7 @@
           <p:cNvPr id="6" name="Slide Number Placeholder 5">
             <a:extLst>
               <a:ext uri="{FF2B5EF4-FFF2-40B4-BE49-F238E27FC236}">
-                <a16:creationId xmlns:a16="http://schemas.microsoft.com/office/drawing/2014/main" id="{6D1FB63B-0996-4311-9E74-50D1827F74B4}"/>
+                <a16:creationId xmlns:a16="http://schemas.microsoft.com/office/drawing/2014/main" xmlns="" id="{6D1FB63B-0996-4311-9E74-50D1827F74B4}"/>
               </a:ext>
             </a:extLst>
           </p:cNvPr>
@@ -949,6 +957,13 @@
   <p:clrMapOvr>
     <a:masterClrMapping/>
   </p:clrMapOvr>
+  <p:timing>
+    <p:tnLst>
+      <p:par>
+        <p:cTn id="1" dur="indefinite" restart="never" nodeType="tmRoot"/>
+      </p:par>
+    </p:tnLst>
+  </p:timing>
 </p:sldLayout>
 </file>
 
@@ -974,7 +989,7 @@
           <p:cNvPr id="2" name="Title 1">
             <a:extLst>
               <a:ext uri="{FF2B5EF4-FFF2-40B4-BE49-F238E27FC236}">
-                <a16:creationId xmlns:a16="http://schemas.microsoft.com/office/drawing/2014/main" id="{2B937C0D-25FD-4767-8700-C539CF044294}"/>
+                <a16:creationId xmlns:a16="http://schemas.microsoft.com/office/drawing/2014/main" xmlns="" id="{2B937C0D-25FD-4767-8700-C539CF044294}"/>
               </a:ext>
             </a:extLst>
           </p:cNvPr>
@@ -1011,7 +1026,7 @@
           <p:cNvPr id="3" name="Text Placeholder 2">
             <a:extLst>
               <a:ext uri="{FF2B5EF4-FFF2-40B4-BE49-F238E27FC236}">
-                <a16:creationId xmlns:a16="http://schemas.microsoft.com/office/drawing/2014/main" id="{67AB3DE6-22C7-4844-815B-043026A3AB81}"/>
+                <a16:creationId xmlns:a16="http://schemas.microsoft.com/office/drawing/2014/main" xmlns="" id="{67AB3DE6-22C7-4844-815B-043026A3AB81}"/>
               </a:ext>
             </a:extLst>
           </p:cNvPr>
@@ -1136,7 +1151,7 @@
           <p:cNvPr id="4" name="Date Placeholder 3">
             <a:extLst>
               <a:ext uri="{FF2B5EF4-FFF2-40B4-BE49-F238E27FC236}">
-                <a16:creationId xmlns:a16="http://schemas.microsoft.com/office/drawing/2014/main" id="{2279578C-B1CE-43B5-9B07-D3758262DEC8}"/>
+                <a16:creationId xmlns:a16="http://schemas.microsoft.com/office/drawing/2014/main" xmlns="" id="{2279578C-B1CE-43B5-9B07-D3758262DEC8}"/>
               </a:ext>
             </a:extLst>
           </p:cNvPr>
@@ -1154,7 +1169,7 @@
           <a:p>
             <a:fld id="{8E423C67-9D6A-4F85-BFC6-5090D8CF0AB4}" type="datetimeFigureOut">
               <a:rPr lang="en-US" smtClean="0"/>
-              <a:t>12/6/2017</a:t>
+              <a:t>2017-12-06</a:t>
             </a:fld>
             <a:endParaRPr lang="en-US"/>
           </a:p>
@@ -1165,7 +1180,7 @@
           <p:cNvPr id="5" name="Footer Placeholder 4">
             <a:extLst>
               <a:ext uri="{FF2B5EF4-FFF2-40B4-BE49-F238E27FC236}">
-                <a16:creationId xmlns:a16="http://schemas.microsoft.com/office/drawing/2014/main" id="{068D9F9E-8FF9-4B41-809C-C1C9B76C845C}"/>
+                <a16:creationId xmlns:a16="http://schemas.microsoft.com/office/drawing/2014/main" xmlns="" id="{068D9F9E-8FF9-4B41-809C-C1C9B76C845C}"/>
               </a:ext>
             </a:extLst>
           </p:cNvPr>
@@ -1190,7 +1205,7 @@
           <p:cNvPr id="6" name="Slide Number Placeholder 5">
             <a:extLst>
               <a:ext uri="{FF2B5EF4-FFF2-40B4-BE49-F238E27FC236}">
-                <a16:creationId xmlns:a16="http://schemas.microsoft.com/office/drawing/2014/main" id="{9C2A9C60-8FC5-47B9-9DA4-E828B5C3D411}"/>
+                <a16:creationId xmlns:a16="http://schemas.microsoft.com/office/drawing/2014/main" xmlns="" id="{9C2A9C60-8FC5-47B9-9DA4-E828B5C3D411}"/>
               </a:ext>
             </a:extLst>
           </p:cNvPr>
@@ -1224,6 +1239,13 @@
   <p:clrMapOvr>
     <a:masterClrMapping/>
   </p:clrMapOvr>
+  <p:timing>
+    <p:tnLst>
+      <p:par>
+        <p:cTn id="1" dur="indefinite" restart="never" nodeType="tmRoot"/>
+      </p:par>
+    </p:tnLst>
+  </p:timing>
 </p:sldLayout>
 </file>
 
@@ -1249,7 +1271,7 @@
           <p:cNvPr id="2" name="Title 1">
             <a:extLst>
               <a:ext uri="{FF2B5EF4-FFF2-40B4-BE49-F238E27FC236}">
-                <a16:creationId xmlns:a16="http://schemas.microsoft.com/office/drawing/2014/main" id="{10ED49E6-F673-451D-892D-52B8D49DAB14}"/>
+                <a16:creationId xmlns:a16="http://schemas.microsoft.com/office/drawing/2014/main" xmlns="" id="{10ED49E6-F673-451D-892D-52B8D49DAB14}"/>
               </a:ext>
             </a:extLst>
           </p:cNvPr>
@@ -1277,7 +1299,7 @@
           <p:cNvPr id="3" name="Content Placeholder 2">
             <a:extLst>
               <a:ext uri="{FF2B5EF4-FFF2-40B4-BE49-F238E27FC236}">
-                <a16:creationId xmlns:a16="http://schemas.microsoft.com/office/drawing/2014/main" id="{76BC5C3B-ACFE-4482-A832-03AC581249B1}"/>
+                <a16:creationId xmlns:a16="http://schemas.microsoft.com/office/drawing/2014/main" xmlns="" id="{76BC5C3B-ACFE-4482-A832-03AC581249B1}"/>
               </a:ext>
             </a:extLst>
           </p:cNvPr>
@@ -1339,7 +1361,7 @@
           <p:cNvPr id="4" name="Content Placeholder 3">
             <a:extLst>
               <a:ext uri="{FF2B5EF4-FFF2-40B4-BE49-F238E27FC236}">
-                <a16:creationId xmlns:a16="http://schemas.microsoft.com/office/drawing/2014/main" id="{40A231FA-65B5-4230-B64A-B88BCEF670B4}"/>
+                <a16:creationId xmlns:a16="http://schemas.microsoft.com/office/drawing/2014/main" xmlns="" id="{40A231FA-65B5-4230-B64A-B88BCEF670B4}"/>
               </a:ext>
             </a:extLst>
           </p:cNvPr>
@@ -1401,7 +1423,7 @@
           <p:cNvPr id="5" name="Date Placeholder 4">
             <a:extLst>
               <a:ext uri="{FF2B5EF4-FFF2-40B4-BE49-F238E27FC236}">
-                <a16:creationId xmlns:a16="http://schemas.microsoft.com/office/drawing/2014/main" id="{67F72277-8ECF-4CB3-A8E4-6B1DC779BB60}"/>
+                <a16:creationId xmlns:a16="http://schemas.microsoft.com/office/drawing/2014/main" xmlns="" id="{67F72277-8ECF-4CB3-A8E4-6B1DC779BB60}"/>
               </a:ext>
             </a:extLst>
           </p:cNvPr>
@@ -1419,7 +1441,7 @@
           <a:p>
             <a:fld id="{8E423C67-9D6A-4F85-BFC6-5090D8CF0AB4}" type="datetimeFigureOut">
               <a:rPr lang="en-US" smtClean="0"/>
-              <a:t>12/6/2017</a:t>
+              <a:t>2017-12-06</a:t>
             </a:fld>
             <a:endParaRPr lang="en-US"/>
           </a:p>
@@ -1430,7 +1452,7 @@
           <p:cNvPr id="6" name="Footer Placeholder 5">
             <a:extLst>
               <a:ext uri="{FF2B5EF4-FFF2-40B4-BE49-F238E27FC236}">
-                <a16:creationId xmlns:a16="http://schemas.microsoft.com/office/drawing/2014/main" id="{DFD75405-06A3-4BB0-9072-41B4D1281F15}"/>
+                <a16:creationId xmlns:a16="http://schemas.microsoft.com/office/drawing/2014/main" xmlns="" id="{DFD75405-06A3-4BB0-9072-41B4D1281F15}"/>
               </a:ext>
             </a:extLst>
           </p:cNvPr>
@@ -1455,7 +1477,7 @@
           <p:cNvPr id="7" name="Slide Number Placeholder 6">
             <a:extLst>
               <a:ext uri="{FF2B5EF4-FFF2-40B4-BE49-F238E27FC236}">
-                <a16:creationId xmlns:a16="http://schemas.microsoft.com/office/drawing/2014/main" id="{B5B4B9AD-6AA0-4991-B07F-C13C79D75731}"/>
+                <a16:creationId xmlns:a16="http://schemas.microsoft.com/office/drawing/2014/main" xmlns="" id="{B5B4B9AD-6AA0-4991-B07F-C13C79D75731}"/>
               </a:ext>
             </a:extLst>
           </p:cNvPr>
@@ -1514,7 +1536,7 @@
           <p:cNvPr id="2" name="Title 1">
             <a:extLst>
               <a:ext uri="{FF2B5EF4-FFF2-40B4-BE49-F238E27FC236}">
-                <a16:creationId xmlns:a16="http://schemas.microsoft.com/office/drawing/2014/main" id="{DDF948DF-1DD2-4386-90B2-DB68C1D07E2D}"/>
+                <a16:creationId xmlns:a16="http://schemas.microsoft.com/office/drawing/2014/main" xmlns="" id="{DDF948DF-1DD2-4386-90B2-DB68C1D07E2D}"/>
               </a:ext>
             </a:extLst>
           </p:cNvPr>
@@ -1547,7 +1569,7 @@
           <p:cNvPr id="3" name="Text Placeholder 2">
             <a:extLst>
               <a:ext uri="{FF2B5EF4-FFF2-40B4-BE49-F238E27FC236}">
-                <a16:creationId xmlns:a16="http://schemas.microsoft.com/office/drawing/2014/main" id="{9EE6267F-4B2F-4A00-8BF4-79752C1B7494}"/>
+                <a16:creationId xmlns:a16="http://schemas.microsoft.com/office/drawing/2014/main" xmlns="" id="{9EE6267F-4B2F-4A00-8BF4-79752C1B7494}"/>
               </a:ext>
             </a:extLst>
           </p:cNvPr>
@@ -1618,7 +1640,7 @@
           <p:cNvPr id="4" name="Content Placeholder 3">
             <a:extLst>
               <a:ext uri="{FF2B5EF4-FFF2-40B4-BE49-F238E27FC236}">
-                <a16:creationId xmlns:a16="http://schemas.microsoft.com/office/drawing/2014/main" id="{3ABD9567-59B7-4E59-8589-D8F9496DBFE6}"/>
+                <a16:creationId xmlns:a16="http://schemas.microsoft.com/office/drawing/2014/main" xmlns="" id="{3ABD9567-59B7-4E59-8589-D8F9496DBFE6}"/>
               </a:ext>
             </a:extLst>
           </p:cNvPr>
@@ -1680,7 +1702,7 @@
           <p:cNvPr id="5" name="Text Placeholder 4">
             <a:extLst>
               <a:ext uri="{FF2B5EF4-FFF2-40B4-BE49-F238E27FC236}">
-                <a16:creationId xmlns:a16="http://schemas.microsoft.com/office/drawing/2014/main" id="{753B1704-496C-4556-ACE7-875F4B371852}"/>
+                <a16:creationId xmlns:a16="http://schemas.microsoft.com/office/drawing/2014/main" xmlns="" id="{753B1704-496C-4556-ACE7-875F4B371852}"/>
               </a:ext>
             </a:extLst>
           </p:cNvPr>
@@ -1751,7 +1773,7 @@
           <p:cNvPr id="6" name="Content Placeholder 5">
             <a:extLst>
               <a:ext uri="{FF2B5EF4-FFF2-40B4-BE49-F238E27FC236}">
-                <a16:creationId xmlns:a16="http://schemas.microsoft.com/office/drawing/2014/main" id="{C0EC14B4-3E8A-4FB6-9C50-C5B54CA04880}"/>
+                <a16:creationId xmlns:a16="http://schemas.microsoft.com/office/drawing/2014/main" xmlns="" id="{C0EC14B4-3E8A-4FB6-9C50-C5B54CA04880}"/>
               </a:ext>
             </a:extLst>
           </p:cNvPr>
@@ -1813,7 +1835,7 @@
           <p:cNvPr id="7" name="Date Placeholder 6">
             <a:extLst>
               <a:ext uri="{FF2B5EF4-FFF2-40B4-BE49-F238E27FC236}">
-                <a16:creationId xmlns:a16="http://schemas.microsoft.com/office/drawing/2014/main" id="{6FE91A59-D6B8-46D1-96D6-E03F9C08BE95}"/>
+                <a16:creationId xmlns:a16="http://schemas.microsoft.com/office/drawing/2014/main" xmlns="" id="{6FE91A59-D6B8-46D1-96D6-E03F9C08BE95}"/>
               </a:ext>
             </a:extLst>
           </p:cNvPr>
@@ -1831,7 +1853,7 @@
           <a:p>
             <a:fld id="{8E423C67-9D6A-4F85-BFC6-5090D8CF0AB4}" type="datetimeFigureOut">
               <a:rPr lang="en-US" smtClean="0"/>
-              <a:t>12/6/2017</a:t>
+              <a:t>2017-12-06</a:t>
             </a:fld>
             <a:endParaRPr lang="en-US"/>
           </a:p>
@@ -1842,7 +1864,7 @@
           <p:cNvPr id="8" name="Footer Placeholder 7">
             <a:extLst>
               <a:ext uri="{FF2B5EF4-FFF2-40B4-BE49-F238E27FC236}">
-                <a16:creationId xmlns:a16="http://schemas.microsoft.com/office/drawing/2014/main" id="{63E8F402-F253-4598-9290-8DD314902561}"/>
+                <a16:creationId xmlns:a16="http://schemas.microsoft.com/office/drawing/2014/main" xmlns="" id="{63E8F402-F253-4598-9290-8DD314902561}"/>
               </a:ext>
             </a:extLst>
           </p:cNvPr>
@@ -1867,7 +1889,7 @@
           <p:cNvPr id="9" name="Slide Number Placeholder 8">
             <a:extLst>
               <a:ext uri="{FF2B5EF4-FFF2-40B4-BE49-F238E27FC236}">
-                <a16:creationId xmlns:a16="http://schemas.microsoft.com/office/drawing/2014/main" id="{C135391B-B762-4149-B674-68400B60C4CA}"/>
+                <a16:creationId xmlns:a16="http://schemas.microsoft.com/office/drawing/2014/main" xmlns="" id="{C135391B-B762-4149-B674-68400B60C4CA}"/>
               </a:ext>
             </a:extLst>
           </p:cNvPr>
@@ -1926,7 +1948,7 @@
           <p:cNvPr id="2" name="Title 1">
             <a:extLst>
               <a:ext uri="{FF2B5EF4-FFF2-40B4-BE49-F238E27FC236}">
-                <a16:creationId xmlns:a16="http://schemas.microsoft.com/office/drawing/2014/main" id="{FDCF8A4F-C9CB-46AD-BEA5-F3E02EF83621}"/>
+                <a16:creationId xmlns:a16="http://schemas.microsoft.com/office/drawing/2014/main" xmlns="" id="{FDCF8A4F-C9CB-46AD-BEA5-F3E02EF83621}"/>
               </a:ext>
             </a:extLst>
           </p:cNvPr>
@@ -1954,7 +1976,7 @@
           <p:cNvPr id="3" name="Date Placeholder 2">
             <a:extLst>
               <a:ext uri="{FF2B5EF4-FFF2-40B4-BE49-F238E27FC236}">
-                <a16:creationId xmlns:a16="http://schemas.microsoft.com/office/drawing/2014/main" id="{05105858-46BE-4B4B-AC76-1DE884F4261D}"/>
+                <a16:creationId xmlns:a16="http://schemas.microsoft.com/office/drawing/2014/main" xmlns="" id="{05105858-46BE-4B4B-AC76-1DE884F4261D}"/>
               </a:ext>
             </a:extLst>
           </p:cNvPr>
@@ -1972,7 +1994,7 @@
           <a:p>
             <a:fld id="{8E423C67-9D6A-4F85-BFC6-5090D8CF0AB4}" type="datetimeFigureOut">
               <a:rPr lang="en-US" smtClean="0"/>
-              <a:t>12/6/2017</a:t>
+              <a:t>2017-12-06</a:t>
             </a:fld>
             <a:endParaRPr lang="en-US"/>
           </a:p>
@@ -1983,7 +2005,7 @@
           <p:cNvPr id="4" name="Footer Placeholder 3">
             <a:extLst>
               <a:ext uri="{FF2B5EF4-FFF2-40B4-BE49-F238E27FC236}">
-                <a16:creationId xmlns:a16="http://schemas.microsoft.com/office/drawing/2014/main" id="{81209C3A-40B3-447C-898C-0C4F7537036B}"/>
+                <a16:creationId xmlns:a16="http://schemas.microsoft.com/office/drawing/2014/main" xmlns="" id="{81209C3A-40B3-447C-898C-0C4F7537036B}"/>
               </a:ext>
             </a:extLst>
           </p:cNvPr>
@@ -2008,7 +2030,7 @@
           <p:cNvPr id="5" name="Slide Number Placeholder 4">
             <a:extLst>
               <a:ext uri="{FF2B5EF4-FFF2-40B4-BE49-F238E27FC236}">
-                <a16:creationId xmlns:a16="http://schemas.microsoft.com/office/drawing/2014/main" id="{E66D6103-6FAC-44FE-AFAC-35DCA54A5841}"/>
+                <a16:creationId xmlns:a16="http://schemas.microsoft.com/office/drawing/2014/main" xmlns="" id="{E66D6103-6FAC-44FE-AFAC-35DCA54A5841}"/>
               </a:ext>
             </a:extLst>
           </p:cNvPr>
@@ -2067,7 +2089,7 @@
           <p:cNvPr id="2" name="Date Placeholder 1">
             <a:extLst>
               <a:ext uri="{FF2B5EF4-FFF2-40B4-BE49-F238E27FC236}">
-                <a16:creationId xmlns:a16="http://schemas.microsoft.com/office/drawing/2014/main" id="{484A2280-0F1E-4438-B0D1-87FD5872FA23}"/>
+                <a16:creationId xmlns:a16="http://schemas.microsoft.com/office/drawing/2014/main" xmlns="" id="{484A2280-0F1E-4438-B0D1-87FD5872FA23}"/>
               </a:ext>
             </a:extLst>
           </p:cNvPr>
@@ -2085,7 +2107,7 @@
           <a:p>
             <a:fld id="{8E423C67-9D6A-4F85-BFC6-5090D8CF0AB4}" type="datetimeFigureOut">
               <a:rPr lang="en-US" smtClean="0"/>
-              <a:t>12/6/2017</a:t>
+              <a:t>2017-12-06</a:t>
             </a:fld>
             <a:endParaRPr lang="en-US"/>
           </a:p>
@@ -2096,7 +2118,7 @@
           <p:cNvPr id="3" name="Footer Placeholder 2">
             <a:extLst>
               <a:ext uri="{FF2B5EF4-FFF2-40B4-BE49-F238E27FC236}">
-                <a16:creationId xmlns:a16="http://schemas.microsoft.com/office/drawing/2014/main" id="{85054AD8-7FEF-49D9-A2DE-A9C7C3ECCA5F}"/>
+                <a16:creationId xmlns:a16="http://schemas.microsoft.com/office/drawing/2014/main" xmlns="" id="{85054AD8-7FEF-49D9-A2DE-A9C7C3ECCA5F}"/>
               </a:ext>
             </a:extLst>
           </p:cNvPr>
@@ -2121,7 +2143,7 @@
           <p:cNvPr id="4" name="Slide Number Placeholder 3">
             <a:extLst>
               <a:ext uri="{FF2B5EF4-FFF2-40B4-BE49-F238E27FC236}">
-                <a16:creationId xmlns:a16="http://schemas.microsoft.com/office/drawing/2014/main" id="{0B86E405-A339-4A02-AC4C-7EA2A1561C3B}"/>
+                <a16:creationId xmlns:a16="http://schemas.microsoft.com/office/drawing/2014/main" xmlns="" id="{0B86E405-A339-4A02-AC4C-7EA2A1561C3B}"/>
               </a:ext>
             </a:extLst>
           </p:cNvPr>
@@ -2180,7 +2202,7 @@
           <p:cNvPr id="2" name="Title 1">
             <a:extLst>
               <a:ext uri="{FF2B5EF4-FFF2-40B4-BE49-F238E27FC236}">
-                <a16:creationId xmlns:a16="http://schemas.microsoft.com/office/drawing/2014/main" id="{09A9CBF2-3028-467D-9303-C06F7A0D5655}"/>
+                <a16:creationId xmlns:a16="http://schemas.microsoft.com/office/drawing/2014/main" xmlns="" id="{09A9CBF2-3028-467D-9303-C06F7A0D5655}"/>
               </a:ext>
             </a:extLst>
           </p:cNvPr>
@@ -2217,7 +2239,7 @@
           <p:cNvPr id="3" name="Content Placeholder 2">
             <a:extLst>
               <a:ext uri="{FF2B5EF4-FFF2-40B4-BE49-F238E27FC236}">
-                <a16:creationId xmlns:a16="http://schemas.microsoft.com/office/drawing/2014/main" id="{B6918BF1-0F45-4A97-AA9E-A6B36E09FF9A}"/>
+                <a16:creationId xmlns:a16="http://schemas.microsoft.com/office/drawing/2014/main" xmlns="" id="{B6918BF1-0F45-4A97-AA9E-A6B36E09FF9A}"/>
               </a:ext>
             </a:extLst>
           </p:cNvPr>
@@ -2307,7 +2329,7 @@
           <p:cNvPr id="4" name="Text Placeholder 3">
             <a:extLst>
               <a:ext uri="{FF2B5EF4-FFF2-40B4-BE49-F238E27FC236}">
-                <a16:creationId xmlns:a16="http://schemas.microsoft.com/office/drawing/2014/main" id="{356FB0A4-9494-4382-A0FD-07C795DA06C8}"/>
+                <a16:creationId xmlns:a16="http://schemas.microsoft.com/office/drawing/2014/main" xmlns="" id="{356FB0A4-9494-4382-A0FD-07C795DA06C8}"/>
               </a:ext>
             </a:extLst>
           </p:cNvPr>
@@ -2378,7 +2400,7 @@
           <p:cNvPr id="5" name="Date Placeholder 4">
             <a:extLst>
               <a:ext uri="{FF2B5EF4-FFF2-40B4-BE49-F238E27FC236}">
-                <a16:creationId xmlns:a16="http://schemas.microsoft.com/office/drawing/2014/main" id="{B7282179-4D0B-4BEA-AEF3-0C82FFAF64C8}"/>
+                <a16:creationId xmlns:a16="http://schemas.microsoft.com/office/drawing/2014/main" xmlns="" id="{B7282179-4D0B-4BEA-AEF3-0C82FFAF64C8}"/>
               </a:ext>
             </a:extLst>
           </p:cNvPr>
@@ -2396,7 +2418,7 @@
           <a:p>
             <a:fld id="{8E423C67-9D6A-4F85-BFC6-5090D8CF0AB4}" type="datetimeFigureOut">
               <a:rPr lang="en-US" smtClean="0"/>
-              <a:t>12/6/2017</a:t>
+              <a:t>2017-12-06</a:t>
             </a:fld>
             <a:endParaRPr lang="en-US"/>
           </a:p>
@@ -2407,7 +2429,7 @@
           <p:cNvPr id="6" name="Footer Placeholder 5">
             <a:extLst>
               <a:ext uri="{FF2B5EF4-FFF2-40B4-BE49-F238E27FC236}">
-                <a16:creationId xmlns:a16="http://schemas.microsoft.com/office/drawing/2014/main" id="{46E4F919-BC65-4B8C-B6A4-6B75D65BAED8}"/>
+                <a16:creationId xmlns:a16="http://schemas.microsoft.com/office/drawing/2014/main" xmlns="" id="{46E4F919-BC65-4B8C-B6A4-6B75D65BAED8}"/>
               </a:ext>
             </a:extLst>
           </p:cNvPr>
@@ -2432,7 +2454,7 @@
           <p:cNvPr id="7" name="Slide Number Placeholder 6">
             <a:extLst>
               <a:ext uri="{FF2B5EF4-FFF2-40B4-BE49-F238E27FC236}">
-                <a16:creationId xmlns:a16="http://schemas.microsoft.com/office/drawing/2014/main" id="{CE4FA66B-0CC2-43E6-AB35-73A52D826B4E}"/>
+                <a16:creationId xmlns:a16="http://schemas.microsoft.com/office/drawing/2014/main" xmlns="" id="{CE4FA66B-0CC2-43E6-AB35-73A52D826B4E}"/>
               </a:ext>
             </a:extLst>
           </p:cNvPr>
@@ -2491,7 +2513,7 @@
           <p:cNvPr id="2" name="Title 1">
             <a:extLst>
               <a:ext uri="{FF2B5EF4-FFF2-40B4-BE49-F238E27FC236}">
-                <a16:creationId xmlns:a16="http://schemas.microsoft.com/office/drawing/2014/main" id="{949C5467-9872-42A4-9D20-EE8539A5EFB8}"/>
+                <a16:creationId xmlns:a16="http://schemas.microsoft.com/office/drawing/2014/main" xmlns="" id="{949C5467-9872-42A4-9D20-EE8539A5EFB8}"/>
               </a:ext>
             </a:extLst>
           </p:cNvPr>
@@ -2528,7 +2550,7 @@
           <p:cNvPr id="3" name="Picture Placeholder 2">
             <a:extLst>
               <a:ext uri="{FF2B5EF4-FFF2-40B4-BE49-F238E27FC236}">
-                <a16:creationId xmlns:a16="http://schemas.microsoft.com/office/drawing/2014/main" id="{CD2BD776-EB44-4D47-B39F-0246DE1B595B}"/>
+                <a16:creationId xmlns:a16="http://schemas.microsoft.com/office/drawing/2014/main" xmlns="" id="{CD2BD776-EB44-4D47-B39F-0246DE1B595B}"/>
               </a:ext>
             </a:extLst>
           </p:cNvPr>
@@ -2595,7 +2617,7 @@
           <p:cNvPr id="4" name="Text Placeholder 3">
             <a:extLst>
               <a:ext uri="{FF2B5EF4-FFF2-40B4-BE49-F238E27FC236}">
-                <a16:creationId xmlns:a16="http://schemas.microsoft.com/office/drawing/2014/main" id="{59ECD3CF-02E8-4D20-865E-02BA42A49532}"/>
+                <a16:creationId xmlns:a16="http://schemas.microsoft.com/office/drawing/2014/main" xmlns="" id="{59ECD3CF-02E8-4D20-865E-02BA42A49532}"/>
               </a:ext>
             </a:extLst>
           </p:cNvPr>
@@ -2666,7 +2688,7 @@
           <p:cNvPr id="5" name="Date Placeholder 4">
             <a:extLst>
               <a:ext uri="{FF2B5EF4-FFF2-40B4-BE49-F238E27FC236}">
-                <a16:creationId xmlns:a16="http://schemas.microsoft.com/office/drawing/2014/main" id="{E6B2109E-2F31-4DE3-8CEA-DE3C86F9A38C}"/>
+                <a16:creationId xmlns:a16="http://schemas.microsoft.com/office/drawing/2014/main" xmlns="" id="{E6B2109E-2F31-4DE3-8CEA-DE3C86F9A38C}"/>
               </a:ext>
             </a:extLst>
           </p:cNvPr>
@@ -2684,7 +2706,7 @@
           <a:p>
             <a:fld id="{8E423C67-9D6A-4F85-BFC6-5090D8CF0AB4}" type="datetimeFigureOut">
               <a:rPr lang="en-US" smtClean="0"/>
-              <a:t>12/6/2017</a:t>
+              <a:t>2017-12-06</a:t>
             </a:fld>
             <a:endParaRPr lang="en-US"/>
           </a:p>
@@ -2695,7 +2717,7 @@
           <p:cNvPr id="6" name="Footer Placeholder 5">
             <a:extLst>
               <a:ext uri="{FF2B5EF4-FFF2-40B4-BE49-F238E27FC236}">
-                <a16:creationId xmlns:a16="http://schemas.microsoft.com/office/drawing/2014/main" id="{8B5CA5A2-D2B8-4ED5-9640-9392D1A7AA70}"/>
+                <a16:creationId xmlns:a16="http://schemas.microsoft.com/office/drawing/2014/main" xmlns="" id="{8B5CA5A2-D2B8-4ED5-9640-9392D1A7AA70}"/>
               </a:ext>
             </a:extLst>
           </p:cNvPr>
@@ -2720,7 +2742,7 @@
           <p:cNvPr id="7" name="Slide Number Placeholder 6">
             <a:extLst>
               <a:ext uri="{FF2B5EF4-FFF2-40B4-BE49-F238E27FC236}">
-                <a16:creationId xmlns:a16="http://schemas.microsoft.com/office/drawing/2014/main" id="{43ED3C46-81E8-41F2-9834-F18A983176A0}"/>
+                <a16:creationId xmlns:a16="http://schemas.microsoft.com/office/drawing/2014/main" xmlns="" id="{43ED3C46-81E8-41F2-9834-F18A983176A0}"/>
               </a:ext>
             </a:extLst>
           </p:cNvPr>
@@ -2761,9 +2783,12 @@
 <p:sldMaster xmlns:a="http://schemas.openxmlformats.org/drawingml/2006/main" xmlns:r="http://schemas.openxmlformats.org/officeDocument/2006/relationships" xmlns:p="http://schemas.openxmlformats.org/presentationml/2006/main">
   <p:cSld>
     <p:bg>
-      <p:bgRef idx="1001">
-        <a:schemeClr val="bg1"/>
-      </p:bgRef>
+      <p:bgPr>
+        <a:solidFill>
+          <a:srgbClr val="6FA397"/>
+        </a:solidFill>
+        <a:effectLst/>
+      </p:bgPr>
     </p:bg>
     <p:spTree>
       <p:nvGrpSpPr>
@@ -2784,7 +2809,7 @@
           <p:cNvPr id="2" name="Title Placeholder 1">
             <a:extLst>
               <a:ext uri="{FF2B5EF4-FFF2-40B4-BE49-F238E27FC236}">
-                <a16:creationId xmlns:a16="http://schemas.microsoft.com/office/drawing/2014/main" id="{C7AAF08E-4D85-40AA-9CBA-7DBD9AB4E5FB}"/>
+                <a16:creationId xmlns:a16="http://schemas.microsoft.com/office/drawing/2014/main" xmlns="" id="{C7AAF08E-4D85-40AA-9CBA-7DBD9AB4E5FB}"/>
               </a:ext>
             </a:extLst>
           </p:cNvPr>
@@ -2811,7 +2836,7 @@
           <a:lstStyle/>
           <a:p>
             <a:r>
-              <a:rPr lang="en-US"/>
+              <a:rPr lang="en-US" dirty="0"/>
               <a:t>Click to edit Master title style</a:t>
             </a:r>
           </a:p>
@@ -2822,7 +2847,7 @@
           <p:cNvPr id="3" name="Text Placeholder 2">
             <a:extLst>
               <a:ext uri="{FF2B5EF4-FFF2-40B4-BE49-F238E27FC236}">
-                <a16:creationId xmlns:a16="http://schemas.microsoft.com/office/drawing/2014/main" id="{C4C3D882-D2F6-4D90-961B-1743A27FEFF9}"/>
+                <a16:creationId xmlns:a16="http://schemas.microsoft.com/office/drawing/2014/main" xmlns="" id="{C4C3D882-D2F6-4D90-961B-1743A27FEFF9}"/>
               </a:ext>
             </a:extLst>
           </p:cNvPr>
@@ -2850,35 +2875,35 @@
           <a:p>
             <a:pPr lvl="0"/>
             <a:r>
-              <a:rPr lang="en-US"/>
+              <a:rPr lang="en-US" dirty="0"/>
               <a:t>Edit Master text styles</a:t>
             </a:r>
           </a:p>
           <a:p>
             <a:pPr lvl="1"/>
             <a:r>
-              <a:rPr lang="en-US"/>
+              <a:rPr lang="en-US" dirty="0"/>
               <a:t>Second level</a:t>
             </a:r>
           </a:p>
           <a:p>
             <a:pPr lvl="2"/>
             <a:r>
-              <a:rPr lang="en-US"/>
+              <a:rPr lang="en-US" dirty="0"/>
               <a:t>Third level</a:t>
             </a:r>
           </a:p>
           <a:p>
             <a:pPr lvl="3"/>
             <a:r>
-              <a:rPr lang="en-US"/>
+              <a:rPr lang="en-US" dirty="0"/>
               <a:t>Fourth level</a:t>
             </a:r>
           </a:p>
           <a:p>
             <a:pPr lvl="4"/>
             <a:r>
-              <a:rPr lang="en-US"/>
+              <a:rPr lang="en-US" dirty="0"/>
               <a:t>Fifth level</a:t>
             </a:r>
           </a:p>
@@ -2889,7 +2914,7 @@
           <p:cNvPr id="4" name="Date Placeholder 3">
             <a:extLst>
               <a:ext uri="{FF2B5EF4-FFF2-40B4-BE49-F238E27FC236}">
-                <a16:creationId xmlns:a16="http://schemas.microsoft.com/office/drawing/2014/main" id="{52C7BF11-732D-490D-B016-B70BC5215D7F}"/>
+                <a16:creationId xmlns:a16="http://schemas.microsoft.com/office/drawing/2014/main" xmlns="" id="{52C7BF11-732D-490D-B016-B70BC5215D7F}"/>
               </a:ext>
             </a:extLst>
           </p:cNvPr>
@@ -2925,7 +2950,7 @@
           <a:p>
             <a:fld id="{8E423C67-9D6A-4F85-BFC6-5090D8CF0AB4}" type="datetimeFigureOut">
               <a:rPr lang="en-US" smtClean="0"/>
-              <a:t>12/6/2017</a:t>
+              <a:t>2017-12-06</a:t>
             </a:fld>
             <a:endParaRPr lang="en-US"/>
           </a:p>
@@ -2936,7 +2961,7 @@
           <p:cNvPr id="5" name="Footer Placeholder 4">
             <a:extLst>
               <a:ext uri="{FF2B5EF4-FFF2-40B4-BE49-F238E27FC236}">
-                <a16:creationId xmlns:a16="http://schemas.microsoft.com/office/drawing/2014/main" id="{90F6EE10-A6BA-4959-8406-FFA61D7A2FD4}"/>
+                <a16:creationId xmlns:a16="http://schemas.microsoft.com/office/drawing/2014/main" xmlns="" id="{90F6EE10-A6BA-4959-8406-FFA61D7A2FD4}"/>
               </a:ext>
             </a:extLst>
           </p:cNvPr>
@@ -2979,7 +3004,7 @@
           <p:cNvPr id="6" name="Slide Number Placeholder 5">
             <a:extLst>
               <a:ext uri="{FF2B5EF4-FFF2-40B4-BE49-F238E27FC236}">
-                <a16:creationId xmlns:a16="http://schemas.microsoft.com/office/drawing/2014/main" id="{E9E7E0F3-F268-4405-929D-FE16B32E5849}"/>
+                <a16:creationId xmlns:a16="http://schemas.microsoft.com/office/drawing/2014/main" xmlns="" id="{E9E7E0F3-F268-4405-929D-FE16B32E5849}"/>
               </a:ext>
             </a:extLst>
           </p:cNvPr>
@@ -3042,6 +3067,13 @@
     <p:sldLayoutId id="2147483658" r:id="rId10"/>
     <p:sldLayoutId id="2147483659" r:id="rId11"/>
   </p:sldLayoutIdLst>
+  <p:timing>
+    <p:tnLst>
+      <p:par>
+        <p:cTn id="1" dur="indefinite" restart="never" nodeType="tmRoot"/>
+      </p:par>
+    </p:tnLst>
+  </p:timing>
   <p:txStyles>
     <p:titleStyle>
       <a:lvl1pPr algn="l" defTabSz="914400" rtl="0" eaLnBrk="1" latinLnBrk="0" hangingPunct="1">
@@ -3054,9 +3086,9 @@
         <a:buNone/>
         <a:defRPr sz="4400" kern="1200">
           <a:solidFill>
-            <a:schemeClr val="tx1"/>
+            <a:srgbClr val="824040"/>
           </a:solidFill>
-          <a:latin typeface="+mj-lt"/>
+          <a:latin typeface="Rockwell" panose="02060603020205020403" pitchFamily="18" charset="0"/>
           <a:ea typeface="+mj-ea"/>
           <a:cs typeface="+mj-cs"/>
         </a:defRPr>
@@ -3074,9 +3106,9 @@
         <a:buChar char="•"/>
         <a:defRPr sz="2800" kern="1200">
           <a:solidFill>
-            <a:schemeClr val="tx1"/>
+            <a:srgbClr val="824040"/>
           </a:solidFill>
-          <a:latin typeface="+mn-lt"/>
+          <a:latin typeface="Rockwell" panose="02060603020205020403" pitchFamily="18" charset="0"/>
           <a:ea typeface="+mn-ea"/>
           <a:cs typeface="+mn-cs"/>
         </a:defRPr>
@@ -3092,9 +3124,9 @@
         <a:buChar char="•"/>
         <a:defRPr sz="2400" kern="1200">
           <a:solidFill>
-            <a:schemeClr val="tx1"/>
+            <a:srgbClr val="824040"/>
           </a:solidFill>
-          <a:latin typeface="+mn-lt"/>
+          <a:latin typeface="Rockwell" panose="02060603020205020403" pitchFamily="18" charset="0"/>
           <a:ea typeface="+mn-ea"/>
           <a:cs typeface="+mn-cs"/>
         </a:defRPr>
@@ -3110,9 +3142,9 @@
         <a:buChar char="•"/>
         <a:defRPr sz="2000" kern="1200">
           <a:solidFill>
-            <a:schemeClr val="tx1"/>
+            <a:srgbClr val="824040"/>
           </a:solidFill>
-          <a:latin typeface="+mn-lt"/>
+          <a:latin typeface="Rockwell" panose="02060603020205020403" pitchFamily="18" charset="0"/>
           <a:ea typeface="+mn-ea"/>
           <a:cs typeface="+mn-cs"/>
         </a:defRPr>
@@ -3128,9 +3160,9 @@
         <a:buChar char="•"/>
         <a:defRPr sz="1800" kern="1200">
           <a:solidFill>
-            <a:schemeClr val="tx1"/>
+            <a:srgbClr val="824040"/>
           </a:solidFill>
-          <a:latin typeface="+mn-lt"/>
+          <a:latin typeface="Rockwell" panose="02060603020205020403" pitchFamily="18" charset="0"/>
           <a:ea typeface="+mn-ea"/>
           <a:cs typeface="+mn-cs"/>
         </a:defRPr>
@@ -3146,9 +3178,9 @@
         <a:buChar char="•"/>
         <a:defRPr sz="1800" kern="1200">
           <a:solidFill>
-            <a:schemeClr val="tx1"/>
+            <a:srgbClr val="824040"/>
           </a:solidFill>
-          <a:latin typeface="+mn-lt"/>
+          <a:latin typeface="Rockwell" panose="02060603020205020403" pitchFamily="18" charset="0"/>
           <a:ea typeface="+mn-ea"/>
           <a:cs typeface="+mn-cs"/>
         </a:defRPr>
@@ -3347,7 +3379,7 @@
           <p:cNvPr id="2" name="Title 1">
             <a:extLst>
               <a:ext uri="{FF2B5EF4-FFF2-40B4-BE49-F238E27FC236}">
-                <a16:creationId xmlns:a16="http://schemas.microsoft.com/office/drawing/2014/main" id="{1126EA88-A9E3-4871-8DDA-4EE8195A9D29}"/>
+                <a16:creationId xmlns:a16="http://schemas.microsoft.com/office/drawing/2014/main" xmlns="" id="{1126EA88-A9E3-4871-8DDA-4EE8195A9D29}"/>
               </a:ext>
             </a:extLst>
           </p:cNvPr>
@@ -3358,15 +3390,30 @@
             <p:ph type="ctrTitle"/>
           </p:nvPr>
         </p:nvSpPr>
-        <p:spPr/>
-        <p:txBody>
-          <a:bodyPr/>
-          <a:lstStyle/>
-          <a:p>
-            <a:r>
-              <a:rPr lang="en-US" dirty="0"/>
-              <a:t>NOTIFY ME</a:t>
-            </a:r>
+        <p:spPr>
+          <a:xfrm>
+            <a:off x="3262184" y="2544890"/>
+            <a:ext cx="5667632" cy="1600844"/>
+          </a:xfrm>
+          <a:solidFill>
+            <a:srgbClr val="F5F5F5"/>
+          </a:solidFill>
+        </p:spPr>
+        <p:txBody>
+          <a:bodyPr>
+            <a:normAutofit/>
+          </a:bodyPr>
+          <a:lstStyle/>
+          <a:p>
+            <a:r>
+              <a:rPr lang="en-US" sz="9600" b="1" dirty="0">
+                <a:latin typeface="Brush Script MT" panose="03060802040406070304" pitchFamily="66" charset="0"/>
+              </a:rPr>
+              <a:t>NotifyMe!</a:t>
+            </a:r>
+            <a:endParaRPr lang="en-US" sz="9600" b="1" dirty="0">
+              <a:latin typeface="Brush Script MT" panose="03060802040406070304" pitchFamily="66" charset="0"/>
+            </a:endParaRPr>
           </a:p>
         </p:txBody>
       </p:sp>
@@ -3375,7 +3422,7 @@
           <p:cNvPr id="3" name="Subtitle 2">
             <a:extLst>
               <a:ext uri="{FF2B5EF4-FFF2-40B4-BE49-F238E27FC236}">
-                <a16:creationId xmlns:a16="http://schemas.microsoft.com/office/drawing/2014/main" id="{EF3D0F4F-0963-4211-A80D-97B3ABEE1F01}"/>
+                <a16:creationId xmlns:a16="http://schemas.microsoft.com/office/drawing/2014/main" xmlns="" id="{EF3D0F4F-0963-4211-A80D-97B3ABEE1F01}"/>
               </a:ext>
             </a:extLst>
           </p:cNvPr>
@@ -3386,28 +3433,52 @@
             <p:ph type="subTitle" idx="1"/>
           </p:nvPr>
         </p:nvSpPr>
-        <p:spPr/>
-        <p:txBody>
-          <a:bodyPr/>
-          <a:lstStyle/>
-          <a:p>
-            <a:r>
-              <a:rPr lang="en-US" dirty="0"/>
-              <a:t>- By Matthew Manning and </a:t>
-            </a:r>
-            <a:r>
-              <a:rPr lang="en-US" dirty="0" err="1"/>
+        <p:spPr>
+          <a:xfrm>
+            <a:off x="2755557" y="4386691"/>
+            <a:ext cx="6680886" cy="556011"/>
+          </a:xfrm>
+          <a:noFill/>
+        </p:spPr>
+        <p:txBody>
+          <a:bodyPr>
+            <a:normAutofit/>
+          </a:bodyPr>
+          <a:lstStyle/>
+          <a:p>
+            <a:r>
+              <a:rPr lang="en-US" sz="2800" dirty="0" smtClean="0">
+                <a:latin typeface="Rockwell" panose="02060603020205020403" pitchFamily="18" charset="0"/>
+              </a:rPr>
+              <a:t>Matthew </a:t>
+            </a:r>
+            <a:r>
+              <a:rPr lang="en-US" sz="2800" dirty="0">
+                <a:latin typeface="Rockwell" panose="02060603020205020403" pitchFamily="18" charset="0"/>
+              </a:rPr>
+              <a:t>Manning and </a:t>
+            </a:r>
+            <a:r>
+              <a:rPr lang="en-US" sz="2800" dirty="0" err="1">
+                <a:latin typeface="Rockwell" panose="02060603020205020403" pitchFamily="18" charset="0"/>
+              </a:rPr>
               <a:t>Suveni</a:t>
             </a:r>
             <a:r>
-              <a:rPr lang="en-US" dirty="0"/>
+              <a:rPr lang="en-US" sz="2800" dirty="0">
+                <a:latin typeface="Rockwell" panose="02060603020205020403" pitchFamily="18" charset="0"/>
+              </a:rPr>
               <a:t> </a:t>
             </a:r>
             <a:r>
-              <a:rPr lang="en-US" dirty="0" err="1"/>
+              <a:rPr lang="en-US" sz="2800" dirty="0" err="1">
+                <a:latin typeface="Rockwell" panose="02060603020205020403" pitchFamily="18" charset="0"/>
+              </a:rPr>
               <a:t>Tangnu</a:t>
             </a:r>
-            <a:endParaRPr lang="en-US" dirty="0"/>
+            <a:endParaRPr lang="en-US" sz="2800" dirty="0">
+              <a:latin typeface="Rockwell" panose="02060603020205020403" pitchFamily="18" charset="0"/>
+            </a:endParaRPr>
           </a:p>
         </p:txBody>
       </p:sp>
@@ -3421,6 +3492,13 @@
   <p:clrMapOvr>
     <a:masterClrMapping/>
   </p:clrMapOvr>
+  <p:timing>
+    <p:tnLst>
+      <p:par>
+        <p:cTn id="1" dur="indefinite" restart="never" nodeType="tmRoot"/>
+      </p:par>
+    </p:tnLst>
+  </p:timing>
 </p:sld>
 </file>
 
@@ -3446,7 +3524,7 @@
           <p:cNvPr id="2" name="Title 1">
             <a:extLst>
               <a:ext uri="{FF2B5EF4-FFF2-40B4-BE49-F238E27FC236}">
-                <a16:creationId xmlns:a16="http://schemas.microsoft.com/office/drawing/2014/main" id="{259D0B7C-1D18-4B9B-9686-41CD01222471}"/>
+                <a16:creationId xmlns:a16="http://schemas.microsoft.com/office/drawing/2014/main" xmlns="" id="{A0EFC9D0-35F5-483E-86FE-4B2083D4CCE8}"/>
               </a:ext>
             </a:extLst>
           </p:cNvPr>
@@ -3462,101 +3540,111 @@
           <a:bodyPr/>
           <a:lstStyle/>
           <a:p>
+            <a:pPr algn="ctr"/>
+            <a:r>
+              <a:rPr lang="en-US" dirty="0" smtClean="0"/>
+              <a:t>The Tools We Used</a:t>
+            </a:r>
+            <a:endParaRPr lang="en-US" dirty="0"/>
+          </a:p>
+        </p:txBody>
+      </p:sp>
+      <p:sp>
+        <p:nvSpPr>
+          <p:cNvPr id="3" name="Content Placeholder 2">
+            <a:extLst>
+              <a:ext uri="{FF2B5EF4-FFF2-40B4-BE49-F238E27FC236}">
+                <a16:creationId xmlns:a16="http://schemas.microsoft.com/office/drawing/2014/main" xmlns="" id="{323EF7F1-8AC4-4144-AEE5-821E1DE879E1}"/>
+              </a:ext>
+            </a:extLst>
+          </p:cNvPr>
+          <p:cNvSpPr>
+            <a:spLocks noGrp="1"/>
+          </p:cNvSpPr>
+          <p:nvPr>
+            <p:ph idx="1"/>
+          </p:nvPr>
+        </p:nvSpPr>
+        <p:spPr/>
+        <p:txBody>
+          <a:bodyPr/>
+          <a:lstStyle/>
+          <a:p>
+            <a:r>
+              <a:rPr lang="en-US" dirty="0" smtClean="0"/>
+              <a:t>XAMPP (Cross-platform, Apache, </a:t>
+            </a:r>
+            <a:r>
+              <a:rPr lang="en-US" dirty="0" err="1" smtClean="0"/>
+              <a:t>MariaDB</a:t>
+            </a:r>
+            <a:r>
+              <a:rPr lang="en-US" dirty="0" smtClean="0"/>
+              <a:t>, PHP, and Perl)</a:t>
+            </a:r>
+          </a:p>
+          <a:p>
+            <a:endParaRPr lang="en-US" dirty="0" smtClean="0"/>
+          </a:p>
+          <a:p>
+            <a:r>
+              <a:rPr lang="en-US" dirty="0" smtClean="0"/>
+              <a:t>Apache for Server</a:t>
+            </a:r>
+          </a:p>
+          <a:p>
+            <a:endParaRPr lang="en-US" dirty="0" smtClean="0"/>
+          </a:p>
+          <a:p>
+            <a:r>
+              <a:rPr lang="en-US" dirty="0" smtClean="0"/>
+              <a:t>HTML, MySQL, PHP, and CSS for the Website</a:t>
+            </a:r>
+          </a:p>
+          <a:p>
+            <a:endParaRPr lang="en-US" dirty="0"/>
+          </a:p>
+          <a:p>
+            <a:r>
+              <a:rPr lang="en-US" dirty="0" err="1" smtClean="0"/>
+              <a:t>PHPMyAdmin</a:t>
+            </a:r>
+            <a:r>
+              <a:rPr lang="en-US" dirty="0" smtClean="0"/>
+              <a:t> for Front-End </a:t>
+            </a:r>
             <a:r>
               <a:rPr lang="en-US" dirty="0"/>
-              <a:t>How – Tasks at hand</a:t>
-            </a:r>
-          </a:p>
-        </p:txBody>
-      </p:sp>
-      <p:sp>
-        <p:nvSpPr>
-          <p:cNvPr id="3" name="Content Placeholder 2">
-            <a:extLst>
-              <a:ext uri="{FF2B5EF4-FFF2-40B4-BE49-F238E27FC236}">
-                <a16:creationId xmlns:a16="http://schemas.microsoft.com/office/drawing/2014/main" id="{7171011C-A762-4A01-8962-0A7436AA633E}"/>
-              </a:ext>
-            </a:extLst>
-          </p:cNvPr>
-          <p:cNvSpPr>
-            <a:spLocks noGrp="1"/>
-          </p:cNvSpPr>
-          <p:nvPr>
-            <p:ph idx="1"/>
-          </p:nvPr>
-        </p:nvSpPr>
-        <p:spPr/>
-        <p:txBody>
-          <a:bodyPr/>
-          <a:lstStyle/>
-          <a:p>
-            <a:r>
-              <a:rPr lang="en-US" dirty="0">
-                <a:solidFill>
-                  <a:schemeClr val="bg2"/>
-                </a:solidFill>
-              </a:rPr>
-              <a:t>To let the user create an account.</a:t>
-            </a:r>
-          </a:p>
-          <a:p>
-            <a:r>
-              <a:rPr lang="en-US" dirty="0">
-                <a:solidFill>
-                  <a:schemeClr val="bg2"/>
-                </a:solidFill>
-              </a:rPr>
-              <a:t>To let user enter , delete or/and edit a URL .</a:t>
-            </a:r>
-          </a:p>
-          <a:p>
-            <a:r>
-              <a:rPr lang="en-US" dirty="0">
-                <a:solidFill>
-                  <a:schemeClr val="bg2"/>
-                </a:solidFill>
-              </a:rPr>
-              <a:t>Create a relational view of the database , with proper key – table relation to store user details and the URL details.</a:t>
-            </a:r>
-          </a:p>
-          <a:p>
-            <a:r>
-              <a:rPr lang="en-US" dirty="0">
-                <a:solidFill>
-                  <a:schemeClr val="bg2"/>
-                </a:solidFill>
-              </a:rPr>
-              <a:t>Scan through the saved Websites.</a:t>
-            </a:r>
-          </a:p>
-          <a:p>
-            <a:r>
-              <a:rPr lang="en-US" dirty="0">
-                <a:solidFill>
-                  <a:schemeClr val="bg2"/>
-                </a:solidFill>
-              </a:rPr>
-              <a:t>For the identified websites, update the database.</a:t>
-            </a:r>
-          </a:p>
-          <a:p>
-            <a:r>
-              <a:rPr lang="en-US" dirty="0"/>
-              <a:t>Send the email to the user , without spamming them.</a:t>
-            </a:r>
+              <a:t>D</a:t>
+            </a:r>
+            <a:r>
+              <a:rPr lang="en-US" dirty="0" smtClean="0"/>
+              <a:t>atabase GUI</a:t>
+            </a:r>
+            <a:endParaRPr lang="en-US" dirty="0"/>
+          </a:p>
+          <a:p>
+            <a:endParaRPr lang="en-US" dirty="0"/>
           </a:p>
         </p:txBody>
       </p:sp>
     </p:spTree>
     <p:extLst>
       <p:ext uri="{BB962C8B-B14F-4D97-AF65-F5344CB8AC3E}">
-        <p14:creationId xmlns:p14="http://schemas.microsoft.com/office/powerpoint/2010/main" val="794895920"/>
+        <p14:creationId xmlns:p14="http://schemas.microsoft.com/office/powerpoint/2010/main" val="1621738832"/>
       </p:ext>
     </p:extLst>
   </p:cSld>
   <p:clrMapOvr>
     <a:masterClrMapping/>
   </p:clrMapOvr>
+  <p:timing>
+    <p:tnLst>
+      <p:par>
+        <p:cTn id="1" dur="indefinite" restart="never" nodeType="tmRoot"/>
+      </p:par>
+    </p:tnLst>
+  </p:timing>
 </p:sld>
 </file>
 
@@ -3579,179 +3667,10 @@
       </p:grpSpPr>
       <p:sp>
         <p:nvSpPr>
-          <p:cNvPr id="2" name="Title 1">
-            <a:extLst>
-              <a:ext uri="{FF2B5EF4-FFF2-40B4-BE49-F238E27FC236}">
-                <a16:creationId xmlns:a16="http://schemas.microsoft.com/office/drawing/2014/main" id="{A0EFC9D0-35F5-483E-86FE-4B2083D4CCE8}"/>
-              </a:ext>
-            </a:extLst>
-          </p:cNvPr>
-          <p:cNvSpPr>
-            <a:spLocks noGrp="1"/>
-          </p:cNvSpPr>
-          <p:nvPr>
-            <p:ph type="title"/>
-          </p:nvPr>
-        </p:nvSpPr>
-        <p:spPr/>
-        <p:txBody>
-          <a:bodyPr/>
-          <a:lstStyle/>
-          <a:p>
-            <a:r>
-              <a:rPr lang="en-US" dirty="0"/>
-              <a:t>How</a:t>
-            </a:r>
-          </a:p>
-        </p:txBody>
-      </p:sp>
-      <p:sp>
-        <p:nvSpPr>
-          <p:cNvPr id="3" name="Content Placeholder 2">
-            <a:extLst>
-              <a:ext uri="{FF2B5EF4-FFF2-40B4-BE49-F238E27FC236}">
-                <a16:creationId xmlns:a16="http://schemas.microsoft.com/office/drawing/2014/main" id="{323EF7F1-8AC4-4144-AEE5-821E1DE879E1}"/>
-              </a:ext>
-            </a:extLst>
-          </p:cNvPr>
-          <p:cNvSpPr>
-            <a:spLocks noGrp="1"/>
-          </p:cNvSpPr>
-          <p:nvPr>
-            <p:ph idx="1"/>
-          </p:nvPr>
-        </p:nvSpPr>
-        <p:spPr/>
-        <p:txBody>
-          <a:bodyPr/>
-          <a:lstStyle/>
-          <a:p>
-            <a:r>
-              <a:rPr lang="en-US" dirty="0"/>
-              <a:t>For the development purpose , there has been an extensive use of </a:t>
-            </a:r>
-            <a:r>
-              <a:rPr lang="en-US" dirty="0" err="1"/>
-              <a:t>Php</a:t>
-            </a:r>
-            <a:r>
-              <a:rPr lang="en-US" dirty="0"/>
-              <a:t> and its tool.</a:t>
-            </a:r>
-          </a:p>
-          <a:p>
-            <a:r>
-              <a:rPr lang="en-US" dirty="0"/>
-              <a:t>To integrate the database need with the front – end ,  use of </a:t>
-            </a:r>
-            <a:r>
-              <a:rPr lang="en-US" dirty="0" err="1"/>
-              <a:t>PhpMyadmin</a:t>
-            </a:r>
-            <a:r>
-              <a:rPr lang="en-US" dirty="0"/>
-              <a:t> .</a:t>
-            </a:r>
-          </a:p>
-          <a:p>
-            <a:r>
-              <a:rPr lang="en-US" dirty="0" err="1"/>
-              <a:t>Xampp</a:t>
-            </a:r>
-            <a:r>
-              <a:rPr lang="en-US" dirty="0"/>
-              <a:t> helps us to connect with </a:t>
-            </a:r>
-            <a:r>
-              <a:rPr lang="en-US" dirty="0" err="1"/>
-              <a:t>PhpMyadmin</a:t>
-            </a:r>
-            <a:r>
-              <a:rPr lang="en-US" dirty="0"/>
-              <a:t> .</a:t>
-            </a:r>
-          </a:p>
-          <a:p>
-            <a:r>
-              <a:rPr lang="en-US" dirty="0" err="1"/>
-              <a:t>PhpMyadmin</a:t>
-            </a:r>
-            <a:r>
-              <a:rPr lang="en-US" dirty="0"/>
-              <a:t> uses </a:t>
-            </a:r>
-            <a:r>
-              <a:rPr lang="en-US" dirty="0" err="1"/>
-              <a:t>MySql</a:t>
-            </a:r>
-            <a:r>
-              <a:rPr lang="en-US" dirty="0"/>
-              <a:t> to handle the database .</a:t>
-            </a:r>
-          </a:p>
-          <a:p>
-            <a:r>
-              <a:rPr lang="en-US" dirty="0"/>
-              <a:t>The </a:t>
-            </a:r>
-            <a:r>
-              <a:rPr lang="en-US" dirty="0" err="1"/>
-              <a:t>MySql</a:t>
-            </a:r>
-            <a:r>
-              <a:rPr lang="en-US" dirty="0"/>
-              <a:t> database not only allows us to have more than 2 Databases , but allows us to have the utilities at the disposal.</a:t>
-            </a:r>
-          </a:p>
-          <a:p>
-            <a:endParaRPr lang="en-US" dirty="0"/>
-          </a:p>
-        </p:txBody>
-      </p:sp>
-    </p:spTree>
-    <p:extLst>
-      <p:ext uri="{BB962C8B-B14F-4D97-AF65-F5344CB8AC3E}">
-        <p14:creationId xmlns:p14="http://schemas.microsoft.com/office/powerpoint/2010/main" val="1621738832"/>
-      </p:ext>
-    </p:extLst>
-  </p:cSld>
-  <p:clrMapOvr>
-    <a:masterClrMapping/>
-  </p:clrMapOvr>
-</p:sld>
-</file>
-
-<file path=ppt/slides/slide12.xml><?xml version="1.0" encoding="utf-8"?>
-<p:sld xmlns:a="http://schemas.openxmlformats.org/drawingml/2006/main" xmlns:r="http://schemas.openxmlformats.org/officeDocument/2006/relationships" xmlns:p="http://schemas.openxmlformats.org/presentationml/2006/main">
-  <p:cSld>
-    <p:bg>
-      <p:bgPr>
-        <a:solidFill>
-          <a:schemeClr val="bg1"/>
-        </a:solidFill>
-        <a:effectLst/>
-      </p:bgPr>
-    </p:bg>
-    <p:spTree>
-      <p:nvGrpSpPr>
-        <p:cNvPr id="1" name=""/>
-        <p:cNvGrpSpPr/>
-        <p:nvPr/>
-      </p:nvGrpSpPr>
-      <p:grpSpPr>
-        <a:xfrm>
-          <a:off x="0" y="0"/>
-          <a:ext cx="0" cy="0"/>
-          <a:chOff x="0" y="0"/>
-          <a:chExt cx="0" cy="0"/>
-        </a:xfrm>
-      </p:grpSpPr>
-      <p:sp>
-        <p:nvSpPr>
           <p:cNvPr id="9" name="Rectangle 8">
             <a:extLst>
               <a:ext uri="{FF2B5EF4-FFF2-40B4-BE49-F238E27FC236}">
-                <a16:creationId xmlns:a16="http://schemas.microsoft.com/office/drawing/2014/main" id="{A4AC5506-6312-4701-8D3C-40187889A947}"/>
+                <a16:creationId xmlns:a16="http://schemas.microsoft.com/office/drawing/2014/main" xmlns="" id="{A4AC5506-6312-4701-8D3C-40187889A947}"/>
               </a:ext>
             </a:extLst>
           </p:cNvPr>
@@ -3761,7 +3680,7 @@
           <p:nvPr>
             <p:extLst>
               <p:ext uri="{386F3935-93C4-4BCD-93E2-E3B085C9AB24}">
-                <p16:designElem xmlns:p16="http://schemas.microsoft.com/office/powerpoint/2015/main" val="1"/>
+                <p16:designElem xmlns:p16="http://schemas.microsoft.com/office/powerpoint/2015/main" xmlns="" val="1"/>
               </p:ext>
             </p:extLst>
           </p:nvPr>
@@ -3813,7 +3732,7 @@
           <p:cNvPr id="4" name="Content Placeholder 3">
             <a:extLst>
               <a:ext uri="{FF2B5EF4-FFF2-40B4-BE49-F238E27FC236}">
-                <a16:creationId xmlns:a16="http://schemas.microsoft.com/office/drawing/2014/main" id="{8DB778F2-E62C-431C-AB5C-C95A5E966A35}"/>
+                <a16:creationId xmlns:a16="http://schemas.microsoft.com/office/drawing/2014/main" xmlns="" id="{8DB778F2-E62C-431C-AB5C-C95A5E966A35}"/>
               </a:ext>
             </a:extLst>
           </p:cNvPr>
@@ -3845,7 +3764,7 @@
           <p:cNvPr id="2" name="Title 1">
             <a:extLst>
               <a:ext uri="{FF2B5EF4-FFF2-40B4-BE49-F238E27FC236}">
-                <a16:creationId xmlns:a16="http://schemas.microsoft.com/office/drawing/2014/main" id="{99C8C8EE-289C-4B9D-AE46-EAE4F3CEB2EE}"/>
+                <a16:creationId xmlns:a16="http://schemas.microsoft.com/office/drawing/2014/main" xmlns="" id="{99C8C8EE-289C-4B9D-AE46-EAE4F3CEB2EE}"/>
               </a:ext>
             </a:extLst>
           </p:cNvPr>
@@ -3907,7 +3826,7 @@
           <p:cNvPr id="7" name="Straight Arrow Connector 6">
             <a:extLst>
               <a:ext uri="{FF2B5EF4-FFF2-40B4-BE49-F238E27FC236}">
-                <a16:creationId xmlns:a16="http://schemas.microsoft.com/office/drawing/2014/main" id="{32652254-0F18-49F4-97E2-7E449140EE5C}"/>
+                <a16:creationId xmlns:a16="http://schemas.microsoft.com/office/drawing/2014/main" xmlns="" id="{32652254-0F18-49F4-97E2-7E449140EE5C}"/>
               </a:ext>
             </a:extLst>
           </p:cNvPr>
@@ -3948,7 +3867,7 @@
           <p:cNvPr id="10" name="Straight Arrow Connector 9">
             <a:extLst>
               <a:ext uri="{FF2B5EF4-FFF2-40B4-BE49-F238E27FC236}">
-                <a16:creationId xmlns:a16="http://schemas.microsoft.com/office/drawing/2014/main" id="{56724CE6-E70B-4E1B-B8A3-8AB76323C576}"/>
+                <a16:creationId xmlns:a16="http://schemas.microsoft.com/office/drawing/2014/main" xmlns="" id="{56724CE6-E70B-4E1B-B8A3-8AB76323C576}"/>
               </a:ext>
             </a:extLst>
           </p:cNvPr>
@@ -3989,7 +3908,7 @@
           <p:cNvPr id="13" name="Straight Arrow Connector 12">
             <a:extLst>
               <a:ext uri="{FF2B5EF4-FFF2-40B4-BE49-F238E27FC236}">
-                <a16:creationId xmlns:a16="http://schemas.microsoft.com/office/drawing/2014/main" id="{26E3BA7C-8B5C-483D-A705-96552F0BEE06}"/>
+                <a16:creationId xmlns:a16="http://schemas.microsoft.com/office/drawing/2014/main" xmlns="" id="{26E3BA7C-8B5C-483D-A705-96552F0BEE06}"/>
               </a:ext>
             </a:extLst>
           </p:cNvPr>
@@ -4030,7 +3949,7 @@
           <p:cNvPr id="15" name="Straight Arrow Connector 14">
             <a:extLst>
               <a:ext uri="{FF2B5EF4-FFF2-40B4-BE49-F238E27FC236}">
-                <a16:creationId xmlns:a16="http://schemas.microsoft.com/office/drawing/2014/main" id="{05C11018-9C22-4371-BEDE-2B0C0B415095}"/>
+                <a16:creationId xmlns:a16="http://schemas.microsoft.com/office/drawing/2014/main" xmlns="" id="{05C11018-9C22-4371-BEDE-2B0C0B415095}"/>
               </a:ext>
             </a:extLst>
           </p:cNvPr>
@@ -4071,7 +3990,7 @@
           <p:cNvPr id="26" name="Straight Arrow Connector 25">
             <a:extLst>
               <a:ext uri="{FF2B5EF4-FFF2-40B4-BE49-F238E27FC236}">
-                <a16:creationId xmlns:a16="http://schemas.microsoft.com/office/drawing/2014/main" id="{B51B42E7-DA54-4898-A1E8-71D8E36299FE}"/>
+                <a16:creationId xmlns:a16="http://schemas.microsoft.com/office/drawing/2014/main" xmlns="" id="{B51B42E7-DA54-4898-A1E8-71D8E36299FE}"/>
               </a:ext>
             </a:extLst>
           </p:cNvPr>
@@ -4110,7 +4029,7 @@
           <p:cNvPr id="27" name="Straight Arrow Connector 26">
             <a:extLst>
               <a:ext uri="{FF2B5EF4-FFF2-40B4-BE49-F238E27FC236}">
-                <a16:creationId xmlns:a16="http://schemas.microsoft.com/office/drawing/2014/main" id="{369BE940-CEE1-4F65-A4F2-717A58F882CE}"/>
+                <a16:creationId xmlns:a16="http://schemas.microsoft.com/office/drawing/2014/main" xmlns="" id="{369BE940-CEE1-4F65-A4F2-717A58F882CE}"/>
               </a:ext>
             </a:extLst>
           </p:cNvPr>
@@ -4154,20 +4073,19 @@
   <p:clrMapOvr>
     <a:masterClrMapping/>
   </p:clrMapOvr>
+  <p:timing>
+    <p:tnLst>
+      <p:par>
+        <p:cTn id="1" dur="indefinite" restart="never" nodeType="tmRoot"/>
+      </p:par>
+    </p:tnLst>
+  </p:timing>
 </p:sld>
 </file>
 
-<file path=ppt/slides/slide13.xml><?xml version="1.0" encoding="utf-8"?>
+<file path=ppt/slides/slide12.xml><?xml version="1.0" encoding="utf-8"?>
 <p:sld xmlns:a="http://schemas.openxmlformats.org/drawingml/2006/main" xmlns:r="http://schemas.openxmlformats.org/officeDocument/2006/relationships" xmlns:p="http://schemas.openxmlformats.org/presentationml/2006/main">
   <p:cSld>
-    <p:bg>
-      <p:bgPr>
-        <a:solidFill>
-          <a:schemeClr val="bg1"/>
-        </a:solidFill>
-        <a:effectLst/>
-      </p:bgPr>
-    </p:bg>
     <p:spTree>
       <p:nvGrpSpPr>
         <p:cNvPr id="1" name=""/>
@@ -4187,7 +4105,7 @@
           <p:cNvPr id="4" name="Picture 3">
             <a:extLst>
               <a:ext uri="{FF2B5EF4-FFF2-40B4-BE49-F238E27FC236}">
-                <a16:creationId xmlns:a16="http://schemas.microsoft.com/office/drawing/2014/main" id="{D63519C0-C8D9-4341-ADE9-3CD28E6E648E}"/>
+                <a16:creationId xmlns:a16="http://schemas.microsoft.com/office/drawing/2014/main" xmlns="" id="{D63519C0-C8D9-4341-ADE9-3CD28E6E648E}"/>
               </a:ext>
             </a:extLst>
           </p:cNvPr>
@@ -4217,7 +4135,7 @@
           <p:cNvPr id="2" name="Title 1">
             <a:extLst>
               <a:ext uri="{FF2B5EF4-FFF2-40B4-BE49-F238E27FC236}">
-                <a16:creationId xmlns:a16="http://schemas.microsoft.com/office/drawing/2014/main" id="{0394369D-565A-471B-B3F3-561CF390DFF5}"/>
+                <a16:creationId xmlns:a16="http://schemas.microsoft.com/office/drawing/2014/main" xmlns="" id="{0394369D-565A-471B-B3F3-561CF390DFF5}"/>
               </a:ext>
             </a:extLst>
           </p:cNvPr>
@@ -4249,7 +4167,7 @@
           <p:cNvPr id="3" name="Content Placeholder 2">
             <a:extLst>
               <a:ext uri="{FF2B5EF4-FFF2-40B4-BE49-F238E27FC236}">
-                <a16:creationId xmlns:a16="http://schemas.microsoft.com/office/drawing/2014/main" id="{5EAFF9BB-23B6-4817-86BB-F6DA8A9676FA}"/>
+                <a16:creationId xmlns:a16="http://schemas.microsoft.com/office/drawing/2014/main" xmlns="" id="{5EAFF9BB-23B6-4817-86BB-F6DA8A9676FA}"/>
               </a:ext>
             </a:extLst>
           </p:cNvPr>
@@ -4281,7 +4199,7 @@
           <p:cNvPr id="6" name="Straight Arrow Connector 5">
             <a:extLst>
               <a:ext uri="{FF2B5EF4-FFF2-40B4-BE49-F238E27FC236}">
-                <a16:creationId xmlns:a16="http://schemas.microsoft.com/office/drawing/2014/main" id="{25D029F9-3DC8-4672-9001-1D3D9D0E8785}"/>
+                <a16:creationId xmlns:a16="http://schemas.microsoft.com/office/drawing/2014/main" xmlns="" id="{25D029F9-3DC8-4672-9001-1D3D9D0E8785}"/>
               </a:ext>
             </a:extLst>
           </p:cNvPr>
@@ -4322,7 +4240,7 @@
           <p:cNvPr id="9" name="Straight Arrow Connector 8">
             <a:extLst>
               <a:ext uri="{FF2B5EF4-FFF2-40B4-BE49-F238E27FC236}">
-                <a16:creationId xmlns:a16="http://schemas.microsoft.com/office/drawing/2014/main" id="{BCB2D5B4-0996-4437-834A-3AC37C185079}"/>
+                <a16:creationId xmlns:a16="http://schemas.microsoft.com/office/drawing/2014/main" xmlns="" id="{BCB2D5B4-0996-4437-834A-3AC37C185079}"/>
               </a:ext>
             </a:extLst>
           </p:cNvPr>
@@ -4368,6 +4286,154 @@
   <p:clrMapOvr>
     <a:masterClrMapping/>
   </p:clrMapOvr>
+  <p:timing>
+    <p:tnLst>
+      <p:par>
+        <p:cTn id="1" dur="indefinite" restart="never" nodeType="tmRoot"/>
+      </p:par>
+    </p:tnLst>
+  </p:timing>
+</p:sld>
+</file>
+
+<file path=ppt/slides/slide13.xml><?xml version="1.0" encoding="utf-8"?>
+<p:sld xmlns:a="http://schemas.openxmlformats.org/drawingml/2006/main" xmlns:r="http://schemas.openxmlformats.org/officeDocument/2006/relationships" xmlns:p="http://schemas.openxmlformats.org/presentationml/2006/main">
+  <p:cSld>
+    <p:spTree>
+      <p:nvGrpSpPr>
+        <p:cNvPr id="1" name=""/>
+        <p:cNvGrpSpPr/>
+        <p:nvPr/>
+      </p:nvGrpSpPr>
+      <p:grpSpPr>
+        <a:xfrm>
+          <a:off x="0" y="0"/>
+          <a:ext cx="0" cy="0"/>
+          <a:chOff x="0" y="0"/>
+          <a:chExt cx="0" cy="0"/>
+        </a:xfrm>
+      </p:grpSpPr>
+      <p:sp>
+        <p:nvSpPr>
+          <p:cNvPr id="6" name="Title 5"/>
+          <p:cNvSpPr>
+            <a:spLocks noGrp="1"/>
+          </p:cNvSpPr>
+          <p:nvPr>
+            <p:ph type="title"/>
+          </p:nvPr>
+        </p:nvSpPr>
+        <p:spPr/>
+        <p:txBody>
+          <a:bodyPr/>
+          <a:lstStyle/>
+          <a:p>
+            <a:pPr algn="ctr"/>
+            <a:r>
+              <a:rPr lang="en-US" dirty="0" smtClean="0"/>
+              <a:t>Demo</a:t>
+            </a:r>
+            <a:endParaRPr lang="en-US" dirty="0"/>
+          </a:p>
+        </p:txBody>
+      </p:sp>
+    </p:spTree>
+    <p:extLst>
+      <p:ext uri="{BB962C8B-B14F-4D97-AF65-F5344CB8AC3E}">
+        <p14:creationId xmlns:p14="http://schemas.microsoft.com/office/powerpoint/2010/main" val="4160979080"/>
+      </p:ext>
+    </p:extLst>
+  </p:cSld>
+  <p:clrMapOvr>
+    <a:masterClrMapping/>
+  </p:clrMapOvr>
+  <p:timing>
+    <p:tnLst>
+      <p:par>
+        <p:cTn id="1" dur="indefinite" restart="never" nodeType="tmRoot"/>
+      </p:par>
+    </p:tnLst>
+  </p:timing>
+</p:sld>
+</file>
+
+<file path=ppt/slides/slide14.xml><?xml version="1.0" encoding="utf-8"?>
+<p:sld xmlns:a="http://schemas.openxmlformats.org/drawingml/2006/main" xmlns:r="http://schemas.openxmlformats.org/officeDocument/2006/relationships" xmlns:p="http://schemas.openxmlformats.org/presentationml/2006/main">
+  <p:cSld>
+    <p:spTree>
+      <p:nvGrpSpPr>
+        <p:cNvPr id="1" name=""/>
+        <p:cNvGrpSpPr/>
+        <p:nvPr/>
+      </p:nvGrpSpPr>
+      <p:grpSpPr>
+        <a:xfrm>
+          <a:off x="0" y="0"/>
+          <a:ext cx="0" cy="0"/>
+          <a:chOff x="0" y="0"/>
+          <a:chExt cx="0" cy="0"/>
+        </a:xfrm>
+      </p:grpSpPr>
+      <p:sp>
+        <p:nvSpPr>
+          <p:cNvPr id="2" name="Title 1"/>
+          <p:cNvSpPr>
+            <a:spLocks noGrp="1"/>
+          </p:cNvSpPr>
+          <p:nvPr>
+            <p:ph type="title"/>
+          </p:nvPr>
+        </p:nvSpPr>
+        <p:spPr/>
+        <p:txBody>
+          <a:bodyPr/>
+          <a:lstStyle/>
+          <a:p>
+            <a:pPr algn="ctr"/>
+            <a:r>
+              <a:rPr lang="en-US" dirty="0" smtClean="0"/>
+              <a:t>Future Work</a:t>
+            </a:r>
+            <a:endParaRPr lang="en-US" dirty="0"/>
+          </a:p>
+        </p:txBody>
+      </p:sp>
+      <p:sp>
+        <p:nvSpPr>
+          <p:cNvPr id="3" name="Content Placeholder 2"/>
+          <p:cNvSpPr>
+            <a:spLocks noGrp="1"/>
+          </p:cNvSpPr>
+          <p:nvPr>
+            <p:ph idx="1"/>
+          </p:nvPr>
+        </p:nvSpPr>
+        <p:spPr/>
+        <p:txBody>
+          <a:bodyPr/>
+          <a:lstStyle/>
+          <a:p>
+            <a:endParaRPr lang="en-US" dirty="0"/>
+          </a:p>
+        </p:txBody>
+      </p:sp>
+    </p:spTree>
+    <p:extLst>
+      <p:ext uri="{BB962C8B-B14F-4D97-AF65-F5344CB8AC3E}">
+        <p14:creationId xmlns:p14="http://schemas.microsoft.com/office/powerpoint/2010/main" val="3722781001"/>
+      </p:ext>
+    </p:extLst>
+  </p:cSld>
+  <p:clrMapOvr>
+    <a:masterClrMapping/>
+  </p:clrMapOvr>
+  <p:timing>
+    <p:tnLst>
+      <p:par>
+        <p:cTn id="1" dur="indefinite" restart="never" nodeType="tmRoot"/>
+      </p:par>
+    </p:tnLst>
+  </p:timing>
 </p:sld>
 </file>
 
@@ -4393,7 +4459,7 @@
           <p:cNvPr id="2" name="Title 1">
             <a:extLst>
               <a:ext uri="{FF2B5EF4-FFF2-40B4-BE49-F238E27FC236}">
-                <a16:creationId xmlns:a16="http://schemas.microsoft.com/office/drawing/2014/main" id="{BDC5B3F6-D021-43C8-B57F-075FB0C69BAA}"/>
+                <a16:creationId xmlns:a16="http://schemas.microsoft.com/office/drawing/2014/main" xmlns="" id="{BDC5B3F6-D021-43C8-B57F-075FB0C69BAA}"/>
               </a:ext>
             </a:extLst>
           </p:cNvPr>
@@ -4409,10 +4475,12 @@
           <a:bodyPr/>
           <a:lstStyle/>
           <a:p>
-            <a:r>
-              <a:rPr lang="en-US" dirty="0"/>
-              <a:t>What</a:t>
-            </a:r>
+            <a:pPr algn="ctr"/>
+            <a:r>
+              <a:rPr lang="en-US" dirty="0" smtClean="0"/>
+              <a:t>What is it?</a:t>
+            </a:r>
+            <a:endParaRPr lang="en-US" dirty="0"/>
           </a:p>
         </p:txBody>
       </p:sp>
@@ -4421,7 +4489,7 @@
           <p:cNvPr id="3" name="Content Placeholder 2">
             <a:extLst>
               <a:ext uri="{FF2B5EF4-FFF2-40B4-BE49-F238E27FC236}">
-                <a16:creationId xmlns:a16="http://schemas.microsoft.com/office/drawing/2014/main" id="{70E2E14D-469D-42A3-83E1-C42B51320693}"/>
+                <a16:creationId xmlns:a16="http://schemas.microsoft.com/office/drawing/2014/main" xmlns="" id="{70E2E14D-469D-42A3-83E1-C42B51320693}"/>
               </a:ext>
             </a:extLst>
           </p:cNvPr>
@@ -4441,56 +4509,65 @@
           <a:p>
             <a:r>
               <a:rPr lang="en-US" dirty="0"/>
-              <a:t>A website that takes care of your desired list of websites</a:t>
-            </a:r>
-            <a:r>
-              <a:rPr lang="en-US" baseline="30000" dirty="0"/>
-              <a:t>*</a:t>
+              <a:t>A website that </a:t>
+            </a:r>
+            <a:r>
+              <a:rPr lang="en-US" dirty="0" smtClean="0"/>
+              <a:t>monitors a list </a:t>
             </a:r>
             <a:r>
               <a:rPr lang="en-US" dirty="0"/>
-              <a:t>.</a:t>
-            </a:r>
-          </a:p>
-          <a:p>
+              <a:t>of </a:t>
+            </a:r>
+            <a:r>
+              <a:rPr lang="en-US" dirty="0" smtClean="0"/>
+              <a:t>websites that you provide.</a:t>
+            </a:r>
+            <a:endParaRPr lang="en-US" dirty="0"/>
+          </a:p>
+          <a:p>
+            <a:r>
+              <a:rPr lang="en-US" dirty="0" smtClean="0"/>
+              <a:t>Sends an email when it discovers that one of the websites have updated.</a:t>
+            </a:r>
+            <a:endParaRPr lang="en-US" dirty="0"/>
+          </a:p>
+          <a:p>
+            <a:r>
+              <a:rPr lang="en-US" dirty="0" smtClean="0"/>
+              <a:t>User Accounts with personalized lists of websites.</a:t>
+            </a:r>
+            <a:endParaRPr lang="en-US" dirty="0"/>
+          </a:p>
+          <a:p>
+            <a:r>
+              <a:rPr lang="en-US" dirty="0" smtClean="0"/>
+              <a:t>Password Optional.</a:t>
+            </a:r>
+          </a:p>
+          <a:p>
+            <a:r>
+              <a:rPr lang="en-US" dirty="0" smtClean="0"/>
+              <a:t>Caveat</a:t>
+            </a:r>
             <a:r>
               <a:rPr lang="en-US" dirty="0"/>
-              <a:t>Every time these websites</a:t>
-            </a:r>
-            <a:r>
-              <a:rPr lang="en-US" baseline="30000" dirty="0"/>
-              <a:t>*  </a:t>
+              <a:t>: Only </a:t>
+            </a:r>
+            <a:r>
+              <a:rPr lang="en-US" dirty="0" err="1"/>
+              <a:t>ETag</a:t>
             </a:r>
             <a:r>
               <a:rPr lang="en-US" dirty="0"/>
-              <a:t>gets updated , the user would expect an email notifying her/him about it.</a:t>
-            </a:r>
-          </a:p>
-          <a:p>
-            <a:r>
-              <a:rPr lang="en-US" dirty="0"/>
-              <a:t>The user creates an account .</a:t>
-            </a:r>
-          </a:p>
-          <a:p>
-            <a:r>
-              <a:rPr lang="en-US" dirty="0"/>
-              <a:t>This account can be a secure account  if the user wishes to and , can be just an account to store list of websites</a:t>
-            </a:r>
-            <a:r>
-              <a:rPr lang="en-US" baseline="30000" dirty="0"/>
-              <a:t>*</a:t>
-            </a:r>
-            <a:r>
-              <a:rPr lang="en-US" dirty="0"/>
-              <a:t>   . </a:t>
-            </a:r>
-          </a:p>
-          <a:p>
-            <a:r>
-              <a:rPr lang="en-US" dirty="0"/>
-              <a:t>Secure or not would depend if the user signs – up with a password.  </a:t>
-            </a:r>
+              <a:t> or Last-Modified Allowed.</a:t>
+            </a:r>
+          </a:p>
+          <a:p>
+            <a:pPr marL="0" indent="0">
+              <a:buNone/>
+            </a:pPr>
+            <a:endParaRPr lang="en-US" dirty="0"/>
           </a:p>
         </p:txBody>
       </p:sp>
@@ -4504,6 +4581,13 @@
   <p:clrMapOvr>
     <a:masterClrMapping/>
   </p:clrMapOvr>
+  <p:timing>
+    <p:tnLst>
+      <p:par>
+        <p:cTn id="1" dur="indefinite" restart="never" nodeType="tmRoot"/>
+      </p:par>
+    </p:tnLst>
+  </p:timing>
 </p:sld>
 </file>
 
@@ -4529,7 +4613,7 @@
           <p:cNvPr id="2" name="Title 1">
             <a:extLst>
               <a:ext uri="{FF2B5EF4-FFF2-40B4-BE49-F238E27FC236}">
-                <a16:creationId xmlns:a16="http://schemas.microsoft.com/office/drawing/2014/main" id="{0FB25368-9341-48CD-8FED-2F6B1CDB9AA7}"/>
+                <a16:creationId xmlns:a16="http://schemas.microsoft.com/office/drawing/2014/main" xmlns="" id="{259D0B7C-1D18-4B9B-9686-41CD01222471}"/>
               </a:ext>
             </a:extLst>
           </p:cNvPr>
@@ -4545,93 +4629,103 @@
           <a:bodyPr/>
           <a:lstStyle/>
           <a:p>
+            <a:pPr algn="ctr"/>
+            <a:r>
+              <a:rPr lang="en-US" dirty="0" smtClean="0"/>
+              <a:t>How do we do it?</a:t>
+            </a:r>
+            <a:endParaRPr lang="en-US" dirty="0"/>
+          </a:p>
+        </p:txBody>
+      </p:sp>
+      <p:sp>
+        <p:nvSpPr>
+          <p:cNvPr id="3" name="Content Placeholder 2">
+            <a:extLst>
+              <a:ext uri="{FF2B5EF4-FFF2-40B4-BE49-F238E27FC236}">
+                <a16:creationId xmlns:a16="http://schemas.microsoft.com/office/drawing/2014/main" xmlns="" id="{7171011C-A762-4A01-8962-0A7436AA633E}"/>
+              </a:ext>
+            </a:extLst>
+          </p:cNvPr>
+          <p:cNvSpPr>
+            <a:spLocks noGrp="1"/>
+          </p:cNvSpPr>
+          <p:nvPr>
+            <p:ph idx="1"/>
+          </p:nvPr>
+        </p:nvSpPr>
+        <p:spPr/>
+        <p:txBody>
+          <a:bodyPr/>
+          <a:lstStyle/>
+          <a:p>
             <a:r>
               <a:rPr lang="en-US" dirty="0"/>
-              <a:t>Websites</a:t>
-            </a:r>
-            <a:r>
-              <a:rPr lang="en-US" baseline="30000" dirty="0"/>
-              <a:t>*  </a:t>
-            </a:r>
+              <a:t>Database Design</a:t>
+            </a:r>
+          </a:p>
+          <a:p>
             <a:r>
               <a:rPr lang="en-US" dirty="0"/>
-              <a:t>,	why   a	‘ *  ’  </a:t>
-            </a:r>
-            <a:r>
-              <a:rPr lang="en-US" baseline="30000" dirty="0"/>
-              <a:t> </a:t>
-            </a:r>
-            <a:r>
-              <a:rPr lang="en-US" dirty="0"/>
-              <a:t>?</a:t>
-            </a:r>
-          </a:p>
-        </p:txBody>
-      </p:sp>
-      <p:sp>
-        <p:nvSpPr>
-          <p:cNvPr id="3" name="Content Placeholder 2">
-            <a:extLst>
-              <a:ext uri="{FF2B5EF4-FFF2-40B4-BE49-F238E27FC236}">
-                <a16:creationId xmlns:a16="http://schemas.microsoft.com/office/drawing/2014/main" id="{93AAF6B6-D4A0-40CD-8077-AF390290D19D}"/>
-              </a:ext>
-            </a:extLst>
-          </p:cNvPr>
-          <p:cNvSpPr>
-            <a:spLocks noGrp="1"/>
-          </p:cNvSpPr>
-          <p:nvPr>
-            <p:ph idx="1"/>
-          </p:nvPr>
-        </p:nvSpPr>
-        <p:spPr/>
-        <p:txBody>
-          <a:bodyPr/>
-          <a:lstStyle/>
-          <a:p>
-            <a:r>
-              <a:rPr lang="en-US" dirty="0"/>
-              <a:t>The basic work of our notification system , would depend on  the metadata of the website / URL .</a:t>
-            </a:r>
-          </a:p>
-          <a:p>
-            <a:r>
-              <a:rPr lang="en-US" dirty="0"/>
-              <a:t>This metadata would be either the “</a:t>
-            </a:r>
-            <a:r>
-              <a:rPr lang="en-US" dirty="0" err="1"/>
-              <a:t>eTag</a:t>
-            </a:r>
-            <a:r>
-              <a:rPr lang="en-US" dirty="0"/>
-              <a:t>” or “Last-modified” .</a:t>
-            </a:r>
-          </a:p>
-          <a:p>
-            <a:r>
-              <a:rPr lang="en-US" dirty="0"/>
-              <a:t>That is why there is a condition on the websites can be identified for the notification system.</a:t>
-            </a:r>
-          </a:p>
-          <a:p>
-            <a:r>
-              <a:rPr lang="en-US" dirty="0"/>
-              <a:t>Besides this , the entered URL for the website should have a ‘http’ handling .And since this can be taken care of , users can enter any URL.</a:t>
-            </a:r>
+              <a:t>Account </a:t>
+            </a:r>
+            <a:r>
+              <a:rPr lang="en-US" dirty="0" smtClean="0"/>
+              <a:t>Creation, Logging In, and Logging Out</a:t>
+            </a:r>
+            <a:endParaRPr lang="en-US" dirty="0" smtClean="0"/>
+          </a:p>
+          <a:p>
+            <a:r>
+              <a:rPr lang="en-US" dirty="0" smtClean="0"/>
+              <a:t>Changing Password and </a:t>
+            </a:r>
+            <a:r>
+              <a:rPr lang="en-US" dirty="0" smtClean="0"/>
+              <a:t>Account Recovery</a:t>
+            </a:r>
+            <a:endParaRPr lang="en-US" dirty="0"/>
+          </a:p>
+          <a:p>
+            <a:r>
+              <a:rPr lang="en-US" dirty="0" smtClean="0"/>
+              <a:t>Adding, Editing, and Deleting URLs</a:t>
+            </a:r>
+            <a:endParaRPr lang="en-US" dirty="0"/>
+          </a:p>
+          <a:p>
+            <a:r>
+              <a:rPr lang="en-US" dirty="0" smtClean="0"/>
+              <a:t>Searching for Updates</a:t>
+            </a:r>
+            <a:endParaRPr lang="en-US" dirty="0"/>
+          </a:p>
+          <a:p>
+            <a:r>
+              <a:rPr lang="en-US" dirty="0" smtClean="0"/>
+              <a:t>Updating the Database and Sending Emails</a:t>
+            </a:r>
+            <a:endParaRPr lang="en-US" dirty="0"/>
           </a:p>
         </p:txBody>
       </p:sp>
     </p:spTree>
     <p:extLst>
       <p:ext uri="{BB962C8B-B14F-4D97-AF65-F5344CB8AC3E}">
-        <p14:creationId xmlns:p14="http://schemas.microsoft.com/office/powerpoint/2010/main" val="552299470"/>
+        <p14:creationId xmlns:p14="http://schemas.microsoft.com/office/powerpoint/2010/main" val="1513195777"/>
       </p:ext>
     </p:extLst>
   </p:cSld>
   <p:clrMapOvr>
     <a:masterClrMapping/>
   </p:clrMapOvr>
+  <p:timing>
+    <p:tnLst>
+      <p:par>
+        <p:cTn id="1" dur="indefinite" restart="never" nodeType="tmRoot"/>
+      </p:par>
+    </p:tnLst>
+  </p:timing>
 </p:sld>
 </file>
 
@@ -4657,7 +4751,7 @@
           <p:cNvPr id="2" name="Title 1">
             <a:extLst>
               <a:ext uri="{FF2B5EF4-FFF2-40B4-BE49-F238E27FC236}">
-                <a16:creationId xmlns:a16="http://schemas.microsoft.com/office/drawing/2014/main" id="{259D0B7C-1D18-4B9B-9686-41CD01222471}"/>
+                <a16:creationId xmlns:a16="http://schemas.microsoft.com/office/drawing/2014/main" xmlns="" id="{259D0B7C-1D18-4B9B-9686-41CD01222471}"/>
               </a:ext>
             </a:extLst>
           </p:cNvPr>
@@ -4673,10 +4767,12 @@
           <a:bodyPr/>
           <a:lstStyle/>
           <a:p>
+            <a:pPr algn="ctr"/>
             <a:r>
               <a:rPr lang="en-US" dirty="0"/>
-              <a:t>How – Tasks at hand</a:t>
-            </a:r>
+              <a:t>How do we do it?</a:t>
+            </a:r>
+            <a:endParaRPr lang="en-US" dirty="0"/>
           </a:p>
         </p:txBody>
       </p:sp>
@@ -4685,7 +4781,7 @@
           <p:cNvPr id="3" name="Content Placeholder 2">
             <a:extLst>
               <a:ext uri="{FF2B5EF4-FFF2-40B4-BE49-F238E27FC236}">
-                <a16:creationId xmlns:a16="http://schemas.microsoft.com/office/drawing/2014/main" id="{7171011C-A762-4A01-8962-0A7436AA633E}"/>
+                <a16:creationId xmlns:a16="http://schemas.microsoft.com/office/drawing/2014/main" xmlns="" id="{7171011C-A762-4A01-8962-0A7436AA633E}"/>
               </a:ext>
             </a:extLst>
           </p:cNvPr>
@@ -4702,129 +4798,13 @@
           <a:lstStyle/>
           <a:p>
             <a:r>
-              <a:rPr lang="en-US" dirty="0"/>
+              <a:rPr lang="en-US" dirty="0" smtClean="0"/>
               <a:t>To let the user create an account.</a:t>
             </a:r>
           </a:p>
           <a:p>
             <a:r>
-              <a:rPr lang="en-US" dirty="0"/>
-              <a:t>To let user enter , delete or/and edit a URL .</a:t>
-            </a:r>
-          </a:p>
-          <a:p>
-            <a:r>
-              <a:rPr lang="en-US" dirty="0"/>
-              <a:t>Create a relational view of the database , with proper key – table relation to store user details and the URL details.</a:t>
-            </a:r>
-          </a:p>
-          <a:p>
-            <a:r>
-              <a:rPr lang="en-US" dirty="0"/>
-              <a:t>Scan through the saved Websites.</a:t>
-            </a:r>
-          </a:p>
-          <a:p>
-            <a:r>
-              <a:rPr lang="en-US" dirty="0"/>
-              <a:t>For the identified websites, update the database.</a:t>
-            </a:r>
-          </a:p>
-          <a:p>
-            <a:r>
-              <a:rPr lang="en-US" dirty="0"/>
-              <a:t>Send the email to the user , without spamming them.</a:t>
-            </a:r>
-          </a:p>
-        </p:txBody>
-      </p:sp>
-    </p:spTree>
-    <p:extLst>
-      <p:ext uri="{BB962C8B-B14F-4D97-AF65-F5344CB8AC3E}">
-        <p14:creationId xmlns:p14="http://schemas.microsoft.com/office/powerpoint/2010/main" val="1513195777"/>
-      </p:ext>
-    </p:extLst>
-  </p:cSld>
-  <p:clrMapOvr>
-    <a:masterClrMapping/>
-  </p:clrMapOvr>
-</p:sld>
-</file>
-
-<file path=ppt/slides/slide5.xml><?xml version="1.0" encoding="utf-8"?>
-<p:sld xmlns:a="http://schemas.openxmlformats.org/drawingml/2006/main" xmlns:r="http://schemas.openxmlformats.org/officeDocument/2006/relationships" xmlns:p="http://schemas.openxmlformats.org/presentationml/2006/main">
-  <p:cSld>
-    <p:spTree>
-      <p:nvGrpSpPr>
-        <p:cNvPr id="1" name=""/>
-        <p:cNvGrpSpPr/>
-        <p:nvPr/>
-      </p:nvGrpSpPr>
-      <p:grpSpPr>
-        <a:xfrm>
-          <a:off x="0" y="0"/>
-          <a:ext cx="0" cy="0"/>
-          <a:chOff x="0" y="0"/>
-          <a:chExt cx="0" cy="0"/>
-        </a:xfrm>
-      </p:grpSpPr>
-      <p:sp>
-        <p:nvSpPr>
-          <p:cNvPr id="2" name="Title 1">
-            <a:extLst>
-              <a:ext uri="{FF2B5EF4-FFF2-40B4-BE49-F238E27FC236}">
-                <a16:creationId xmlns:a16="http://schemas.microsoft.com/office/drawing/2014/main" id="{259D0B7C-1D18-4B9B-9686-41CD01222471}"/>
-              </a:ext>
-            </a:extLst>
-          </p:cNvPr>
-          <p:cNvSpPr>
-            <a:spLocks noGrp="1"/>
-          </p:cNvSpPr>
-          <p:nvPr>
-            <p:ph type="title"/>
-          </p:nvPr>
-        </p:nvSpPr>
-        <p:spPr/>
-        <p:txBody>
-          <a:bodyPr/>
-          <a:lstStyle/>
-          <a:p>
-            <a:r>
-              <a:rPr lang="en-US" dirty="0"/>
-              <a:t>How – Tasks at hand</a:t>
-            </a:r>
-          </a:p>
-        </p:txBody>
-      </p:sp>
-      <p:sp>
-        <p:nvSpPr>
-          <p:cNvPr id="3" name="Content Placeholder 2">
-            <a:extLst>
-              <a:ext uri="{FF2B5EF4-FFF2-40B4-BE49-F238E27FC236}">
-                <a16:creationId xmlns:a16="http://schemas.microsoft.com/office/drawing/2014/main" id="{7171011C-A762-4A01-8962-0A7436AA633E}"/>
-              </a:ext>
-            </a:extLst>
-          </p:cNvPr>
-          <p:cNvSpPr>
-            <a:spLocks noGrp="1"/>
-          </p:cNvSpPr>
-          <p:nvPr>
-            <p:ph idx="1"/>
-          </p:nvPr>
-        </p:nvSpPr>
-        <p:spPr/>
-        <p:txBody>
-          <a:bodyPr/>
-          <a:lstStyle/>
-          <a:p>
-            <a:r>
-              <a:rPr lang="en-US" dirty="0"/>
-              <a:t>To let the user create an account.</a:t>
-            </a:r>
-          </a:p>
-          <a:p>
-            <a:r>
-              <a:rPr lang="en-US" dirty="0">
+              <a:rPr lang="en-US" dirty="0" smtClean="0">
                 <a:solidFill>
                   <a:schemeClr val="bg2"/>
                 </a:solidFill>
@@ -4834,7 +4814,7 @@
           </a:p>
           <a:p>
             <a:r>
-              <a:rPr lang="en-US" dirty="0">
+              <a:rPr lang="en-US" dirty="0" smtClean="0">
                 <a:solidFill>
                   <a:schemeClr val="bg2"/>
                 </a:solidFill>
@@ -4844,7 +4824,7 @@
           </a:p>
           <a:p>
             <a:r>
-              <a:rPr lang="en-US" dirty="0">
+              <a:rPr lang="en-US" dirty="0" smtClean="0">
                 <a:solidFill>
                   <a:schemeClr val="bg2"/>
                 </a:solidFill>
@@ -4854,7 +4834,7 @@
           </a:p>
           <a:p>
             <a:r>
-              <a:rPr lang="en-US" dirty="0">
+              <a:rPr lang="en-US" dirty="0" smtClean="0">
                 <a:solidFill>
                   <a:schemeClr val="bg2"/>
                 </a:solidFill>
@@ -4864,13 +4844,18 @@
           </a:p>
           <a:p>
             <a:r>
-              <a:rPr lang="en-US" dirty="0">
+              <a:rPr lang="en-US" dirty="0" smtClean="0">
                 <a:solidFill>
                   <a:schemeClr val="bg2"/>
                 </a:solidFill>
               </a:rPr>
               <a:t>Send the email to the user , without spamming them.</a:t>
             </a:r>
+            <a:endParaRPr lang="en-US" dirty="0">
+              <a:solidFill>
+                <a:schemeClr val="bg2"/>
+              </a:solidFill>
+            </a:endParaRPr>
           </a:p>
         </p:txBody>
       </p:sp>
@@ -4879,7 +4864,7 @@
           <p:cNvPr id="5" name="TextBox 4">
             <a:extLst>
               <a:ext uri="{FF2B5EF4-FFF2-40B4-BE49-F238E27FC236}">
-                <a16:creationId xmlns:a16="http://schemas.microsoft.com/office/drawing/2014/main" id="{712723B3-7A70-4AD7-BACB-1675F66D5820}"/>
+                <a16:creationId xmlns:a16="http://schemas.microsoft.com/office/drawing/2014/main" xmlns="" id="{712723B3-7A70-4AD7-BACB-1675F66D5820}"/>
               </a:ext>
             </a:extLst>
           </p:cNvPr>
@@ -5048,6 +5033,158 @@
   <p:clrMapOvr>
     <a:masterClrMapping/>
   </p:clrMapOvr>
+  <p:timing>
+    <p:tnLst>
+      <p:par>
+        <p:cTn id="1" dur="indefinite" restart="never" nodeType="tmRoot"/>
+      </p:par>
+    </p:tnLst>
+  </p:timing>
+</p:sld>
+</file>
+
+<file path=ppt/slides/slide5.xml><?xml version="1.0" encoding="utf-8"?>
+<p:sld xmlns:a="http://schemas.openxmlformats.org/drawingml/2006/main" xmlns:r="http://schemas.openxmlformats.org/officeDocument/2006/relationships" xmlns:p="http://schemas.openxmlformats.org/presentationml/2006/main">
+  <p:cSld>
+    <p:spTree>
+      <p:nvGrpSpPr>
+        <p:cNvPr id="1" name=""/>
+        <p:cNvGrpSpPr/>
+        <p:nvPr/>
+      </p:nvGrpSpPr>
+      <p:grpSpPr>
+        <a:xfrm>
+          <a:off x="0" y="0"/>
+          <a:ext cx="0" cy="0"/>
+          <a:chOff x="0" y="0"/>
+          <a:chExt cx="0" cy="0"/>
+        </a:xfrm>
+      </p:grpSpPr>
+      <p:sp>
+        <p:nvSpPr>
+          <p:cNvPr id="2" name="Title 1">
+            <a:extLst>
+              <a:ext uri="{FF2B5EF4-FFF2-40B4-BE49-F238E27FC236}">
+                <a16:creationId xmlns:a16="http://schemas.microsoft.com/office/drawing/2014/main" xmlns="" id="{259D0B7C-1D18-4B9B-9686-41CD01222471}"/>
+              </a:ext>
+            </a:extLst>
+          </p:cNvPr>
+          <p:cNvSpPr>
+            <a:spLocks noGrp="1"/>
+          </p:cNvSpPr>
+          <p:nvPr>
+            <p:ph type="title"/>
+          </p:nvPr>
+        </p:nvSpPr>
+        <p:spPr/>
+        <p:txBody>
+          <a:bodyPr/>
+          <a:lstStyle/>
+          <a:p>
+            <a:pPr algn="ctr"/>
+            <a:r>
+              <a:rPr lang="en-US" dirty="0"/>
+              <a:t>How do we do it?</a:t>
+            </a:r>
+            <a:endParaRPr lang="en-US" dirty="0"/>
+          </a:p>
+        </p:txBody>
+      </p:sp>
+      <p:sp>
+        <p:nvSpPr>
+          <p:cNvPr id="3" name="Content Placeholder 2">
+            <a:extLst>
+              <a:ext uri="{FF2B5EF4-FFF2-40B4-BE49-F238E27FC236}">
+                <a16:creationId xmlns:a16="http://schemas.microsoft.com/office/drawing/2014/main" xmlns="" id="{7171011C-A762-4A01-8962-0A7436AA633E}"/>
+              </a:ext>
+            </a:extLst>
+          </p:cNvPr>
+          <p:cNvSpPr>
+            <a:spLocks noGrp="1"/>
+          </p:cNvSpPr>
+          <p:nvPr>
+            <p:ph idx="1"/>
+          </p:nvPr>
+        </p:nvSpPr>
+        <p:spPr/>
+        <p:txBody>
+          <a:bodyPr/>
+          <a:lstStyle/>
+          <a:p>
+            <a:r>
+              <a:rPr lang="en-US" dirty="0">
+                <a:solidFill>
+                  <a:schemeClr val="bg2"/>
+                </a:solidFill>
+              </a:rPr>
+              <a:t>To let the user create an account.</a:t>
+            </a:r>
+          </a:p>
+          <a:p>
+            <a:r>
+              <a:rPr lang="en-US" dirty="0"/>
+              <a:t>To let user enter , delete or/and edit a URL .</a:t>
+            </a:r>
+          </a:p>
+          <a:p>
+            <a:r>
+              <a:rPr lang="en-US" dirty="0">
+                <a:solidFill>
+                  <a:schemeClr val="bg2"/>
+                </a:solidFill>
+              </a:rPr>
+              <a:t>Create a relational view of the database , with proper key – table relation to store user details and the URL details.</a:t>
+            </a:r>
+          </a:p>
+          <a:p>
+            <a:r>
+              <a:rPr lang="en-US" dirty="0">
+                <a:solidFill>
+                  <a:schemeClr val="bg2"/>
+                </a:solidFill>
+              </a:rPr>
+              <a:t>Scan through the saved Websites.</a:t>
+            </a:r>
+          </a:p>
+          <a:p>
+            <a:r>
+              <a:rPr lang="en-US" dirty="0">
+                <a:solidFill>
+                  <a:schemeClr val="bg2"/>
+                </a:solidFill>
+              </a:rPr>
+              <a:t>For the identified websites, update the database.</a:t>
+            </a:r>
+          </a:p>
+          <a:p>
+            <a:r>
+              <a:rPr lang="en-US" dirty="0">
+                <a:solidFill>
+                  <a:schemeClr val="bg2"/>
+                </a:solidFill>
+              </a:rPr>
+              <a:t>Send the email to the user , without spamming them.</a:t>
+            </a:r>
+          </a:p>
+        </p:txBody>
+      </p:sp>
+    </p:spTree>
+    <p:extLst>
+      <p:ext uri="{BB962C8B-B14F-4D97-AF65-F5344CB8AC3E}">
+        <p14:creationId xmlns:p14="http://schemas.microsoft.com/office/powerpoint/2010/main" val="65087415"/>
+      </p:ext>
+    </p:extLst>
+  </p:cSld>
+  <p:clrMapOvr>
+    <a:masterClrMapping/>
+  </p:clrMapOvr>
+  <p:timing>
+    <p:tnLst>
+      <p:par>
+        <p:cTn id="1" dur="indefinite" restart="never" nodeType="tmRoot"/>
+      </p:par>
+    </p:tnLst>
+  </p:timing>
 </p:sld>
 </file>
 
@@ -5073,7 +5210,7 @@
           <p:cNvPr id="2" name="Title 1">
             <a:extLst>
               <a:ext uri="{FF2B5EF4-FFF2-40B4-BE49-F238E27FC236}">
-                <a16:creationId xmlns:a16="http://schemas.microsoft.com/office/drawing/2014/main" id="{259D0B7C-1D18-4B9B-9686-41CD01222471}"/>
+                <a16:creationId xmlns:a16="http://schemas.microsoft.com/office/drawing/2014/main" xmlns="" id="{259D0B7C-1D18-4B9B-9686-41CD01222471}"/>
               </a:ext>
             </a:extLst>
           </p:cNvPr>
@@ -5089,10 +5226,12 @@
           <a:bodyPr/>
           <a:lstStyle/>
           <a:p>
+            <a:pPr algn="ctr"/>
             <a:r>
               <a:rPr lang="en-US" dirty="0"/>
-              <a:t>How – Tasks at hand</a:t>
-            </a:r>
+              <a:t>How do we do it?</a:t>
+            </a:r>
+            <a:endParaRPr lang="en-US" dirty="0"/>
           </a:p>
         </p:txBody>
       </p:sp>
@@ -5101,7 +5240,7 @@
           <p:cNvPr id="3" name="Content Placeholder 2">
             <a:extLst>
               <a:ext uri="{FF2B5EF4-FFF2-40B4-BE49-F238E27FC236}">
-                <a16:creationId xmlns:a16="http://schemas.microsoft.com/office/drawing/2014/main" id="{7171011C-A762-4A01-8962-0A7436AA633E}"/>
+                <a16:creationId xmlns:a16="http://schemas.microsoft.com/office/drawing/2014/main" xmlns="" id="{7171011C-A762-4A01-8962-0A7436AA633E}"/>
               </a:ext>
             </a:extLst>
           </p:cNvPr>
@@ -5128,17 +5267,17 @@
           </a:p>
           <a:p>
             <a:r>
-              <a:rPr lang="en-US" dirty="0"/>
-              <a:t>To let user enter , delete or/and edit a URL .</a:t>
-            </a:r>
-          </a:p>
-          <a:p>
-            <a:r>
               <a:rPr lang="en-US" dirty="0">
                 <a:solidFill>
                   <a:schemeClr val="bg2"/>
                 </a:solidFill>
               </a:rPr>
+              <a:t>To let user enter , delete or/and edit a URL .</a:t>
+            </a:r>
+          </a:p>
+          <a:p>
+            <a:r>
+              <a:rPr lang="en-US" dirty="0"/>
               <a:t>Create a relational view of the database , with proper key – table relation to store user details and the URL details.</a:t>
             </a:r>
           </a:p>
@@ -5177,13 +5316,20 @@
     </p:spTree>
     <p:extLst>
       <p:ext uri="{BB962C8B-B14F-4D97-AF65-F5344CB8AC3E}">
-        <p14:creationId xmlns:p14="http://schemas.microsoft.com/office/powerpoint/2010/main" val="65087415"/>
+        <p14:creationId xmlns:p14="http://schemas.microsoft.com/office/powerpoint/2010/main" val="3234712775"/>
       </p:ext>
     </p:extLst>
   </p:cSld>
   <p:clrMapOvr>
     <a:masterClrMapping/>
   </p:clrMapOvr>
+  <p:timing>
+    <p:tnLst>
+      <p:par>
+        <p:cTn id="1" dur="indefinite" restart="never" nodeType="tmRoot"/>
+      </p:par>
+    </p:tnLst>
+  </p:timing>
 </p:sld>
 </file>
 
@@ -5209,7 +5355,7 @@
           <p:cNvPr id="2" name="Title 1">
             <a:extLst>
               <a:ext uri="{FF2B5EF4-FFF2-40B4-BE49-F238E27FC236}">
-                <a16:creationId xmlns:a16="http://schemas.microsoft.com/office/drawing/2014/main" id="{259D0B7C-1D18-4B9B-9686-41CD01222471}"/>
+                <a16:creationId xmlns:a16="http://schemas.microsoft.com/office/drawing/2014/main" xmlns="" id="{259D0B7C-1D18-4B9B-9686-41CD01222471}"/>
               </a:ext>
             </a:extLst>
           </p:cNvPr>
@@ -5225,10 +5371,12 @@
           <a:bodyPr/>
           <a:lstStyle/>
           <a:p>
+            <a:pPr algn="ctr"/>
             <a:r>
               <a:rPr lang="en-US" dirty="0"/>
-              <a:t>How – Tasks at hand</a:t>
-            </a:r>
+              <a:t>How do we do it?</a:t>
+            </a:r>
+            <a:endParaRPr lang="en-US" dirty="0"/>
           </a:p>
         </p:txBody>
       </p:sp>
@@ -5237,7 +5385,7 @@
           <p:cNvPr id="3" name="Content Placeholder 2">
             <a:extLst>
               <a:ext uri="{FF2B5EF4-FFF2-40B4-BE49-F238E27FC236}">
-                <a16:creationId xmlns:a16="http://schemas.microsoft.com/office/drawing/2014/main" id="{7171011C-A762-4A01-8962-0A7436AA633E}"/>
+                <a16:creationId xmlns:a16="http://schemas.microsoft.com/office/drawing/2014/main" xmlns="" id="{7171011C-A762-4A01-8962-0A7436AA633E}"/>
               </a:ext>
             </a:extLst>
           </p:cNvPr>
@@ -5274,17 +5422,17 @@
           </a:p>
           <a:p>
             <a:r>
-              <a:rPr lang="en-US" dirty="0"/>
-              <a:t>Create a relational view of the database , with proper key – table relation to store user details and the URL details.</a:t>
-            </a:r>
-          </a:p>
-          <a:p>
-            <a:r>
               <a:rPr lang="en-US" dirty="0">
                 <a:solidFill>
                   <a:schemeClr val="bg2"/>
                 </a:solidFill>
               </a:rPr>
+              <a:t>Create a relational view of the database , with proper key – table relation to store user details and the URL details.</a:t>
+            </a:r>
+          </a:p>
+          <a:p>
+            <a:r>
+              <a:rPr lang="en-US" dirty="0"/>
               <a:t>Scan through the saved Websites.</a:t>
             </a:r>
           </a:p>
@@ -5305,7 +5453,11 @@
                   <a:schemeClr val="bg2"/>
                 </a:solidFill>
               </a:rPr>
-              <a:t>Send the email to the user , without spamming them.</a:t>
+              <a:t>Send the email to the user , without spamming them</a:t>
+            </a:r>
+            <a:r>
+              <a:rPr lang="en-US" dirty="0"/>
+              <a:t>.</a:t>
             </a:r>
           </a:p>
         </p:txBody>
@@ -5313,13 +5465,20 @@
     </p:spTree>
     <p:extLst>
       <p:ext uri="{BB962C8B-B14F-4D97-AF65-F5344CB8AC3E}">
-        <p14:creationId xmlns:p14="http://schemas.microsoft.com/office/powerpoint/2010/main" val="3234712775"/>
+        <p14:creationId xmlns:p14="http://schemas.microsoft.com/office/powerpoint/2010/main" val="2520450206"/>
       </p:ext>
     </p:extLst>
   </p:cSld>
   <p:clrMapOvr>
     <a:masterClrMapping/>
   </p:clrMapOvr>
+  <p:timing>
+    <p:tnLst>
+      <p:par>
+        <p:cTn id="1" dur="indefinite" restart="never" nodeType="tmRoot"/>
+      </p:par>
+    </p:tnLst>
+  </p:timing>
 </p:sld>
 </file>
 
@@ -5345,7 +5504,7 @@
           <p:cNvPr id="2" name="Title 1">
             <a:extLst>
               <a:ext uri="{FF2B5EF4-FFF2-40B4-BE49-F238E27FC236}">
-                <a16:creationId xmlns:a16="http://schemas.microsoft.com/office/drawing/2014/main" id="{259D0B7C-1D18-4B9B-9686-41CD01222471}"/>
+                <a16:creationId xmlns:a16="http://schemas.microsoft.com/office/drawing/2014/main" xmlns="" id="{259D0B7C-1D18-4B9B-9686-41CD01222471}"/>
               </a:ext>
             </a:extLst>
           </p:cNvPr>
@@ -5361,10 +5520,12 @@
           <a:bodyPr/>
           <a:lstStyle/>
           <a:p>
+            <a:pPr algn="ctr"/>
             <a:r>
               <a:rPr lang="en-US" dirty="0"/>
-              <a:t>How – Tasks at hand</a:t>
-            </a:r>
+              <a:t>How do we do it?</a:t>
+            </a:r>
+            <a:endParaRPr lang="en-US" dirty="0"/>
           </a:p>
         </p:txBody>
       </p:sp>
@@ -5373,7 +5534,7 @@
           <p:cNvPr id="3" name="Content Placeholder 2">
             <a:extLst>
               <a:ext uri="{FF2B5EF4-FFF2-40B4-BE49-F238E27FC236}">
-                <a16:creationId xmlns:a16="http://schemas.microsoft.com/office/drawing/2014/main" id="{7171011C-A762-4A01-8962-0A7436AA633E}"/>
+                <a16:creationId xmlns:a16="http://schemas.microsoft.com/office/drawing/2014/main" xmlns="" id="{7171011C-A762-4A01-8962-0A7436AA633E}"/>
               </a:ext>
             </a:extLst>
           </p:cNvPr>
@@ -5420,17 +5581,17 @@
           </a:p>
           <a:p>
             <a:r>
-              <a:rPr lang="en-US" dirty="0"/>
-              <a:t>Scan through the saved Websites.</a:t>
-            </a:r>
-          </a:p>
-          <a:p>
-            <a:r>
               <a:rPr lang="en-US" dirty="0">
                 <a:solidFill>
                   <a:schemeClr val="bg2"/>
                 </a:solidFill>
               </a:rPr>
+              <a:t>Scan through the saved Websites.</a:t>
+            </a:r>
+          </a:p>
+          <a:p>
+            <a:r>
+              <a:rPr lang="en-US" dirty="0"/>
               <a:t>For the identified websites, update the database.</a:t>
             </a:r>
           </a:p>
@@ -5441,11 +5602,7 @@
                   <a:schemeClr val="bg2"/>
                 </a:solidFill>
               </a:rPr>
-              <a:t>Send the email to the user , without spamming them</a:t>
-            </a:r>
-            <a:r>
-              <a:rPr lang="en-US" dirty="0"/>
-              <a:t>.</a:t>
+              <a:t>Send the email to the user , without spamming them.</a:t>
             </a:r>
           </a:p>
         </p:txBody>
@@ -5453,13 +5610,20 @@
     </p:spTree>
     <p:extLst>
       <p:ext uri="{BB962C8B-B14F-4D97-AF65-F5344CB8AC3E}">
-        <p14:creationId xmlns:p14="http://schemas.microsoft.com/office/powerpoint/2010/main" val="2520450206"/>
+        <p14:creationId xmlns:p14="http://schemas.microsoft.com/office/powerpoint/2010/main" val="2241334342"/>
       </p:ext>
     </p:extLst>
   </p:cSld>
   <p:clrMapOvr>
     <a:masterClrMapping/>
   </p:clrMapOvr>
+  <p:timing>
+    <p:tnLst>
+      <p:par>
+        <p:cTn id="1" dur="indefinite" restart="never" nodeType="tmRoot"/>
+      </p:par>
+    </p:tnLst>
+  </p:timing>
 </p:sld>
 </file>
 
@@ -5485,7 +5649,7 @@
           <p:cNvPr id="2" name="Title 1">
             <a:extLst>
               <a:ext uri="{FF2B5EF4-FFF2-40B4-BE49-F238E27FC236}">
-                <a16:creationId xmlns:a16="http://schemas.microsoft.com/office/drawing/2014/main" id="{259D0B7C-1D18-4B9B-9686-41CD01222471}"/>
+                <a16:creationId xmlns:a16="http://schemas.microsoft.com/office/drawing/2014/main" xmlns="" id="{259D0B7C-1D18-4B9B-9686-41CD01222471}"/>
               </a:ext>
             </a:extLst>
           </p:cNvPr>
@@ -5501,10 +5665,12 @@
           <a:bodyPr/>
           <a:lstStyle/>
           <a:p>
+            <a:pPr algn="ctr"/>
             <a:r>
               <a:rPr lang="en-US" dirty="0"/>
-              <a:t>How – Tasks at hand</a:t>
-            </a:r>
+              <a:t>How do we do it?</a:t>
+            </a:r>
+            <a:endParaRPr lang="en-US" dirty="0"/>
           </a:p>
         </p:txBody>
       </p:sp>
@@ -5513,7 +5679,7 @@
           <p:cNvPr id="3" name="Content Placeholder 2">
             <a:extLst>
               <a:ext uri="{FF2B5EF4-FFF2-40B4-BE49-F238E27FC236}">
-                <a16:creationId xmlns:a16="http://schemas.microsoft.com/office/drawing/2014/main" id="{7171011C-A762-4A01-8962-0A7436AA633E}"/>
+                <a16:creationId xmlns:a16="http://schemas.microsoft.com/office/drawing/2014/main" xmlns="" id="{7171011C-A762-4A01-8962-0A7436AA633E}"/>
               </a:ext>
             </a:extLst>
           </p:cNvPr>
@@ -5570,17 +5736,17 @@
           </a:p>
           <a:p>
             <a:r>
-              <a:rPr lang="en-US" dirty="0"/>
-              <a:t>For the identified websites, update the database.</a:t>
-            </a:r>
-          </a:p>
-          <a:p>
-            <a:r>
               <a:rPr lang="en-US" dirty="0">
                 <a:solidFill>
                   <a:schemeClr val="bg2"/>
                 </a:solidFill>
               </a:rPr>
+              <a:t>For the identified websites, update the database.</a:t>
+            </a:r>
+          </a:p>
+          <a:p>
+            <a:r>
+              <a:rPr lang="en-US" dirty="0"/>
               <a:t>Send the email to the user , without spamming them.</a:t>
             </a:r>
           </a:p>
@@ -5589,13 +5755,20 @@
     </p:spTree>
     <p:extLst>
       <p:ext uri="{BB962C8B-B14F-4D97-AF65-F5344CB8AC3E}">
-        <p14:creationId xmlns:p14="http://schemas.microsoft.com/office/powerpoint/2010/main" val="2241334342"/>
+        <p14:creationId xmlns:p14="http://schemas.microsoft.com/office/powerpoint/2010/main" val="794895920"/>
       </p:ext>
     </p:extLst>
   </p:cSld>
   <p:clrMapOvr>
     <a:masterClrMapping/>
   </p:clrMapOvr>
+  <p:timing>
+    <p:tnLst>
+      <p:par>
+        <p:cTn id="1" dur="indefinite" restart="never" nodeType="tmRoot"/>
+      </p:par>
+    </p:tnLst>
+  </p:timing>
 </p:sld>
 </file>
 

</xml_diff>

<commit_message>
Added more pictures to help present.
</commit_message>
<xml_diff>
--- a/NotifyMe.pptx
+++ b/NotifyMe.pptx
@@ -23,17 +23,18 @@
     <p:sldId id="291" r:id="rId17"/>
     <p:sldId id="282" r:id="rId18"/>
     <p:sldId id="292" r:id="rId19"/>
-    <p:sldId id="283" r:id="rId20"/>
-    <p:sldId id="293" r:id="rId21"/>
-    <p:sldId id="284" r:id="rId22"/>
-    <p:sldId id="294" r:id="rId23"/>
-    <p:sldId id="285" r:id="rId24"/>
-    <p:sldId id="295" r:id="rId25"/>
-    <p:sldId id="259" r:id="rId26"/>
-    <p:sldId id="261" r:id="rId27"/>
-    <p:sldId id="260" r:id="rId28"/>
-    <p:sldId id="275" r:id="rId29"/>
-    <p:sldId id="276" r:id="rId30"/>
+    <p:sldId id="300" r:id="rId20"/>
+    <p:sldId id="283" r:id="rId21"/>
+    <p:sldId id="293" r:id="rId22"/>
+    <p:sldId id="284" r:id="rId23"/>
+    <p:sldId id="294" r:id="rId24"/>
+    <p:sldId id="285" r:id="rId25"/>
+    <p:sldId id="295" r:id="rId26"/>
+    <p:sldId id="259" r:id="rId27"/>
+    <p:sldId id="261" r:id="rId28"/>
+    <p:sldId id="260" r:id="rId29"/>
+    <p:sldId id="275" r:id="rId30"/>
+    <p:sldId id="276" r:id="rId31"/>
   </p:sldIdLst>
   <p:sldSz cx="12192000" cy="6858000"/>
   <p:notesSz cx="6858000" cy="9144000"/>
@@ -4716,25 +4717,40 @@
           </a:p>
         </p:txBody>
       </p:sp>
-      <p:sp>
-        <p:nvSpPr>
-          <p:cNvPr id="7" name="Content Placeholder 6"/>
-          <p:cNvSpPr>
-            <a:spLocks noGrp="1"/>
-          </p:cNvSpPr>
+      <p:pic>
+        <p:nvPicPr>
+          <p:cNvPr id="8" name="Content Placeholder 7"/>
+          <p:cNvPicPr>
+            <a:picLocks noGrp="1" noChangeAspect="1"/>
+          </p:cNvPicPr>
           <p:nvPr>
             <p:ph idx="1"/>
           </p:nvPr>
-        </p:nvSpPr>
-        <p:spPr/>
-        <p:txBody>
-          <a:bodyPr/>
-          <a:lstStyle/>
-          <a:p>
-            <a:endParaRPr lang="en-US"/>
-          </a:p>
-        </p:txBody>
-      </p:sp>
+        </p:nvPicPr>
+        <p:blipFill>
+          <a:blip r:embed="rId2" cstate="print">
+            <a:extLst>
+              <a:ext uri="{28A0092B-C50C-407E-A947-70E740481C1C}">
+                <a14:useLocalDpi xmlns:a14="http://schemas.microsoft.com/office/drawing/2010/main" val="0"/>
+              </a:ext>
+            </a:extLst>
+          </a:blip>
+          <a:stretch>
+            <a:fillRect/>
+          </a:stretch>
+        </p:blipFill>
+        <p:spPr>
+          <a:xfrm>
+            <a:off x="1551522" y="1825625"/>
+            <a:ext cx="9088956" cy="4351338"/>
+          </a:xfrm>
+          <a:ln w="38100">
+            <a:solidFill>
+              <a:srgbClr val="F5F5F5"/>
+            </a:solidFill>
+          </a:ln>
+        </p:spPr>
+      </p:pic>
     </p:spTree>
     <p:extLst>
       <p:ext uri="{BB962C8B-B14F-4D97-AF65-F5344CB8AC3E}">
@@ -5190,25 +5206,40 @@
           </a:p>
         </p:txBody>
       </p:sp>
-      <p:sp>
-        <p:nvSpPr>
-          <p:cNvPr id="3" name="Content Placeholder 2"/>
-          <p:cNvSpPr>
-            <a:spLocks noGrp="1"/>
-          </p:cNvSpPr>
+      <p:pic>
+        <p:nvPicPr>
+          <p:cNvPr id="4" name="Content Placeholder 3"/>
+          <p:cNvPicPr>
+            <a:picLocks noGrp="1" noChangeAspect="1"/>
+          </p:cNvPicPr>
           <p:nvPr>
             <p:ph idx="1"/>
           </p:nvPr>
-        </p:nvSpPr>
-        <p:spPr/>
-        <p:txBody>
-          <a:bodyPr/>
-          <a:lstStyle/>
-          <a:p>
-            <a:endParaRPr lang="en-US"/>
-          </a:p>
-        </p:txBody>
-      </p:sp>
+        </p:nvPicPr>
+        <p:blipFill>
+          <a:blip r:embed="rId2" cstate="print">
+            <a:extLst>
+              <a:ext uri="{28A0092B-C50C-407E-A947-70E740481C1C}">
+                <a14:useLocalDpi xmlns:a14="http://schemas.microsoft.com/office/drawing/2010/main" val="0"/>
+              </a:ext>
+            </a:extLst>
+          </a:blip>
+          <a:stretch>
+            <a:fillRect/>
+          </a:stretch>
+        </p:blipFill>
+        <p:spPr>
+          <a:xfrm>
+            <a:off x="2237243" y="1825625"/>
+            <a:ext cx="7717513" cy="4351338"/>
+          </a:xfrm>
+          <a:ln w="38100">
+            <a:solidFill>
+              <a:srgbClr val="F5F5F5"/>
+            </a:solidFill>
+          </a:ln>
+        </p:spPr>
+      </p:pic>
     </p:spTree>
     <p:extLst>
       <p:ext uri="{BB962C8B-B14F-4D97-AF65-F5344CB8AC3E}">
@@ -5248,13 +5279,7 @@
       </p:grpSpPr>
       <p:sp>
         <p:nvSpPr>
-          <p:cNvPr id="2" name="Title 1">
-            <a:extLst>
-              <a:ext uri="{FF2B5EF4-FFF2-40B4-BE49-F238E27FC236}">
-                <a16:creationId xmlns:a16="http://schemas.microsoft.com/office/drawing/2014/main" xmlns="" id="{259D0B7C-1D18-4B9B-9686-41CD01222471}"/>
-              </a:ext>
-            </a:extLst>
-          </p:cNvPr>
+          <p:cNvPr id="2" name="Title 1"/>
           <p:cNvSpPr>
             <a:spLocks noGrp="1"/>
           </p:cNvSpPr>
@@ -5270,312 +5295,58 @@
             <a:pPr algn="ctr"/>
             <a:r>
               <a:rPr lang="en-US" dirty="0"/>
-              <a:t>How do we do it?</a:t>
-            </a:r>
-          </a:p>
-        </p:txBody>
-      </p:sp>
-      <p:sp>
-        <p:nvSpPr>
-          <p:cNvPr id="3" name="Content Placeholder 2">
-            <a:extLst>
-              <a:ext uri="{FF2B5EF4-FFF2-40B4-BE49-F238E27FC236}">
-                <a16:creationId xmlns:a16="http://schemas.microsoft.com/office/drawing/2014/main" xmlns="" id="{7171011C-A762-4A01-8962-0A7436AA633E}"/>
-              </a:ext>
-            </a:extLst>
-          </p:cNvPr>
-          <p:cNvSpPr>
-            <a:spLocks noGrp="1"/>
-          </p:cNvSpPr>
+              <a:t>Adding, Editing, and Deleting </a:t>
+            </a:r>
+            <a:r>
+              <a:rPr lang="en-US" dirty="0">
+                <a:solidFill>
+                  <a:srgbClr val="F5F5F5"/>
+                </a:solidFill>
+              </a:rPr>
+              <a:t>URLs</a:t>
+            </a:r>
+            <a:endParaRPr lang="en-US" dirty="0"/>
+          </a:p>
+        </p:txBody>
+      </p:sp>
+      <p:pic>
+        <p:nvPicPr>
+          <p:cNvPr id="5" name="Content Placeholder 4"/>
+          <p:cNvPicPr>
+            <a:picLocks noGrp="1" noChangeAspect="1"/>
+          </p:cNvPicPr>
           <p:nvPr>
             <p:ph idx="1"/>
           </p:nvPr>
-        </p:nvSpPr>
-        <p:spPr/>
-        <p:txBody>
-          <a:bodyPr/>
-          <a:lstStyle/>
-          <a:p>
-            <a:r>
-              <a:rPr lang="en-US" dirty="0" smtClean="0">
-                <a:solidFill>
-                  <a:srgbClr val="824040">
-                    <a:alpha val="50000"/>
-                  </a:srgbClr>
-                </a:solidFill>
-              </a:rPr>
-              <a:t> </a:t>
-            </a:r>
-            <a:r>
-              <a:rPr lang="en-US" dirty="0" smtClean="0">
-                <a:solidFill>
-                  <a:srgbClr val="F5F5F5">
-                    <a:alpha val="50000"/>
-                  </a:srgbClr>
-                </a:solidFill>
-              </a:rPr>
-              <a:t>Database</a:t>
-            </a:r>
-            <a:r>
-              <a:rPr lang="en-US" dirty="0" smtClean="0">
-                <a:solidFill>
-                  <a:srgbClr val="824040">
-                    <a:alpha val="50000"/>
-                  </a:srgbClr>
-                </a:solidFill>
-              </a:rPr>
-              <a:t> Design</a:t>
-            </a:r>
-            <a:endParaRPr lang="en-US" dirty="0" smtClean="0">
-              <a:solidFill>
-                <a:srgbClr val="824040">
-                  <a:alpha val="50000"/>
-                </a:srgbClr>
-              </a:solidFill>
-            </a:endParaRPr>
-          </a:p>
-          <a:p>
-            <a:r>
-              <a:rPr lang="en-US" dirty="0" smtClean="0">
-                <a:solidFill>
-                  <a:srgbClr val="824040">
-                    <a:alpha val="50000"/>
-                  </a:srgbClr>
-                </a:solidFill>
-              </a:rPr>
-              <a:t> Account </a:t>
-            </a:r>
-            <a:r>
-              <a:rPr lang="en-US" dirty="0">
-                <a:solidFill>
-                  <a:srgbClr val="F5F5F5">
-                    <a:alpha val="50000"/>
-                  </a:srgbClr>
-                </a:solidFill>
-              </a:rPr>
-              <a:t>Creation</a:t>
-            </a:r>
-            <a:r>
-              <a:rPr lang="en-US" dirty="0">
-                <a:solidFill>
-                  <a:srgbClr val="824040">
-                    <a:alpha val="50000"/>
-                  </a:srgbClr>
-                </a:solidFill>
-              </a:rPr>
-              <a:t>, Logging </a:t>
-            </a:r>
-            <a:r>
-              <a:rPr lang="en-US" dirty="0">
-                <a:solidFill>
-                  <a:srgbClr val="F5F5F5">
-                    <a:alpha val="50000"/>
-                  </a:srgbClr>
-                </a:solidFill>
-              </a:rPr>
-              <a:t>In</a:t>
-            </a:r>
-            <a:r>
-              <a:rPr lang="en-US" dirty="0">
-                <a:solidFill>
-                  <a:srgbClr val="824040">
-                    <a:alpha val="50000"/>
-                  </a:srgbClr>
-                </a:solidFill>
-              </a:rPr>
-              <a:t>, and Logging </a:t>
-            </a:r>
-            <a:r>
-              <a:rPr lang="en-US" dirty="0" smtClean="0">
-                <a:solidFill>
-                  <a:srgbClr val="F5F5F5">
-                    <a:alpha val="50000"/>
-                  </a:srgbClr>
-                </a:solidFill>
-              </a:rPr>
-              <a:t>Out</a:t>
-            </a:r>
-          </a:p>
-          <a:p>
-            <a:r>
-              <a:rPr lang="en-US" dirty="0">
-                <a:solidFill>
-                  <a:srgbClr val="824040">
-                    <a:alpha val="50000"/>
-                  </a:srgbClr>
-                </a:solidFill>
-              </a:rPr>
-              <a:t> </a:t>
-            </a:r>
-            <a:r>
-              <a:rPr lang="en-US" dirty="0" smtClean="0">
-                <a:solidFill>
-                  <a:srgbClr val="F5F5F5">
-                    <a:alpha val="50000"/>
-                  </a:srgbClr>
-                </a:solidFill>
-              </a:rPr>
-              <a:t>Changing</a:t>
-            </a:r>
-            <a:r>
-              <a:rPr lang="en-US" dirty="0" smtClean="0">
-                <a:solidFill>
-                  <a:srgbClr val="824040">
-                    <a:alpha val="50000"/>
-                  </a:srgbClr>
-                </a:solidFill>
-              </a:rPr>
-              <a:t> </a:t>
-            </a:r>
-            <a:r>
-              <a:rPr lang="en-US" dirty="0">
-                <a:solidFill>
-                  <a:srgbClr val="824040">
-                    <a:alpha val="50000"/>
-                  </a:srgbClr>
-                </a:solidFill>
-              </a:rPr>
-              <a:t>Password and Account </a:t>
-            </a:r>
-            <a:r>
-              <a:rPr lang="en-US" dirty="0">
-                <a:solidFill>
-                  <a:srgbClr val="F5F5F5">
-                    <a:alpha val="50000"/>
-                  </a:srgbClr>
-                </a:solidFill>
-              </a:rPr>
-              <a:t>Recovery</a:t>
-            </a:r>
-          </a:p>
-          <a:p>
-            <a:r>
-              <a:rPr lang="en-US" dirty="0" smtClean="0">
-                <a:solidFill>
-                  <a:srgbClr val="824040">
-                    <a:alpha val="50000"/>
-                  </a:srgbClr>
-                </a:solidFill>
-              </a:rPr>
-              <a:t> Adding</a:t>
-            </a:r>
-            <a:r>
-              <a:rPr lang="en-US" dirty="0">
-                <a:solidFill>
-                  <a:srgbClr val="824040">
-                    <a:alpha val="50000"/>
-                  </a:srgbClr>
-                </a:solidFill>
-              </a:rPr>
-              <a:t>, Editing, and Deleting </a:t>
-            </a:r>
-            <a:r>
-              <a:rPr lang="en-US" dirty="0" smtClean="0">
-                <a:solidFill>
-                  <a:srgbClr val="F5F5F5">
-                    <a:alpha val="50000"/>
-                  </a:srgbClr>
-                </a:solidFill>
-              </a:rPr>
-              <a:t>URLs</a:t>
-            </a:r>
-          </a:p>
-          <a:p>
-            <a:r>
-              <a:rPr lang="en-US" dirty="0" smtClean="0">
-                <a:solidFill>
-                  <a:srgbClr val="824040">
-                    <a:alpha val="50000"/>
-                  </a:srgbClr>
-                </a:solidFill>
-              </a:rPr>
-              <a:t> </a:t>
-            </a:r>
-            <a:r>
-              <a:rPr lang="en-US" dirty="0">
-                <a:solidFill>
-                  <a:srgbClr val="F5F5F5"/>
-                </a:solidFill>
-              </a:rPr>
-              <a:t>Searching</a:t>
-            </a:r>
-            <a:r>
-              <a:rPr lang="en-US" dirty="0"/>
-              <a:t> for </a:t>
-            </a:r>
-            <a:r>
-              <a:rPr lang="en-US" dirty="0" smtClean="0"/>
-              <a:t>Updates</a:t>
-            </a:r>
-          </a:p>
-          <a:p>
-            <a:r>
-              <a:rPr lang="en-US" dirty="0" smtClean="0">
-                <a:solidFill>
-                  <a:srgbClr val="824040">
-                    <a:alpha val="50000"/>
-                  </a:srgbClr>
-                </a:solidFill>
-              </a:rPr>
-              <a:t> </a:t>
-            </a:r>
-            <a:r>
-              <a:rPr lang="en-US" dirty="0" smtClean="0">
-                <a:solidFill>
-                  <a:srgbClr val="F5F5F5">
-                    <a:alpha val="50000"/>
-                  </a:srgbClr>
-                </a:solidFill>
-              </a:rPr>
-              <a:t>Updating</a:t>
-            </a:r>
-            <a:r>
-              <a:rPr lang="en-US" dirty="0" smtClean="0">
-                <a:solidFill>
-                  <a:srgbClr val="824040">
-                    <a:alpha val="50000"/>
-                  </a:srgbClr>
-                </a:solidFill>
-              </a:rPr>
-              <a:t> </a:t>
-            </a:r>
-            <a:r>
-              <a:rPr lang="en-US" dirty="0">
-                <a:solidFill>
-                  <a:srgbClr val="824040">
-                    <a:alpha val="50000"/>
-                  </a:srgbClr>
-                </a:solidFill>
-              </a:rPr>
-              <a:t>the Database and </a:t>
-            </a:r>
-            <a:r>
-              <a:rPr lang="en-US" dirty="0">
-                <a:solidFill>
-                  <a:srgbClr val="F5F5F5">
-                    <a:alpha val="50000"/>
-                  </a:srgbClr>
-                </a:solidFill>
-              </a:rPr>
-              <a:t>Sending</a:t>
-            </a:r>
-            <a:r>
-              <a:rPr lang="en-US" dirty="0">
-                <a:solidFill>
-                  <a:srgbClr val="824040">
-                    <a:alpha val="50000"/>
-                  </a:srgbClr>
-                </a:solidFill>
-              </a:rPr>
-              <a:t> Emails</a:t>
-            </a:r>
-          </a:p>
-        </p:txBody>
-      </p:sp>
+        </p:nvPicPr>
+        <p:blipFill>
+          <a:blip r:embed="rId2" cstate="print">
+            <a:extLst>
+              <a:ext uri="{28A0092B-C50C-407E-A947-70E740481C1C}">
+                <a14:useLocalDpi xmlns:a14="http://schemas.microsoft.com/office/drawing/2010/main" val="0"/>
+              </a:ext>
+            </a:extLst>
+          </a:blip>
+          <a:stretch>
+            <a:fillRect/>
+          </a:stretch>
+        </p:blipFill>
+        <p:spPr>
+          <a:xfrm>
+            <a:off x="1551522" y="1825625"/>
+            <a:ext cx="9088956" cy="4351338"/>
+          </a:xfrm>
+          <a:ln w="38100">
+            <a:solidFill>
+              <a:srgbClr val="F5F5F5"/>
+            </a:solidFill>
+          </a:ln>
+        </p:spPr>
+      </p:pic>
     </p:spTree>
     <p:extLst>
       <p:ext uri="{BB962C8B-B14F-4D97-AF65-F5344CB8AC3E}">
-        <p14:creationId xmlns:p14="http://schemas.microsoft.com/office/powerpoint/2010/main" val="4060571339"/>
+        <p14:creationId xmlns:p14="http://schemas.microsoft.com/office/powerpoint/2010/main" val="910697956"/>
       </p:ext>
     </p:extLst>
   </p:cSld>
@@ -5845,7 +5616,13 @@
       </p:grpSpPr>
       <p:sp>
         <p:nvSpPr>
-          <p:cNvPr id="2" name="Title 1"/>
+          <p:cNvPr id="2" name="Title 1">
+            <a:extLst>
+              <a:ext uri="{FF2B5EF4-FFF2-40B4-BE49-F238E27FC236}">
+                <a16:creationId xmlns:a16="http://schemas.microsoft.com/office/drawing/2014/main" xmlns="" id="{259D0B7C-1D18-4B9B-9686-41CD01222471}"/>
+              </a:ext>
+            </a:extLst>
+          </p:cNvPr>
           <p:cNvSpPr>
             <a:spLocks noGrp="1"/>
           </p:cNvSpPr>
@@ -5860,23 +5637,21 @@
           <a:p>
             <a:pPr algn="ctr"/>
             <a:r>
-              <a:rPr lang="en-US" dirty="0">
-                <a:solidFill>
-                  <a:srgbClr val="F5F5F5"/>
-                </a:solidFill>
-              </a:rPr>
-              <a:t>Searching</a:t>
-            </a:r>
-            <a:r>
               <a:rPr lang="en-US" dirty="0"/>
-              <a:t> for Updates</a:t>
-            </a:r>
-          </a:p>
-        </p:txBody>
-      </p:sp>
-      <p:sp>
-        <p:nvSpPr>
-          <p:cNvPr id="3" name="Content Placeholder 2"/>
+              <a:t>How do we do it?</a:t>
+            </a:r>
+          </a:p>
+        </p:txBody>
+      </p:sp>
+      <p:sp>
+        <p:nvSpPr>
+          <p:cNvPr id="3" name="Content Placeholder 2">
+            <a:extLst>
+              <a:ext uri="{FF2B5EF4-FFF2-40B4-BE49-F238E27FC236}">
+                <a16:creationId xmlns:a16="http://schemas.microsoft.com/office/drawing/2014/main" xmlns="" id="{7171011C-A762-4A01-8962-0A7436AA633E}"/>
+              </a:ext>
+            </a:extLst>
+          </p:cNvPr>
           <p:cNvSpPr>
             <a:spLocks noGrp="1"/>
           </p:cNvSpPr>
@@ -5889,14 +5664,286 @@
           <a:bodyPr/>
           <a:lstStyle/>
           <a:p>
-            <a:endParaRPr lang="en-US" dirty="0"/>
+            <a:r>
+              <a:rPr lang="en-US" dirty="0" smtClean="0">
+                <a:solidFill>
+                  <a:srgbClr val="824040">
+                    <a:alpha val="50000"/>
+                  </a:srgbClr>
+                </a:solidFill>
+              </a:rPr>
+              <a:t> </a:t>
+            </a:r>
+            <a:r>
+              <a:rPr lang="en-US" dirty="0" smtClean="0">
+                <a:solidFill>
+                  <a:srgbClr val="F5F5F5">
+                    <a:alpha val="50000"/>
+                  </a:srgbClr>
+                </a:solidFill>
+              </a:rPr>
+              <a:t>Database</a:t>
+            </a:r>
+            <a:r>
+              <a:rPr lang="en-US" dirty="0" smtClean="0">
+                <a:solidFill>
+                  <a:srgbClr val="824040">
+                    <a:alpha val="50000"/>
+                  </a:srgbClr>
+                </a:solidFill>
+              </a:rPr>
+              <a:t> Design</a:t>
+            </a:r>
+            <a:endParaRPr lang="en-US" dirty="0" smtClean="0">
+              <a:solidFill>
+                <a:srgbClr val="824040">
+                  <a:alpha val="50000"/>
+                </a:srgbClr>
+              </a:solidFill>
+            </a:endParaRPr>
+          </a:p>
+          <a:p>
+            <a:r>
+              <a:rPr lang="en-US" dirty="0" smtClean="0">
+                <a:solidFill>
+                  <a:srgbClr val="824040">
+                    <a:alpha val="50000"/>
+                  </a:srgbClr>
+                </a:solidFill>
+              </a:rPr>
+              <a:t> Account </a:t>
+            </a:r>
+            <a:r>
+              <a:rPr lang="en-US" dirty="0">
+                <a:solidFill>
+                  <a:srgbClr val="F5F5F5">
+                    <a:alpha val="50000"/>
+                  </a:srgbClr>
+                </a:solidFill>
+              </a:rPr>
+              <a:t>Creation</a:t>
+            </a:r>
+            <a:r>
+              <a:rPr lang="en-US" dirty="0">
+                <a:solidFill>
+                  <a:srgbClr val="824040">
+                    <a:alpha val="50000"/>
+                  </a:srgbClr>
+                </a:solidFill>
+              </a:rPr>
+              <a:t>, Logging </a:t>
+            </a:r>
+            <a:r>
+              <a:rPr lang="en-US" dirty="0">
+                <a:solidFill>
+                  <a:srgbClr val="F5F5F5">
+                    <a:alpha val="50000"/>
+                  </a:srgbClr>
+                </a:solidFill>
+              </a:rPr>
+              <a:t>In</a:t>
+            </a:r>
+            <a:r>
+              <a:rPr lang="en-US" dirty="0">
+                <a:solidFill>
+                  <a:srgbClr val="824040">
+                    <a:alpha val="50000"/>
+                  </a:srgbClr>
+                </a:solidFill>
+              </a:rPr>
+              <a:t>, and Logging </a:t>
+            </a:r>
+            <a:r>
+              <a:rPr lang="en-US" dirty="0" smtClean="0">
+                <a:solidFill>
+                  <a:srgbClr val="F5F5F5">
+                    <a:alpha val="50000"/>
+                  </a:srgbClr>
+                </a:solidFill>
+              </a:rPr>
+              <a:t>Out</a:t>
+            </a:r>
+          </a:p>
+          <a:p>
+            <a:r>
+              <a:rPr lang="en-US" dirty="0">
+                <a:solidFill>
+                  <a:srgbClr val="824040">
+                    <a:alpha val="50000"/>
+                  </a:srgbClr>
+                </a:solidFill>
+              </a:rPr>
+              <a:t> </a:t>
+            </a:r>
+            <a:r>
+              <a:rPr lang="en-US" dirty="0" smtClean="0">
+                <a:solidFill>
+                  <a:srgbClr val="F5F5F5">
+                    <a:alpha val="50000"/>
+                  </a:srgbClr>
+                </a:solidFill>
+              </a:rPr>
+              <a:t>Changing</a:t>
+            </a:r>
+            <a:r>
+              <a:rPr lang="en-US" dirty="0" smtClean="0">
+                <a:solidFill>
+                  <a:srgbClr val="824040">
+                    <a:alpha val="50000"/>
+                  </a:srgbClr>
+                </a:solidFill>
+              </a:rPr>
+              <a:t> </a:t>
+            </a:r>
+            <a:r>
+              <a:rPr lang="en-US" dirty="0">
+                <a:solidFill>
+                  <a:srgbClr val="824040">
+                    <a:alpha val="50000"/>
+                  </a:srgbClr>
+                </a:solidFill>
+              </a:rPr>
+              <a:t>Password and Account </a:t>
+            </a:r>
+            <a:r>
+              <a:rPr lang="en-US" dirty="0">
+                <a:solidFill>
+                  <a:srgbClr val="F5F5F5">
+                    <a:alpha val="50000"/>
+                  </a:srgbClr>
+                </a:solidFill>
+              </a:rPr>
+              <a:t>Recovery</a:t>
+            </a:r>
+          </a:p>
+          <a:p>
+            <a:r>
+              <a:rPr lang="en-US" dirty="0" smtClean="0">
+                <a:solidFill>
+                  <a:srgbClr val="824040">
+                    <a:alpha val="50000"/>
+                  </a:srgbClr>
+                </a:solidFill>
+              </a:rPr>
+              <a:t> Adding</a:t>
+            </a:r>
+            <a:r>
+              <a:rPr lang="en-US" dirty="0">
+                <a:solidFill>
+                  <a:srgbClr val="824040">
+                    <a:alpha val="50000"/>
+                  </a:srgbClr>
+                </a:solidFill>
+              </a:rPr>
+              <a:t>, Editing, and Deleting </a:t>
+            </a:r>
+            <a:r>
+              <a:rPr lang="en-US" dirty="0" smtClean="0">
+                <a:solidFill>
+                  <a:srgbClr val="F5F5F5">
+                    <a:alpha val="50000"/>
+                  </a:srgbClr>
+                </a:solidFill>
+              </a:rPr>
+              <a:t>URLs</a:t>
+            </a:r>
+          </a:p>
+          <a:p>
+            <a:r>
+              <a:rPr lang="en-US" dirty="0" smtClean="0">
+                <a:solidFill>
+                  <a:srgbClr val="824040">
+                    <a:alpha val="50000"/>
+                  </a:srgbClr>
+                </a:solidFill>
+              </a:rPr>
+              <a:t> </a:t>
+            </a:r>
+            <a:r>
+              <a:rPr lang="en-US" dirty="0">
+                <a:solidFill>
+                  <a:srgbClr val="F5F5F5"/>
+                </a:solidFill>
+              </a:rPr>
+              <a:t>Searching</a:t>
+            </a:r>
+            <a:r>
+              <a:rPr lang="en-US" dirty="0"/>
+              <a:t> for </a:t>
+            </a:r>
+            <a:r>
+              <a:rPr lang="en-US" dirty="0" smtClean="0"/>
+              <a:t>Updates</a:t>
+            </a:r>
+          </a:p>
+          <a:p>
+            <a:r>
+              <a:rPr lang="en-US" dirty="0" smtClean="0">
+                <a:solidFill>
+                  <a:srgbClr val="824040">
+                    <a:alpha val="50000"/>
+                  </a:srgbClr>
+                </a:solidFill>
+              </a:rPr>
+              <a:t> </a:t>
+            </a:r>
+            <a:r>
+              <a:rPr lang="en-US" dirty="0" smtClean="0">
+                <a:solidFill>
+                  <a:srgbClr val="F5F5F5">
+                    <a:alpha val="50000"/>
+                  </a:srgbClr>
+                </a:solidFill>
+              </a:rPr>
+              <a:t>Updating</a:t>
+            </a:r>
+            <a:r>
+              <a:rPr lang="en-US" dirty="0" smtClean="0">
+                <a:solidFill>
+                  <a:srgbClr val="824040">
+                    <a:alpha val="50000"/>
+                  </a:srgbClr>
+                </a:solidFill>
+              </a:rPr>
+              <a:t> </a:t>
+            </a:r>
+            <a:r>
+              <a:rPr lang="en-US" dirty="0">
+                <a:solidFill>
+                  <a:srgbClr val="824040">
+                    <a:alpha val="50000"/>
+                  </a:srgbClr>
+                </a:solidFill>
+              </a:rPr>
+              <a:t>the Database and </a:t>
+            </a:r>
+            <a:r>
+              <a:rPr lang="en-US" dirty="0">
+                <a:solidFill>
+                  <a:srgbClr val="F5F5F5">
+                    <a:alpha val="50000"/>
+                  </a:srgbClr>
+                </a:solidFill>
+              </a:rPr>
+              <a:t>Sending</a:t>
+            </a:r>
+            <a:r>
+              <a:rPr lang="en-US" dirty="0">
+                <a:solidFill>
+                  <a:srgbClr val="824040">
+                    <a:alpha val="50000"/>
+                  </a:srgbClr>
+                </a:solidFill>
+              </a:rPr>
+              <a:t> Emails</a:t>
+            </a:r>
           </a:p>
         </p:txBody>
       </p:sp>
     </p:spTree>
     <p:extLst>
       <p:ext uri="{BB962C8B-B14F-4D97-AF65-F5344CB8AC3E}">
-        <p14:creationId xmlns:p14="http://schemas.microsoft.com/office/powerpoint/2010/main" val="2754910591"/>
+        <p14:creationId xmlns:p14="http://schemas.microsoft.com/office/powerpoint/2010/main" val="4060571339"/>
       </p:ext>
     </p:extLst>
   </p:cSld>
@@ -5932,13 +5979,7 @@
       </p:grpSpPr>
       <p:sp>
         <p:nvSpPr>
-          <p:cNvPr id="2" name="Title 1">
-            <a:extLst>
-              <a:ext uri="{FF2B5EF4-FFF2-40B4-BE49-F238E27FC236}">
-                <a16:creationId xmlns:a16="http://schemas.microsoft.com/office/drawing/2014/main" xmlns="" id="{259D0B7C-1D18-4B9B-9686-41CD01222471}"/>
-              </a:ext>
-            </a:extLst>
-          </p:cNvPr>
+          <p:cNvPr id="2" name="Title 1"/>
           <p:cNvSpPr>
             <a:spLocks noGrp="1"/>
           </p:cNvSpPr>
@@ -5953,21 +5994,23 @@
           <a:p>
             <a:pPr algn="ctr"/>
             <a:r>
+              <a:rPr lang="en-US" dirty="0">
+                <a:solidFill>
+                  <a:srgbClr val="F5F5F5"/>
+                </a:solidFill>
+              </a:rPr>
+              <a:t>Searching</a:t>
+            </a:r>
+            <a:r>
               <a:rPr lang="en-US" dirty="0"/>
-              <a:t>How do we do it?</a:t>
-            </a:r>
-          </a:p>
-        </p:txBody>
-      </p:sp>
-      <p:sp>
-        <p:nvSpPr>
-          <p:cNvPr id="3" name="Content Placeholder 2">
-            <a:extLst>
-              <a:ext uri="{FF2B5EF4-FFF2-40B4-BE49-F238E27FC236}">
-                <a16:creationId xmlns:a16="http://schemas.microsoft.com/office/drawing/2014/main" xmlns="" id="{7171011C-A762-4A01-8962-0A7436AA633E}"/>
-              </a:ext>
-            </a:extLst>
-          </p:cNvPr>
+              <a:t> for Updates</a:t>
+            </a:r>
+          </a:p>
+        </p:txBody>
+      </p:sp>
+      <p:sp>
+        <p:nvSpPr>
+          <p:cNvPr id="3" name="Content Placeholder 2"/>
           <p:cNvSpPr>
             <a:spLocks noGrp="1"/>
           </p:cNvSpPr>
@@ -5980,312 +6023,14 @@
           <a:bodyPr/>
           <a:lstStyle/>
           <a:p>
-            <a:r>
-              <a:rPr lang="en-US" dirty="0" smtClean="0">
-                <a:solidFill>
-                  <a:srgbClr val="824040">
-                    <a:alpha val="50000"/>
-                  </a:srgbClr>
-                </a:solidFill>
-              </a:rPr>
-              <a:t> </a:t>
-            </a:r>
-            <a:r>
-              <a:rPr lang="en-US" dirty="0" smtClean="0">
-                <a:solidFill>
-                  <a:srgbClr val="F5F5F5">
-                    <a:alpha val="50000"/>
-                  </a:srgbClr>
-                </a:solidFill>
-              </a:rPr>
-              <a:t>Database</a:t>
-            </a:r>
-            <a:r>
-              <a:rPr lang="en-US" dirty="0" smtClean="0">
-                <a:solidFill>
-                  <a:srgbClr val="824040">
-                    <a:alpha val="50000"/>
-                  </a:srgbClr>
-                </a:solidFill>
-              </a:rPr>
-              <a:t> Design</a:t>
-            </a:r>
-            <a:endParaRPr lang="en-US" dirty="0" smtClean="0">
-              <a:solidFill>
-                <a:srgbClr val="824040">
-                  <a:alpha val="50000"/>
-                </a:srgbClr>
-              </a:solidFill>
-            </a:endParaRPr>
-          </a:p>
-          <a:p>
-            <a:r>
-              <a:rPr lang="en-US" dirty="0" smtClean="0">
-                <a:solidFill>
-                  <a:srgbClr val="824040">
-                    <a:alpha val="50000"/>
-                  </a:srgbClr>
-                </a:solidFill>
-              </a:rPr>
-              <a:t> Account </a:t>
-            </a:r>
-            <a:r>
-              <a:rPr lang="en-US" dirty="0">
-                <a:solidFill>
-                  <a:srgbClr val="F5F5F5">
-                    <a:alpha val="50000"/>
-                  </a:srgbClr>
-                </a:solidFill>
-              </a:rPr>
-              <a:t>Creation</a:t>
-            </a:r>
-            <a:r>
-              <a:rPr lang="en-US" dirty="0">
-                <a:solidFill>
-                  <a:srgbClr val="824040">
-                    <a:alpha val="50000"/>
-                  </a:srgbClr>
-                </a:solidFill>
-              </a:rPr>
-              <a:t>, Logging </a:t>
-            </a:r>
-            <a:r>
-              <a:rPr lang="en-US" dirty="0">
-                <a:solidFill>
-                  <a:srgbClr val="F5F5F5">
-                    <a:alpha val="50000"/>
-                  </a:srgbClr>
-                </a:solidFill>
-              </a:rPr>
-              <a:t>In</a:t>
-            </a:r>
-            <a:r>
-              <a:rPr lang="en-US" dirty="0">
-                <a:solidFill>
-                  <a:srgbClr val="824040">
-                    <a:alpha val="50000"/>
-                  </a:srgbClr>
-                </a:solidFill>
-              </a:rPr>
-              <a:t>, and Logging </a:t>
-            </a:r>
-            <a:r>
-              <a:rPr lang="en-US" dirty="0" smtClean="0">
-                <a:solidFill>
-                  <a:srgbClr val="F5F5F5">
-                    <a:alpha val="50000"/>
-                  </a:srgbClr>
-                </a:solidFill>
-              </a:rPr>
-              <a:t>Out</a:t>
-            </a:r>
-          </a:p>
-          <a:p>
-            <a:r>
-              <a:rPr lang="en-US" dirty="0">
-                <a:solidFill>
-                  <a:srgbClr val="824040">
-                    <a:alpha val="50000"/>
-                  </a:srgbClr>
-                </a:solidFill>
-              </a:rPr>
-              <a:t> </a:t>
-            </a:r>
-            <a:r>
-              <a:rPr lang="en-US" dirty="0" smtClean="0">
-                <a:solidFill>
-                  <a:srgbClr val="F5F5F5">
-                    <a:alpha val="50000"/>
-                  </a:srgbClr>
-                </a:solidFill>
-              </a:rPr>
-              <a:t>Changing</a:t>
-            </a:r>
-            <a:r>
-              <a:rPr lang="en-US" dirty="0" smtClean="0">
-                <a:solidFill>
-                  <a:srgbClr val="824040">
-                    <a:alpha val="50000"/>
-                  </a:srgbClr>
-                </a:solidFill>
-              </a:rPr>
-              <a:t> </a:t>
-            </a:r>
-            <a:r>
-              <a:rPr lang="en-US" dirty="0">
-                <a:solidFill>
-                  <a:srgbClr val="824040">
-                    <a:alpha val="50000"/>
-                  </a:srgbClr>
-                </a:solidFill>
-              </a:rPr>
-              <a:t>Password and Account </a:t>
-            </a:r>
-            <a:r>
-              <a:rPr lang="en-US" dirty="0">
-                <a:solidFill>
-                  <a:srgbClr val="F5F5F5">
-                    <a:alpha val="50000"/>
-                  </a:srgbClr>
-                </a:solidFill>
-              </a:rPr>
-              <a:t>Recovery</a:t>
-            </a:r>
-          </a:p>
-          <a:p>
-            <a:r>
-              <a:rPr lang="en-US" dirty="0" smtClean="0">
-                <a:solidFill>
-                  <a:srgbClr val="824040">
-                    <a:alpha val="50000"/>
-                  </a:srgbClr>
-                </a:solidFill>
-              </a:rPr>
-              <a:t> Adding</a:t>
-            </a:r>
-            <a:r>
-              <a:rPr lang="en-US" dirty="0">
-                <a:solidFill>
-                  <a:srgbClr val="824040">
-                    <a:alpha val="50000"/>
-                  </a:srgbClr>
-                </a:solidFill>
-              </a:rPr>
-              <a:t>, Editing, and Deleting </a:t>
-            </a:r>
-            <a:r>
-              <a:rPr lang="en-US" dirty="0" smtClean="0">
-                <a:solidFill>
-                  <a:srgbClr val="F5F5F5">
-                    <a:alpha val="50000"/>
-                  </a:srgbClr>
-                </a:solidFill>
-              </a:rPr>
-              <a:t>URLs</a:t>
-            </a:r>
-          </a:p>
-          <a:p>
-            <a:r>
-              <a:rPr lang="en-US" dirty="0" smtClean="0">
-                <a:solidFill>
-                  <a:srgbClr val="824040">
-                    <a:alpha val="50000"/>
-                  </a:srgbClr>
-                </a:solidFill>
-              </a:rPr>
-              <a:t> </a:t>
-            </a:r>
-            <a:r>
-              <a:rPr lang="en-US" dirty="0" smtClean="0">
-                <a:solidFill>
-                  <a:srgbClr val="F5F5F5">
-                    <a:alpha val="50000"/>
-                  </a:srgbClr>
-                </a:solidFill>
-              </a:rPr>
-              <a:t>Searching</a:t>
-            </a:r>
-            <a:r>
-              <a:rPr lang="en-US" dirty="0" smtClean="0">
-                <a:solidFill>
-                  <a:srgbClr val="824040">
-                    <a:alpha val="50000"/>
-                  </a:srgbClr>
-                </a:solidFill>
-              </a:rPr>
-              <a:t> </a:t>
-            </a:r>
-            <a:r>
-              <a:rPr lang="en-US" dirty="0">
-                <a:solidFill>
-                  <a:srgbClr val="824040">
-                    <a:alpha val="50000"/>
-                  </a:srgbClr>
-                </a:solidFill>
-              </a:rPr>
-              <a:t>for </a:t>
-            </a:r>
-            <a:r>
-              <a:rPr lang="en-US" dirty="0" smtClean="0">
-                <a:solidFill>
-                  <a:srgbClr val="824040">
-                    <a:alpha val="50000"/>
-                  </a:srgbClr>
-                </a:solidFill>
-              </a:rPr>
-              <a:t>Updates</a:t>
-            </a:r>
-          </a:p>
-          <a:p>
-            <a:r>
-              <a:rPr lang="en-US" dirty="0" smtClean="0">
-                <a:solidFill>
-                  <a:srgbClr val="824040">
-                    <a:alpha val="50000"/>
-                  </a:srgbClr>
-                </a:solidFill>
-              </a:rPr>
-              <a:t> </a:t>
-            </a:r>
-            <a:r>
-              <a:rPr lang="en-US" dirty="0">
-                <a:solidFill>
-                  <a:srgbClr val="F5F5F5"/>
-                </a:solidFill>
-              </a:rPr>
-              <a:t>Updating</a:t>
-            </a:r>
-            <a:r>
-              <a:rPr lang="en-US" dirty="0"/>
-              <a:t> the Database</a:t>
-            </a:r>
-            <a:r>
-              <a:rPr lang="en-US" dirty="0" smtClean="0">
-                <a:solidFill>
-                  <a:srgbClr val="824040">
-                    <a:alpha val="50000"/>
-                  </a:srgbClr>
-                </a:solidFill>
-              </a:rPr>
-              <a:t> </a:t>
-            </a:r>
-            <a:r>
-              <a:rPr lang="en-US" dirty="0">
-                <a:solidFill>
-                  <a:srgbClr val="824040">
-                    <a:alpha val="50000"/>
-                  </a:srgbClr>
-                </a:solidFill>
-              </a:rPr>
-              <a:t>and </a:t>
-            </a:r>
-            <a:r>
-              <a:rPr lang="en-US" dirty="0">
-                <a:solidFill>
-                  <a:srgbClr val="F5F5F5">
-                    <a:alpha val="50000"/>
-                  </a:srgbClr>
-                </a:solidFill>
-              </a:rPr>
-              <a:t>Sending</a:t>
-            </a:r>
-            <a:r>
-              <a:rPr lang="en-US" dirty="0">
-                <a:solidFill>
-                  <a:srgbClr val="824040">
-                    <a:alpha val="50000"/>
-                  </a:srgbClr>
-                </a:solidFill>
-              </a:rPr>
-              <a:t> Emails</a:t>
-            </a:r>
+            <a:endParaRPr lang="en-US" dirty="0"/>
           </a:p>
         </p:txBody>
       </p:sp>
     </p:spTree>
     <p:extLst>
       <p:ext uri="{BB962C8B-B14F-4D97-AF65-F5344CB8AC3E}">
-        <p14:creationId xmlns:p14="http://schemas.microsoft.com/office/powerpoint/2010/main" val="3987627475"/>
+        <p14:creationId xmlns:p14="http://schemas.microsoft.com/office/powerpoint/2010/main" val="2754910591"/>
       </p:ext>
     </p:extLst>
   </p:cSld>
@@ -6321,7 +6066,13 @@
       </p:grpSpPr>
       <p:sp>
         <p:nvSpPr>
-          <p:cNvPr id="2" name="Title 1"/>
+          <p:cNvPr id="2" name="Title 1">
+            <a:extLst>
+              <a:ext uri="{FF2B5EF4-FFF2-40B4-BE49-F238E27FC236}">
+                <a16:creationId xmlns:a16="http://schemas.microsoft.com/office/drawing/2014/main" xmlns="" id="{259D0B7C-1D18-4B9B-9686-41CD01222471}"/>
+              </a:ext>
+            </a:extLst>
+          </p:cNvPr>
           <p:cNvSpPr>
             <a:spLocks noGrp="1"/>
           </p:cNvSpPr>
@@ -6336,6 +6087,281 @@
           <a:p>
             <a:pPr algn="ctr"/>
             <a:r>
+              <a:rPr lang="en-US" dirty="0"/>
+              <a:t>How do we do it?</a:t>
+            </a:r>
+          </a:p>
+        </p:txBody>
+      </p:sp>
+      <p:sp>
+        <p:nvSpPr>
+          <p:cNvPr id="3" name="Content Placeholder 2">
+            <a:extLst>
+              <a:ext uri="{FF2B5EF4-FFF2-40B4-BE49-F238E27FC236}">
+                <a16:creationId xmlns:a16="http://schemas.microsoft.com/office/drawing/2014/main" xmlns="" id="{7171011C-A762-4A01-8962-0A7436AA633E}"/>
+              </a:ext>
+            </a:extLst>
+          </p:cNvPr>
+          <p:cNvSpPr>
+            <a:spLocks noGrp="1"/>
+          </p:cNvSpPr>
+          <p:nvPr>
+            <p:ph idx="1"/>
+          </p:nvPr>
+        </p:nvSpPr>
+        <p:spPr/>
+        <p:txBody>
+          <a:bodyPr/>
+          <a:lstStyle/>
+          <a:p>
+            <a:r>
+              <a:rPr lang="en-US" dirty="0" smtClean="0">
+                <a:solidFill>
+                  <a:srgbClr val="824040">
+                    <a:alpha val="50000"/>
+                  </a:srgbClr>
+                </a:solidFill>
+              </a:rPr>
+              <a:t> </a:t>
+            </a:r>
+            <a:r>
+              <a:rPr lang="en-US" dirty="0" smtClean="0">
+                <a:solidFill>
+                  <a:srgbClr val="F5F5F5">
+                    <a:alpha val="50000"/>
+                  </a:srgbClr>
+                </a:solidFill>
+              </a:rPr>
+              <a:t>Database</a:t>
+            </a:r>
+            <a:r>
+              <a:rPr lang="en-US" dirty="0" smtClean="0">
+                <a:solidFill>
+                  <a:srgbClr val="824040">
+                    <a:alpha val="50000"/>
+                  </a:srgbClr>
+                </a:solidFill>
+              </a:rPr>
+              <a:t> Design</a:t>
+            </a:r>
+            <a:endParaRPr lang="en-US" dirty="0" smtClean="0">
+              <a:solidFill>
+                <a:srgbClr val="824040">
+                  <a:alpha val="50000"/>
+                </a:srgbClr>
+              </a:solidFill>
+            </a:endParaRPr>
+          </a:p>
+          <a:p>
+            <a:r>
+              <a:rPr lang="en-US" dirty="0" smtClean="0">
+                <a:solidFill>
+                  <a:srgbClr val="824040">
+                    <a:alpha val="50000"/>
+                  </a:srgbClr>
+                </a:solidFill>
+              </a:rPr>
+              <a:t> Account </a:t>
+            </a:r>
+            <a:r>
+              <a:rPr lang="en-US" dirty="0">
+                <a:solidFill>
+                  <a:srgbClr val="F5F5F5">
+                    <a:alpha val="50000"/>
+                  </a:srgbClr>
+                </a:solidFill>
+              </a:rPr>
+              <a:t>Creation</a:t>
+            </a:r>
+            <a:r>
+              <a:rPr lang="en-US" dirty="0">
+                <a:solidFill>
+                  <a:srgbClr val="824040">
+                    <a:alpha val="50000"/>
+                  </a:srgbClr>
+                </a:solidFill>
+              </a:rPr>
+              <a:t>, Logging </a:t>
+            </a:r>
+            <a:r>
+              <a:rPr lang="en-US" dirty="0">
+                <a:solidFill>
+                  <a:srgbClr val="F5F5F5">
+                    <a:alpha val="50000"/>
+                  </a:srgbClr>
+                </a:solidFill>
+              </a:rPr>
+              <a:t>In</a:t>
+            </a:r>
+            <a:r>
+              <a:rPr lang="en-US" dirty="0">
+                <a:solidFill>
+                  <a:srgbClr val="824040">
+                    <a:alpha val="50000"/>
+                  </a:srgbClr>
+                </a:solidFill>
+              </a:rPr>
+              <a:t>, and Logging </a:t>
+            </a:r>
+            <a:r>
+              <a:rPr lang="en-US" dirty="0" smtClean="0">
+                <a:solidFill>
+                  <a:srgbClr val="F5F5F5">
+                    <a:alpha val="50000"/>
+                  </a:srgbClr>
+                </a:solidFill>
+              </a:rPr>
+              <a:t>Out</a:t>
+            </a:r>
+          </a:p>
+          <a:p>
+            <a:r>
+              <a:rPr lang="en-US" dirty="0">
+                <a:solidFill>
+                  <a:srgbClr val="824040">
+                    <a:alpha val="50000"/>
+                  </a:srgbClr>
+                </a:solidFill>
+              </a:rPr>
+              <a:t> </a:t>
+            </a:r>
+            <a:r>
+              <a:rPr lang="en-US" dirty="0" smtClean="0">
+                <a:solidFill>
+                  <a:srgbClr val="F5F5F5">
+                    <a:alpha val="50000"/>
+                  </a:srgbClr>
+                </a:solidFill>
+              </a:rPr>
+              <a:t>Changing</a:t>
+            </a:r>
+            <a:r>
+              <a:rPr lang="en-US" dirty="0" smtClean="0">
+                <a:solidFill>
+                  <a:srgbClr val="824040">
+                    <a:alpha val="50000"/>
+                  </a:srgbClr>
+                </a:solidFill>
+              </a:rPr>
+              <a:t> </a:t>
+            </a:r>
+            <a:r>
+              <a:rPr lang="en-US" dirty="0">
+                <a:solidFill>
+                  <a:srgbClr val="824040">
+                    <a:alpha val="50000"/>
+                  </a:srgbClr>
+                </a:solidFill>
+              </a:rPr>
+              <a:t>Password and Account </a:t>
+            </a:r>
+            <a:r>
+              <a:rPr lang="en-US" dirty="0">
+                <a:solidFill>
+                  <a:srgbClr val="F5F5F5">
+                    <a:alpha val="50000"/>
+                  </a:srgbClr>
+                </a:solidFill>
+              </a:rPr>
+              <a:t>Recovery</a:t>
+            </a:r>
+          </a:p>
+          <a:p>
+            <a:r>
+              <a:rPr lang="en-US" dirty="0" smtClean="0">
+                <a:solidFill>
+                  <a:srgbClr val="824040">
+                    <a:alpha val="50000"/>
+                  </a:srgbClr>
+                </a:solidFill>
+              </a:rPr>
+              <a:t> Adding</a:t>
+            </a:r>
+            <a:r>
+              <a:rPr lang="en-US" dirty="0">
+                <a:solidFill>
+                  <a:srgbClr val="824040">
+                    <a:alpha val="50000"/>
+                  </a:srgbClr>
+                </a:solidFill>
+              </a:rPr>
+              <a:t>, Editing, and Deleting </a:t>
+            </a:r>
+            <a:r>
+              <a:rPr lang="en-US" dirty="0" smtClean="0">
+                <a:solidFill>
+                  <a:srgbClr val="F5F5F5">
+                    <a:alpha val="50000"/>
+                  </a:srgbClr>
+                </a:solidFill>
+              </a:rPr>
+              <a:t>URLs</a:t>
+            </a:r>
+          </a:p>
+          <a:p>
+            <a:r>
+              <a:rPr lang="en-US" dirty="0" smtClean="0">
+                <a:solidFill>
+                  <a:srgbClr val="824040">
+                    <a:alpha val="50000"/>
+                  </a:srgbClr>
+                </a:solidFill>
+              </a:rPr>
+              <a:t> </a:t>
+            </a:r>
+            <a:r>
+              <a:rPr lang="en-US" dirty="0" smtClean="0">
+                <a:solidFill>
+                  <a:srgbClr val="F5F5F5">
+                    <a:alpha val="50000"/>
+                  </a:srgbClr>
+                </a:solidFill>
+              </a:rPr>
+              <a:t>Searching</a:t>
+            </a:r>
+            <a:r>
+              <a:rPr lang="en-US" dirty="0" smtClean="0">
+                <a:solidFill>
+                  <a:srgbClr val="824040">
+                    <a:alpha val="50000"/>
+                  </a:srgbClr>
+                </a:solidFill>
+              </a:rPr>
+              <a:t> </a:t>
+            </a:r>
+            <a:r>
+              <a:rPr lang="en-US" dirty="0">
+                <a:solidFill>
+                  <a:srgbClr val="824040">
+                    <a:alpha val="50000"/>
+                  </a:srgbClr>
+                </a:solidFill>
+              </a:rPr>
+              <a:t>for </a:t>
+            </a:r>
+            <a:r>
+              <a:rPr lang="en-US" dirty="0" smtClean="0">
+                <a:solidFill>
+                  <a:srgbClr val="824040">
+                    <a:alpha val="50000"/>
+                  </a:srgbClr>
+                </a:solidFill>
+              </a:rPr>
+              <a:t>Updates</a:t>
+            </a:r>
+          </a:p>
+          <a:p>
+            <a:r>
+              <a:rPr lang="en-US" dirty="0" smtClean="0">
+                <a:solidFill>
+                  <a:srgbClr val="824040">
+                    <a:alpha val="50000"/>
+                  </a:srgbClr>
+                </a:solidFill>
+              </a:rPr>
+              <a:t> </a:t>
+            </a:r>
+            <a:r>
               <a:rPr lang="en-US" dirty="0">
                 <a:solidFill>
                   <a:srgbClr val="F5F5F5"/>
@@ -6347,32 +6373,53 @@
               <a:rPr lang="en-US" dirty="0"/>
               <a:t> the Database</a:t>
             </a:r>
-          </a:p>
-        </p:txBody>
-      </p:sp>
-      <p:sp>
-        <p:nvSpPr>
-          <p:cNvPr id="3" name="Content Placeholder 2"/>
-          <p:cNvSpPr>
-            <a:spLocks noGrp="1"/>
-          </p:cNvSpPr>
-          <p:nvPr>
-            <p:ph idx="1"/>
-          </p:nvPr>
-        </p:nvSpPr>
-        <p:spPr/>
-        <p:txBody>
-          <a:bodyPr/>
-          <a:lstStyle/>
-          <a:p>
-            <a:endParaRPr lang="en-US"/>
+            <a:r>
+              <a:rPr lang="en-US" dirty="0" smtClean="0">
+                <a:solidFill>
+                  <a:srgbClr val="824040">
+                    <a:alpha val="50000"/>
+                  </a:srgbClr>
+                </a:solidFill>
+              </a:rPr>
+              <a:t> </a:t>
+            </a:r>
+            <a:r>
+              <a:rPr lang="en-US" dirty="0">
+                <a:solidFill>
+                  <a:srgbClr val="824040">
+                    <a:alpha val="50000"/>
+                  </a:srgbClr>
+                </a:solidFill>
+              </a:rPr>
+              <a:t>and </a:t>
+            </a:r>
+            <a:r>
+              <a:rPr lang="en-US" dirty="0">
+                <a:solidFill>
+                  <a:srgbClr val="F5F5F5">
+                    <a:alpha val="50000"/>
+                  </a:srgbClr>
+                </a:solidFill>
+              </a:rPr>
+              <a:t>Sending</a:t>
+            </a:r>
+            <a:r>
+              <a:rPr lang="en-US" dirty="0">
+                <a:solidFill>
+                  <a:srgbClr val="824040">
+                    <a:alpha val="50000"/>
+                  </a:srgbClr>
+                </a:solidFill>
+              </a:rPr>
+              <a:t> Emails</a:t>
+            </a:r>
           </a:p>
         </p:txBody>
       </p:sp>
     </p:spTree>
     <p:extLst>
       <p:ext uri="{BB962C8B-B14F-4D97-AF65-F5344CB8AC3E}">
-        <p14:creationId xmlns:p14="http://schemas.microsoft.com/office/powerpoint/2010/main" val="2748990136"/>
+        <p14:creationId xmlns:p14="http://schemas.microsoft.com/office/powerpoint/2010/main" val="3987627475"/>
       </p:ext>
     </p:extLst>
   </p:cSld>
@@ -6408,13 +6455,7 @@
       </p:grpSpPr>
       <p:sp>
         <p:nvSpPr>
-          <p:cNvPr id="2" name="Title 1">
-            <a:extLst>
-              <a:ext uri="{FF2B5EF4-FFF2-40B4-BE49-F238E27FC236}">
-                <a16:creationId xmlns:a16="http://schemas.microsoft.com/office/drawing/2014/main" xmlns="" id="{259D0B7C-1D18-4B9B-9686-41CD01222471}"/>
-              </a:ext>
-            </a:extLst>
-          </p:cNvPr>
+          <p:cNvPr id="2" name="Title 1"/>
           <p:cNvSpPr>
             <a:spLocks noGrp="1"/>
           </p:cNvSpPr>
@@ -6429,21 +6470,23 @@
           <a:p>
             <a:pPr algn="ctr"/>
             <a:r>
+              <a:rPr lang="en-US" dirty="0">
+                <a:solidFill>
+                  <a:srgbClr val="F5F5F5"/>
+                </a:solidFill>
+              </a:rPr>
+              <a:t>Updating</a:t>
+            </a:r>
+            <a:r>
               <a:rPr lang="en-US" dirty="0"/>
-              <a:t>How do we do it?</a:t>
-            </a:r>
-          </a:p>
-        </p:txBody>
-      </p:sp>
-      <p:sp>
-        <p:nvSpPr>
-          <p:cNvPr id="3" name="Content Placeholder 2">
-            <a:extLst>
-              <a:ext uri="{FF2B5EF4-FFF2-40B4-BE49-F238E27FC236}">
-                <a16:creationId xmlns:a16="http://schemas.microsoft.com/office/drawing/2014/main" xmlns="" id="{7171011C-A762-4A01-8962-0A7436AA633E}"/>
-              </a:ext>
-            </a:extLst>
-          </p:cNvPr>
+              <a:t> the Database</a:t>
+            </a:r>
+          </a:p>
+        </p:txBody>
+      </p:sp>
+      <p:sp>
+        <p:nvSpPr>
+          <p:cNvPr id="3" name="Content Placeholder 2"/>
           <p:cNvSpPr>
             <a:spLocks noGrp="1"/>
           </p:cNvSpPr>
@@ -6456,309 +6499,14 @@
           <a:bodyPr/>
           <a:lstStyle/>
           <a:p>
-            <a:r>
-              <a:rPr lang="en-US" dirty="0" smtClean="0">
-                <a:solidFill>
-                  <a:srgbClr val="824040">
-                    <a:alpha val="50000"/>
-                  </a:srgbClr>
-                </a:solidFill>
-              </a:rPr>
-              <a:t> </a:t>
-            </a:r>
-            <a:r>
-              <a:rPr lang="en-US" dirty="0" smtClean="0">
-                <a:solidFill>
-                  <a:srgbClr val="F5F5F5">
-                    <a:alpha val="50000"/>
-                  </a:srgbClr>
-                </a:solidFill>
-              </a:rPr>
-              <a:t>Database</a:t>
-            </a:r>
-            <a:r>
-              <a:rPr lang="en-US" dirty="0" smtClean="0">
-                <a:solidFill>
-                  <a:srgbClr val="824040">
-                    <a:alpha val="50000"/>
-                  </a:srgbClr>
-                </a:solidFill>
-              </a:rPr>
-              <a:t> Design</a:t>
-            </a:r>
-            <a:endParaRPr lang="en-US" dirty="0" smtClean="0">
-              <a:solidFill>
-                <a:srgbClr val="824040">
-                  <a:alpha val="50000"/>
-                </a:srgbClr>
-              </a:solidFill>
-            </a:endParaRPr>
-          </a:p>
-          <a:p>
-            <a:r>
-              <a:rPr lang="en-US" dirty="0" smtClean="0">
-                <a:solidFill>
-                  <a:srgbClr val="824040">
-                    <a:alpha val="50000"/>
-                  </a:srgbClr>
-                </a:solidFill>
-              </a:rPr>
-              <a:t> Account </a:t>
-            </a:r>
-            <a:r>
-              <a:rPr lang="en-US" dirty="0">
-                <a:solidFill>
-                  <a:srgbClr val="F5F5F5">
-                    <a:alpha val="50000"/>
-                  </a:srgbClr>
-                </a:solidFill>
-              </a:rPr>
-              <a:t>Creation</a:t>
-            </a:r>
-            <a:r>
-              <a:rPr lang="en-US" dirty="0">
-                <a:solidFill>
-                  <a:srgbClr val="824040">
-                    <a:alpha val="50000"/>
-                  </a:srgbClr>
-                </a:solidFill>
-              </a:rPr>
-              <a:t>, Logging </a:t>
-            </a:r>
-            <a:r>
-              <a:rPr lang="en-US" dirty="0">
-                <a:solidFill>
-                  <a:srgbClr val="F5F5F5">
-                    <a:alpha val="50000"/>
-                  </a:srgbClr>
-                </a:solidFill>
-              </a:rPr>
-              <a:t>In</a:t>
-            </a:r>
-            <a:r>
-              <a:rPr lang="en-US" dirty="0">
-                <a:solidFill>
-                  <a:srgbClr val="824040">
-                    <a:alpha val="50000"/>
-                  </a:srgbClr>
-                </a:solidFill>
-              </a:rPr>
-              <a:t>, and Logging </a:t>
-            </a:r>
-            <a:r>
-              <a:rPr lang="en-US" dirty="0" smtClean="0">
-                <a:solidFill>
-                  <a:srgbClr val="F5F5F5">
-                    <a:alpha val="50000"/>
-                  </a:srgbClr>
-                </a:solidFill>
-              </a:rPr>
-              <a:t>Out</a:t>
-            </a:r>
-          </a:p>
-          <a:p>
-            <a:r>
-              <a:rPr lang="en-US" dirty="0">
-                <a:solidFill>
-                  <a:srgbClr val="824040">
-                    <a:alpha val="50000"/>
-                  </a:srgbClr>
-                </a:solidFill>
-              </a:rPr>
-              <a:t> </a:t>
-            </a:r>
-            <a:r>
-              <a:rPr lang="en-US" dirty="0" smtClean="0">
-                <a:solidFill>
-                  <a:srgbClr val="F5F5F5">
-                    <a:alpha val="50000"/>
-                  </a:srgbClr>
-                </a:solidFill>
-              </a:rPr>
-              <a:t>Changing</a:t>
-            </a:r>
-            <a:r>
-              <a:rPr lang="en-US" dirty="0" smtClean="0">
-                <a:solidFill>
-                  <a:srgbClr val="824040">
-                    <a:alpha val="50000"/>
-                  </a:srgbClr>
-                </a:solidFill>
-              </a:rPr>
-              <a:t> </a:t>
-            </a:r>
-            <a:r>
-              <a:rPr lang="en-US" dirty="0">
-                <a:solidFill>
-                  <a:srgbClr val="824040">
-                    <a:alpha val="50000"/>
-                  </a:srgbClr>
-                </a:solidFill>
-              </a:rPr>
-              <a:t>Password and Account </a:t>
-            </a:r>
-            <a:r>
-              <a:rPr lang="en-US" dirty="0">
-                <a:solidFill>
-                  <a:srgbClr val="F5F5F5">
-                    <a:alpha val="50000"/>
-                  </a:srgbClr>
-                </a:solidFill>
-              </a:rPr>
-              <a:t>Recovery</a:t>
-            </a:r>
-          </a:p>
-          <a:p>
-            <a:r>
-              <a:rPr lang="en-US" dirty="0" smtClean="0">
-                <a:solidFill>
-                  <a:srgbClr val="824040">
-                    <a:alpha val="50000"/>
-                  </a:srgbClr>
-                </a:solidFill>
-              </a:rPr>
-              <a:t> Adding</a:t>
-            </a:r>
-            <a:r>
-              <a:rPr lang="en-US" dirty="0">
-                <a:solidFill>
-                  <a:srgbClr val="824040">
-                    <a:alpha val="50000"/>
-                  </a:srgbClr>
-                </a:solidFill>
-              </a:rPr>
-              <a:t>, Editing, and Deleting </a:t>
-            </a:r>
-            <a:r>
-              <a:rPr lang="en-US" dirty="0" smtClean="0">
-                <a:solidFill>
-                  <a:srgbClr val="F5F5F5">
-                    <a:alpha val="50000"/>
-                  </a:srgbClr>
-                </a:solidFill>
-              </a:rPr>
-              <a:t>URLs</a:t>
-            </a:r>
-          </a:p>
-          <a:p>
-            <a:r>
-              <a:rPr lang="en-US" dirty="0" smtClean="0">
-                <a:solidFill>
-                  <a:srgbClr val="824040">
-                    <a:alpha val="50000"/>
-                  </a:srgbClr>
-                </a:solidFill>
-              </a:rPr>
-              <a:t> </a:t>
-            </a:r>
-            <a:r>
-              <a:rPr lang="en-US" dirty="0" smtClean="0">
-                <a:solidFill>
-                  <a:srgbClr val="F5F5F5">
-                    <a:alpha val="50000"/>
-                  </a:srgbClr>
-                </a:solidFill>
-              </a:rPr>
-              <a:t>Searching</a:t>
-            </a:r>
-            <a:r>
-              <a:rPr lang="en-US" dirty="0" smtClean="0">
-                <a:solidFill>
-                  <a:srgbClr val="824040">
-                    <a:alpha val="50000"/>
-                  </a:srgbClr>
-                </a:solidFill>
-              </a:rPr>
-              <a:t> </a:t>
-            </a:r>
-            <a:r>
-              <a:rPr lang="en-US" dirty="0">
-                <a:solidFill>
-                  <a:srgbClr val="824040">
-                    <a:alpha val="50000"/>
-                  </a:srgbClr>
-                </a:solidFill>
-              </a:rPr>
-              <a:t>for </a:t>
-            </a:r>
-            <a:r>
-              <a:rPr lang="en-US" dirty="0" smtClean="0">
-                <a:solidFill>
-                  <a:srgbClr val="824040">
-                    <a:alpha val="50000"/>
-                  </a:srgbClr>
-                </a:solidFill>
-              </a:rPr>
-              <a:t>Updates</a:t>
-            </a:r>
-          </a:p>
-          <a:p>
-            <a:r>
-              <a:rPr lang="en-US" dirty="0" smtClean="0">
-                <a:solidFill>
-                  <a:srgbClr val="824040">
-                    <a:alpha val="50000"/>
-                  </a:srgbClr>
-                </a:solidFill>
-              </a:rPr>
-              <a:t> </a:t>
-            </a:r>
-            <a:r>
-              <a:rPr lang="en-US" dirty="0" smtClean="0">
-                <a:solidFill>
-                  <a:srgbClr val="F5F5F5">
-                    <a:alpha val="50000"/>
-                  </a:srgbClr>
-                </a:solidFill>
-              </a:rPr>
-              <a:t>Updating</a:t>
-            </a:r>
-            <a:r>
-              <a:rPr lang="en-US" dirty="0" smtClean="0">
-                <a:solidFill>
-                  <a:srgbClr val="824040">
-                    <a:alpha val="50000"/>
-                  </a:srgbClr>
-                </a:solidFill>
-              </a:rPr>
-              <a:t> </a:t>
-            </a:r>
-            <a:r>
-              <a:rPr lang="en-US" dirty="0">
-                <a:solidFill>
-                  <a:srgbClr val="824040">
-                    <a:alpha val="50000"/>
-                  </a:srgbClr>
-                </a:solidFill>
-              </a:rPr>
-              <a:t>the Database and </a:t>
-            </a:r>
-            <a:r>
-              <a:rPr lang="en-US" dirty="0">
-                <a:solidFill>
-                  <a:srgbClr val="F5F5F5"/>
-                </a:solidFill>
-              </a:rPr>
-              <a:t>Sending</a:t>
-            </a:r>
-            <a:r>
-              <a:rPr lang="en-US" dirty="0"/>
-              <a:t> Emails</a:t>
-            </a:r>
-            <a:endParaRPr lang="en-US" dirty="0">
-              <a:solidFill>
-                <a:srgbClr val="824040">
-                  <a:alpha val="50000"/>
-                </a:srgbClr>
-              </a:solidFill>
-            </a:endParaRPr>
+            <a:endParaRPr lang="en-US"/>
           </a:p>
         </p:txBody>
       </p:sp>
     </p:spTree>
     <p:extLst>
       <p:ext uri="{BB962C8B-B14F-4D97-AF65-F5344CB8AC3E}">
-        <p14:creationId xmlns:p14="http://schemas.microsoft.com/office/powerpoint/2010/main" val="2737484372"/>
+        <p14:creationId xmlns:p14="http://schemas.microsoft.com/office/powerpoint/2010/main" val="2748990136"/>
       </p:ext>
     </p:extLst>
   </p:cSld>
@@ -6794,7 +6542,13 @@
       </p:grpSpPr>
       <p:sp>
         <p:nvSpPr>
-          <p:cNvPr id="2" name="Title 1"/>
+          <p:cNvPr id="2" name="Title 1">
+            <a:extLst>
+              <a:ext uri="{FF2B5EF4-FFF2-40B4-BE49-F238E27FC236}">
+                <a16:creationId xmlns:a16="http://schemas.microsoft.com/office/drawing/2014/main" xmlns="" id="{259D0B7C-1D18-4B9B-9686-41CD01222471}"/>
+              </a:ext>
+            </a:extLst>
+          </p:cNvPr>
           <p:cNvSpPr>
             <a:spLocks noGrp="1"/>
           </p:cNvSpPr>
@@ -6809,6 +6563,311 @@
           <a:p>
             <a:pPr algn="ctr"/>
             <a:r>
+              <a:rPr lang="en-US" dirty="0"/>
+              <a:t>How do we do it?</a:t>
+            </a:r>
+          </a:p>
+        </p:txBody>
+      </p:sp>
+      <p:sp>
+        <p:nvSpPr>
+          <p:cNvPr id="3" name="Content Placeholder 2">
+            <a:extLst>
+              <a:ext uri="{FF2B5EF4-FFF2-40B4-BE49-F238E27FC236}">
+                <a16:creationId xmlns:a16="http://schemas.microsoft.com/office/drawing/2014/main" xmlns="" id="{7171011C-A762-4A01-8962-0A7436AA633E}"/>
+              </a:ext>
+            </a:extLst>
+          </p:cNvPr>
+          <p:cNvSpPr>
+            <a:spLocks noGrp="1"/>
+          </p:cNvSpPr>
+          <p:nvPr>
+            <p:ph idx="1"/>
+          </p:nvPr>
+        </p:nvSpPr>
+        <p:spPr/>
+        <p:txBody>
+          <a:bodyPr/>
+          <a:lstStyle/>
+          <a:p>
+            <a:r>
+              <a:rPr lang="en-US" dirty="0" smtClean="0">
+                <a:solidFill>
+                  <a:srgbClr val="824040">
+                    <a:alpha val="50000"/>
+                  </a:srgbClr>
+                </a:solidFill>
+              </a:rPr>
+              <a:t> </a:t>
+            </a:r>
+            <a:r>
+              <a:rPr lang="en-US" dirty="0" smtClean="0">
+                <a:solidFill>
+                  <a:srgbClr val="F5F5F5">
+                    <a:alpha val="50000"/>
+                  </a:srgbClr>
+                </a:solidFill>
+              </a:rPr>
+              <a:t>Database</a:t>
+            </a:r>
+            <a:r>
+              <a:rPr lang="en-US" dirty="0" smtClean="0">
+                <a:solidFill>
+                  <a:srgbClr val="824040">
+                    <a:alpha val="50000"/>
+                  </a:srgbClr>
+                </a:solidFill>
+              </a:rPr>
+              <a:t> Design</a:t>
+            </a:r>
+            <a:endParaRPr lang="en-US" dirty="0" smtClean="0">
+              <a:solidFill>
+                <a:srgbClr val="824040">
+                  <a:alpha val="50000"/>
+                </a:srgbClr>
+              </a:solidFill>
+            </a:endParaRPr>
+          </a:p>
+          <a:p>
+            <a:r>
+              <a:rPr lang="en-US" dirty="0" smtClean="0">
+                <a:solidFill>
+                  <a:srgbClr val="824040">
+                    <a:alpha val="50000"/>
+                  </a:srgbClr>
+                </a:solidFill>
+              </a:rPr>
+              <a:t> Account </a:t>
+            </a:r>
+            <a:r>
+              <a:rPr lang="en-US" dirty="0">
+                <a:solidFill>
+                  <a:srgbClr val="F5F5F5">
+                    <a:alpha val="50000"/>
+                  </a:srgbClr>
+                </a:solidFill>
+              </a:rPr>
+              <a:t>Creation</a:t>
+            </a:r>
+            <a:r>
+              <a:rPr lang="en-US" dirty="0">
+                <a:solidFill>
+                  <a:srgbClr val="824040">
+                    <a:alpha val="50000"/>
+                  </a:srgbClr>
+                </a:solidFill>
+              </a:rPr>
+              <a:t>, Logging </a:t>
+            </a:r>
+            <a:r>
+              <a:rPr lang="en-US" dirty="0">
+                <a:solidFill>
+                  <a:srgbClr val="F5F5F5">
+                    <a:alpha val="50000"/>
+                  </a:srgbClr>
+                </a:solidFill>
+              </a:rPr>
+              <a:t>In</a:t>
+            </a:r>
+            <a:r>
+              <a:rPr lang="en-US" dirty="0">
+                <a:solidFill>
+                  <a:srgbClr val="824040">
+                    <a:alpha val="50000"/>
+                  </a:srgbClr>
+                </a:solidFill>
+              </a:rPr>
+              <a:t>, and Logging </a:t>
+            </a:r>
+            <a:r>
+              <a:rPr lang="en-US" dirty="0" smtClean="0">
+                <a:solidFill>
+                  <a:srgbClr val="F5F5F5">
+                    <a:alpha val="50000"/>
+                  </a:srgbClr>
+                </a:solidFill>
+              </a:rPr>
+              <a:t>Out</a:t>
+            </a:r>
+          </a:p>
+          <a:p>
+            <a:r>
+              <a:rPr lang="en-US" dirty="0">
+                <a:solidFill>
+                  <a:srgbClr val="824040">
+                    <a:alpha val="50000"/>
+                  </a:srgbClr>
+                </a:solidFill>
+              </a:rPr>
+              <a:t> </a:t>
+            </a:r>
+            <a:r>
+              <a:rPr lang="en-US" dirty="0" smtClean="0">
+                <a:solidFill>
+                  <a:srgbClr val="F5F5F5">
+                    <a:alpha val="50000"/>
+                  </a:srgbClr>
+                </a:solidFill>
+              </a:rPr>
+              <a:t>Changing</a:t>
+            </a:r>
+            <a:r>
+              <a:rPr lang="en-US" dirty="0" smtClean="0">
+                <a:solidFill>
+                  <a:srgbClr val="824040">
+                    <a:alpha val="50000"/>
+                  </a:srgbClr>
+                </a:solidFill>
+              </a:rPr>
+              <a:t> </a:t>
+            </a:r>
+            <a:r>
+              <a:rPr lang="en-US" dirty="0">
+                <a:solidFill>
+                  <a:srgbClr val="824040">
+                    <a:alpha val="50000"/>
+                  </a:srgbClr>
+                </a:solidFill>
+              </a:rPr>
+              <a:t>Password and Account </a:t>
+            </a:r>
+            <a:r>
+              <a:rPr lang="en-US" dirty="0">
+                <a:solidFill>
+                  <a:srgbClr val="F5F5F5">
+                    <a:alpha val="50000"/>
+                  </a:srgbClr>
+                </a:solidFill>
+              </a:rPr>
+              <a:t>Recovery</a:t>
+            </a:r>
+          </a:p>
+          <a:p>
+            <a:r>
+              <a:rPr lang="en-US" dirty="0" smtClean="0">
+                <a:solidFill>
+                  <a:srgbClr val="824040">
+                    <a:alpha val="50000"/>
+                  </a:srgbClr>
+                </a:solidFill>
+              </a:rPr>
+              <a:t> Adding</a:t>
+            </a:r>
+            <a:r>
+              <a:rPr lang="en-US" dirty="0">
+                <a:solidFill>
+                  <a:srgbClr val="824040">
+                    <a:alpha val="50000"/>
+                  </a:srgbClr>
+                </a:solidFill>
+              </a:rPr>
+              <a:t>, Editing, and Deleting </a:t>
+            </a:r>
+            <a:r>
+              <a:rPr lang="en-US" dirty="0" smtClean="0">
+                <a:solidFill>
+                  <a:srgbClr val="F5F5F5">
+                    <a:alpha val="50000"/>
+                  </a:srgbClr>
+                </a:solidFill>
+              </a:rPr>
+              <a:t>URLs</a:t>
+            </a:r>
+          </a:p>
+          <a:p>
+            <a:r>
+              <a:rPr lang="en-US" dirty="0" smtClean="0">
+                <a:solidFill>
+                  <a:srgbClr val="824040">
+                    <a:alpha val="50000"/>
+                  </a:srgbClr>
+                </a:solidFill>
+              </a:rPr>
+              <a:t> </a:t>
+            </a:r>
+            <a:r>
+              <a:rPr lang="en-US" dirty="0" smtClean="0">
+                <a:solidFill>
+                  <a:srgbClr val="F5F5F5">
+                    <a:alpha val="50000"/>
+                  </a:srgbClr>
+                </a:solidFill>
+              </a:rPr>
+              <a:t>Searching</a:t>
+            </a:r>
+            <a:r>
+              <a:rPr lang="en-US" dirty="0" smtClean="0">
+                <a:solidFill>
+                  <a:srgbClr val="824040">
+                    <a:alpha val="50000"/>
+                  </a:srgbClr>
+                </a:solidFill>
+              </a:rPr>
+              <a:t> </a:t>
+            </a:r>
+            <a:r>
+              <a:rPr lang="en-US" dirty="0">
+                <a:solidFill>
+                  <a:srgbClr val="824040">
+                    <a:alpha val="50000"/>
+                  </a:srgbClr>
+                </a:solidFill>
+              </a:rPr>
+              <a:t>for </a:t>
+            </a:r>
+            <a:r>
+              <a:rPr lang="en-US" dirty="0" smtClean="0">
+                <a:solidFill>
+                  <a:srgbClr val="824040">
+                    <a:alpha val="50000"/>
+                  </a:srgbClr>
+                </a:solidFill>
+              </a:rPr>
+              <a:t>Updates</a:t>
+            </a:r>
+          </a:p>
+          <a:p>
+            <a:r>
+              <a:rPr lang="en-US" dirty="0" smtClean="0">
+                <a:solidFill>
+                  <a:srgbClr val="824040">
+                    <a:alpha val="50000"/>
+                  </a:srgbClr>
+                </a:solidFill>
+              </a:rPr>
+              <a:t> </a:t>
+            </a:r>
+            <a:r>
+              <a:rPr lang="en-US" dirty="0" smtClean="0">
+                <a:solidFill>
+                  <a:srgbClr val="F5F5F5">
+                    <a:alpha val="50000"/>
+                  </a:srgbClr>
+                </a:solidFill>
+              </a:rPr>
+              <a:t>Updating</a:t>
+            </a:r>
+            <a:r>
+              <a:rPr lang="en-US" dirty="0" smtClean="0">
+                <a:solidFill>
+                  <a:srgbClr val="824040">
+                    <a:alpha val="50000"/>
+                  </a:srgbClr>
+                </a:solidFill>
+              </a:rPr>
+              <a:t> </a:t>
+            </a:r>
+            <a:r>
+              <a:rPr lang="en-US" dirty="0">
+                <a:solidFill>
+                  <a:srgbClr val="824040">
+                    <a:alpha val="50000"/>
+                  </a:srgbClr>
+                </a:solidFill>
+              </a:rPr>
+              <a:t>the Database and </a:t>
+            </a:r>
+            <a:r>
               <a:rPr lang="en-US" dirty="0">
                 <a:solidFill>
                   <a:srgbClr val="F5F5F5"/>
@@ -6820,32 +6879,20 @@
               <a:rPr lang="en-US" dirty="0"/>
               <a:t> Emails</a:t>
             </a:r>
-          </a:p>
-        </p:txBody>
-      </p:sp>
-      <p:sp>
-        <p:nvSpPr>
-          <p:cNvPr id="3" name="Content Placeholder 2"/>
-          <p:cNvSpPr>
-            <a:spLocks noGrp="1"/>
-          </p:cNvSpPr>
-          <p:nvPr>
-            <p:ph idx="1"/>
-          </p:nvPr>
-        </p:nvSpPr>
-        <p:spPr/>
-        <p:txBody>
-          <a:bodyPr/>
-          <a:lstStyle/>
-          <a:p>
-            <a:endParaRPr lang="en-US"/>
+            <a:endParaRPr lang="en-US" dirty="0">
+              <a:solidFill>
+                <a:srgbClr val="824040">
+                  <a:alpha val="50000"/>
+                </a:srgbClr>
+              </a:solidFill>
+            </a:endParaRPr>
           </a:p>
         </p:txBody>
       </p:sp>
     </p:spTree>
     <p:extLst>
       <p:ext uri="{BB962C8B-B14F-4D97-AF65-F5344CB8AC3E}">
-        <p14:creationId xmlns:p14="http://schemas.microsoft.com/office/powerpoint/2010/main" val="148493754"/>
+        <p14:creationId xmlns:p14="http://schemas.microsoft.com/office/powerpoint/2010/main" val="2737484372"/>
       </p:ext>
     </p:extLst>
   </p:cSld>
@@ -6881,6 +6928,93 @@
       </p:grpSpPr>
       <p:sp>
         <p:nvSpPr>
+          <p:cNvPr id="2" name="Title 1"/>
+          <p:cNvSpPr>
+            <a:spLocks noGrp="1"/>
+          </p:cNvSpPr>
+          <p:nvPr>
+            <p:ph type="title"/>
+          </p:nvPr>
+        </p:nvSpPr>
+        <p:spPr/>
+        <p:txBody>
+          <a:bodyPr/>
+          <a:lstStyle/>
+          <a:p>
+            <a:pPr algn="ctr"/>
+            <a:r>
+              <a:rPr lang="en-US" dirty="0">
+                <a:solidFill>
+                  <a:srgbClr val="F5F5F5"/>
+                </a:solidFill>
+              </a:rPr>
+              <a:t>Sending</a:t>
+            </a:r>
+            <a:r>
+              <a:rPr lang="en-US" dirty="0"/>
+              <a:t> Emails</a:t>
+            </a:r>
+          </a:p>
+        </p:txBody>
+      </p:sp>
+      <p:sp>
+        <p:nvSpPr>
+          <p:cNvPr id="3" name="Content Placeholder 2"/>
+          <p:cNvSpPr>
+            <a:spLocks noGrp="1"/>
+          </p:cNvSpPr>
+          <p:nvPr>
+            <p:ph idx="1"/>
+          </p:nvPr>
+        </p:nvSpPr>
+        <p:spPr/>
+        <p:txBody>
+          <a:bodyPr/>
+          <a:lstStyle/>
+          <a:p>
+            <a:endParaRPr lang="en-US"/>
+          </a:p>
+        </p:txBody>
+      </p:sp>
+    </p:spTree>
+    <p:extLst>
+      <p:ext uri="{BB962C8B-B14F-4D97-AF65-F5344CB8AC3E}">
+        <p14:creationId xmlns:p14="http://schemas.microsoft.com/office/powerpoint/2010/main" val="148493754"/>
+      </p:ext>
+    </p:extLst>
+  </p:cSld>
+  <p:clrMapOvr>
+    <a:masterClrMapping/>
+  </p:clrMapOvr>
+  <p:timing>
+    <p:tnLst>
+      <p:par>
+        <p:cTn id="1" dur="indefinite" restart="never" nodeType="tmRoot"/>
+      </p:par>
+    </p:tnLst>
+  </p:timing>
+</p:sld>
+</file>
+
+<file path=ppt/slides/slide26.xml><?xml version="1.0" encoding="utf-8"?>
+<p:sld xmlns:a="http://schemas.openxmlformats.org/drawingml/2006/main" xmlns:r="http://schemas.openxmlformats.org/officeDocument/2006/relationships" xmlns:p="http://schemas.openxmlformats.org/presentationml/2006/main">
+  <p:cSld>
+    <p:spTree>
+      <p:nvGrpSpPr>
+        <p:cNvPr id="1" name=""/>
+        <p:cNvGrpSpPr/>
+        <p:nvPr/>
+      </p:nvGrpSpPr>
+      <p:grpSpPr>
+        <a:xfrm>
+          <a:off x="0" y="0"/>
+          <a:ext cx="0" cy="0"/>
+          <a:chOff x="0" y="0"/>
+          <a:chExt cx="0" cy="0"/>
+        </a:xfrm>
+      </p:grpSpPr>
+      <p:sp>
+        <p:nvSpPr>
           <p:cNvPr id="2" name="Title 1">
             <a:extLst>
               <a:ext uri="{FF2B5EF4-FFF2-40B4-BE49-F238E27FC236}">
@@ -7054,7 +7188,7 @@
 </p:sld>
 </file>
 
-<file path=ppt/slides/slide26.xml><?xml version="1.0" encoding="utf-8"?>
+<file path=ppt/slides/slide27.xml><?xml version="1.0" encoding="utf-8"?>
 <p:sld xmlns:a="http://schemas.openxmlformats.org/drawingml/2006/main" xmlns:r="http://schemas.openxmlformats.org/officeDocument/2006/relationships" xmlns:p="http://schemas.openxmlformats.org/presentationml/2006/main">
   <p:cSld>
     <p:spTree>
@@ -7565,7 +7699,7 @@
 </p:sld>
 </file>
 
-<file path=ppt/slides/slide27.xml><?xml version="1.0" encoding="utf-8"?>
+<file path=ppt/slides/slide28.xml><?xml version="1.0" encoding="utf-8"?>
 <p:sld xmlns:a="http://schemas.openxmlformats.org/drawingml/2006/main" xmlns:r="http://schemas.openxmlformats.org/officeDocument/2006/relationships" xmlns:p="http://schemas.openxmlformats.org/presentationml/2006/main">
   <p:cSld>
     <p:spTree>
@@ -7833,72 +7967,6 @@
 </p:sld>
 </file>
 
-<file path=ppt/slides/slide28.xml><?xml version="1.0" encoding="utf-8"?>
-<p:sld xmlns:a="http://schemas.openxmlformats.org/drawingml/2006/main" xmlns:r="http://schemas.openxmlformats.org/officeDocument/2006/relationships" xmlns:p="http://schemas.openxmlformats.org/presentationml/2006/main">
-  <p:cSld>
-    <p:spTree>
-      <p:nvGrpSpPr>
-        <p:cNvPr id="1" name=""/>
-        <p:cNvGrpSpPr/>
-        <p:nvPr/>
-      </p:nvGrpSpPr>
-      <p:grpSpPr>
-        <a:xfrm>
-          <a:off x="0" y="0"/>
-          <a:ext cx="0" cy="0"/>
-          <a:chOff x="0" y="0"/>
-          <a:chExt cx="0" cy="0"/>
-        </a:xfrm>
-      </p:grpSpPr>
-      <p:sp>
-        <p:nvSpPr>
-          <p:cNvPr id="6" name="Title 5"/>
-          <p:cNvSpPr>
-            <a:spLocks noGrp="1"/>
-          </p:cNvSpPr>
-          <p:nvPr>
-            <p:ph type="title"/>
-          </p:nvPr>
-        </p:nvSpPr>
-        <p:spPr>
-          <a:xfrm>
-            <a:off x="838200" y="365125"/>
-            <a:ext cx="10515600" cy="5663886"/>
-          </a:xfrm>
-        </p:spPr>
-        <p:txBody>
-          <a:bodyPr/>
-          <a:lstStyle/>
-          <a:p>
-            <a:pPr algn="ctr"/>
-            <a:r>
-              <a:rPr lang="en-US"/>
-              <a:t>DEMO</a:t>
-            </a:r>
-            <a:endParaRPr lang="en-US" dirty="0"/>
-          </a:p>
-        </p:txBody>
-      </p:sp>
-    </p:spTree>
-    <p:extLst>
-      <p:ext uri="{BB962C8B-B14F-4D97-AF65-F5344CB8AC3E}">
-        <p14:creationId xmlns:p14="http://schemas.microsoft.com/office/powerpoint/2010/main" val="4160979080"/>
-      </p:ext>
-    </p:extLst>
-  </p:cSld>
-  <p:clrMapOvr>
-    <a:masterClrMapping/>
-  </p:clrMapOvr>
-  <p:timing>
-    <p:tnLst>
-      <p:par>
-        <p:cTn id="1" dur="indefinite" restart="never" nodeType="tmRoot"/>
-      </p:par>
-    </p:tnLst>
-  </p:timing>
-</p:sld>
-</file>
-
 <file path=ppt/slides/slide29.xml><?xml version="1.0" encoding="utf-8"?>
 <p:sld xmlns:a="http://schemas.openxmlformats.org/drawingml/2006/main" xmlns:r="http://schemas.openxmlformats.org/officeDocument/2006/relationships" xmlns:p="http://schemas.openxmlformats.org/presentationml/2006/main">
   <p:cSld>
@@ -7918,7 +7986,7 @@
       </p:grpSpPr>
       <p:sp>
         <p:nvSpPr>
-          <p:cNvPr id="2" name="Title 1"/>
+          <p:cNvPr id="6" name="Title 5"/>
           <p:cNvSpPr>
             <a:spLocks noGrp="1"/>
           </p:cNvSpPr>
@@ -7926,34 +7994,21 @@
             <p:ph type="title"/>
           </p:nvPr>
         </p:nvSpPr>
-        <p:spPr/>
+        <p:spPr>
+          <a:xfrm>
+            <a:off x="838200" y="365125"/>
+            <a:ext cx="10515600" cy="5663886"/>
+          </a:xfrm>
+        </p:spPr>
         <p:txBody>
           <a:bodyPr/>
           <a:lstStyle/>
           <a:p>
             <a:pPr algn="ctr"/>
             <a:r>
-              <a:rPr lang="en-US" dirty="0"/>
-              <a:t>Future Work</a:t>
-            </a:r>
-          </a:p>
-        </p:txBody>
-      </p:sp>
-      <p:sp>
-        <p:nvSpPr>
-          <p:cNvPr id="3" name="Content Placeholder 2"/>
-          <p:cNvSpPr>
-            <a:spLocks noGrp="1"/>
-          </p:cNvSpPr>
-          <p:nvPr>
-            <p:ph idx="1"/>
-          </p:nvPr>
-        </p:nvSpPr>
-        <p:spPr/>
-        <p:txBody>
-          <a:bodyPr/>
-          <a:lstStyle/>
-          <a:p>
+              <a:rPr lang="en-US"/>
+              <a:t>DEMO</a:t>
+            </a:r>
             <a:endParaRPr lang="en-US" dirty="0"/>
           </a:p>
         </p:txBody>
@@ -7961,7 +8016,7 @@
     </p:spTree>
     <p:extLst>
       <p:ext uri="{BB962C8B-B14F-4D97-AF65-F5344CB8AC3E}">
-        <p14:creationId xmlns:p14="http://schemas.microsoft.com/office/powerpoint/2010/main" val="3722781001"/>
+        <p14:creationId xmlns:p14="http://schemas.microsoft.com/office/powerpoint/2010/main" val="4160979080"/>
       </p:ext>
     </p:extLst>
   </p:cSld>
@@ -8215,6 +8270,85 @@
     <p:extLst>
       <p:ext uri="{BB962C8B-B14F-4D97-AF65-F5344CB8AC3E}">
         <p14:creationId xmlns:p14="http://schemas.microsoft.com/office/powerpoint/2010/main" val="651296514"/>
+      </p:ext>
+    </p:extLst>
+  </p:cSld>
+  <p:clrMapOvr>
+    <a:masterClrMapping/>
+  </p:clrMapOvr>
+  <p:timing>
+    <p:tnLst>
+      <p:par>
+        <p:cTn id="1" dur="indefinite" restart="never" nodeType="tmRoot"/>
+      </p:par>
+    </p:tnLst>
+  </p:timing>
+</p:sld>
+</file>
+
+<file path=ppt/slides/slide30.xml><?xml version="1.0" encoding="utf-8"?>
+<p:sld xmlns:a="http://schemas.openxmlformats.org/drawingml/2006/main" xmlns:r="http://schemas.openxmlformats.org/officeDocument/2006/relationships" xmlns:p="http://schemas.openxmlformats.org/presentationml/2006/main">
+  <p:cSld>
+    <p:spTree>
+      <p:nvGrpSpPr>
+        <p:cNvPr id="1" name=""/>
+        <p:cNvGrpSpPr/>
+        <p:nvPr/>
+      </p:nvGrpSpPr>
+      <p:grpSpPr>
+        <a:xfrm>
+          <a:off x="0" y="0"/>
+          <a:ext cx="0" cy="0"/>
+          <a:chOff x="0" y="0"/>
+          <a:chExt cx="0" cy="0"/>
+        </a:xfrm>
+      </p:grpSpPr>
+      <p:sp>
+        <p:nvSpPr>
+          <p:cNvPr id="2" name="Title 1"/>
+          <p:cNvSpPr>
+            <a:spLocks noGrp="1"/>
+          </p:cNvSpPr>
+          <p:nvPr>
+            <p:ph type="title"/>
+          </p:nvPr>
+        </p:nvSpPr>
+        <p:spPr/>
+        <p:txBody>
+          <a:bodyPr/>
+          <a:lstStyle/>
+          <a:p>
+            <a:pPr algn="ctr"/>
+            <a:r>
+              <a:rPr lang="en-US" dirty="0"/>
+              <a:t>Future Work</a:t>
+            </a:r>
+          </a:p>
+        </p:txBody>
+      </p:sp>
+      <p:sp>
+        <p:nvSpPr>
+          <p:cNvPr id="3" name="Content Placeholder 2"/>
+          <p:cNvSpPr>
+            <a:spLocks noGrp="1"/>
+          </p:cNvSpPr>
+          <p:nvPr>
+            <p:ph idx="1"/>
+          </p:nvPr>
+        </p:nvSpPr>
+        <p:spPr/>
+        <p:txBody>
+          <a:bodyPr/>
+          <a:lstStyle/>
+          <a:p>
+            <a:endParaRPr lang="en-US" dirty="0"/>
+          </a:p>
+        </p:txBody>
+      </p:sp>
+    </p:spTree>
+    <p:extLst>
+      <p:ext uri="{BB962C8B-B14F-4D97-AF65-F5344CB8AC3E}">
+        <p14:creationId xmlns:p14="http://schemas.microsoft.com/office/powerpoint/2010/main" val="3722781001"/>
       </p:ext>
     </p:extLst>
   </p:cSld>

</xml_diff>